<commit_message>
Added file with scenario plots
</commit_message>
<xml_diff>
--- a/Presentation_191025.pptx
+++ b/Presentation_191025.pptx
@@ -105,6 +105,11 @@
       </a:defRPr>
     </a:lvl9pPr>
   </p:defaultTextStyle>
+  <p:extLst>
+    <p:ext uri="{EFAFB233-063F-42B5-8137-9DF3F51BA10A}">
+      <p15:sldGuideLst xmlns:p15="http://schemas.microsoft.com/office/powerpoint/2012/main"/>
+    </p:ext>
+  </p:extLst>
 </p:presentation>
 </file>
 
@@ -150,7 +155,7 @@
           </a:lstStyle>
           <a:p>
             <a:r>
-              <a:rPr lang="en-US" smtClean="0"/>
+              <a:rPr lang="en-US"/>
               <a:t>Click to edit Master title style</a:t>
             </a:r>
             <a:endParaRPr lang="nb-NO"/>
@@ -215,7 +220,7 @@
           </a:lstStyle>
           <a:p>
             <a:r>
-              <a:rPr lang="en-US" smtClean="0"/>
+              <a:rPr lang="en-US"/>
               <a:t>Click to edit Master subtitle style</a:t>
             </a:r>
             <a:endParaRPr lang="nb-NO"/>
@@ -333,7 +338,7 @@
           <a:lstStyle/>
           <a:p>
             <a:r>
-              <a:rPr lang="en-US" smtClean="0"/>
+              <a:rPr lang="en-US"/>
               <a:t>Click to edit Master title style</a:t>
             </a:r>
             <a:endParaRPr lang="nb-NO"/>
@@ -357,35 +362,35 @@
           <a:p>
             <a:pPr lvl="0"/>
             <a:r>
-              <a:rPr lang="en-US" smtClean="0"/>
+              <a:rPr lang="en-US"/>
               <a:t>Edit Master text styles</a:t>
             </a:r>
           </a:p>
           <a:p>
             <a:pPr lvl="1"/>
             <a:r>
-              <a:rPr lang="en-US" smtClean="0"/>
+              <a:rPr lang="en-US"/>
               <a:t>Second level</a:t>
             </a:r>
           </a:p>
           <a:p>
             <a:pPr lvl="2"/>
             <a:r>
-              <a:rPr lang="en-US" smtClean="0"/>
+              <a:rPr lang="en-US"/>
               <a:t>Third level</a:t>
             </a:r>
           </a:p>
           <a:p>
             <a:pPr lvl="3"/>
             <a:r>
-              <a:rPr lang="en-US" smtClean="0"/>
+              <a:rPr lang="en-US"/>
               <a:t>Fourth level</a:t>
             </a:r>
           </a:p>
           <a:p>
             <a:pPr lvl="4"/>
             <a:r>
-              <a:rPr lang="en-US" smtClean="0"/>
+              <a:rPr lang="en-US"/>
               <a:t>Fifth level</a:t>
             </a:r>
             <a:endParaRPr lang="nb-NO"/>
@@ -508,7 +513,7 @@
           <a:lstStyle/>
           <a:p>
             <a:r>
-              <a:rPr lang="en-US" smtClean="0"/>
+              <a:rPr lang="en-US"/>
               <a:t>Click to edit Master title style</a:t>
             </a:r>
             <a:endParaRPr lang="nb-NO"/>
@@ -537,35 +542,35 @@
           <a:p>
             <a:pPr lvl="0"/>
             <a:r>
-              <a:rPr lang="en-US" smtClean="0"/>
+              <a:rPr lang="en-US"/>
               <a:t>Edit Master text styles</a:t>
             </a:r>
           </a:p>
           <a:p>
             <a:pPr lvl="1"/>
             <a:r>
-              <a:rPr lang="en-US" smtClean="0"/>
+              <a:rPr lang="en-US"/>
               <a:t>Second level</a:t>
             </a:r>
           </a:p>
           <a:p>
             <a:pPr lvl="2"/>
             <a:r>
-              <a:rPr lang="en-US" smtClean="0"/>
+              <a:rPr lang="en-US"/>
               <a:t>Third level</a:t>
             </a:r>
           </a:p>
           <a:p>
             <a:pPr lvl="3"/>
             <a:r>
-              <a:rPr lang="en-US" smtClean="0"/>
+              <a:rPr lang="en-US"/>
               <a:t>Fourth level</a:t>
             </a:r>
           </a:p>
           <a:p>
             <a:pPr lvl="4"/>
             <a:r>
-              <a:rPr lang="en-US" smtClean="0"/>
+              <a:rPr lang="en-US"/>
               <a:t>Fifth level</a:t>
             </a:r>
             <a:endParaRPr lang="nb-NO"/>
@@ -683,7 +688,7 @@
           <a:lstStyle/>
           <a:p>
             <a:r>
-              <a:rPr lang="en-US" smtClean="0"/>
+              <a:rPr lang="en-US"/>
               <a:t>Click to edit Master title style</a:t>
             </a:r>
             <a:endParaRPr lang="nb-NO"/>
@@ -707,35 +712,35 @@
           <a:p>
             <a:pPr lvl="0"/>
             <a:r>
-              <a:rPr lang="en-US" smtClean="0"/>
+              <a:rPr lang="en-US"/>
               <a:t>Edit Master text styles</a:t>
             </a:r>
           </a:p>
           <a:p>
             <a:pPr lvl="1"/>
             <a:r>
-              <a:rPr lang="en-US" smtClean="0"/>
+              <a:rPr lang="en-US"/>
               <a:t>Second level</a:t>
             </a:r>
           </a:p>
           <a:p>
             <a:pPr lvl="2"/>
             <a:r>
-              <a:rPr lang="en-US" smtClean="0"/>
+              <a:rPr lang="en-US"/>
               <a:t>Third level</a:t>
             </a:r>
           </a:p>
           <a:p>
             <a:pPr lvl="3"/>
             <a:r>
-              <a:rPr lang="en-US" smtClean="0"/>
+              <a:rPr lang="en-US"/>
               <a:t>Fourth level</a:t>
             </a:r>
           </a:p>
           <a:p>
             <a:pPr lvl="4"/>
             <a:r>
-              <a:rPr lang="en-US" smtClean="0"/>
+              <a:rPr lang="en-US"/>
               <a:t>Fifth level</a:t>
             </a:r>
             <a:endParaRPr lang="nb-NO"/>
@@ -862,7 +867,7 @@
           </a:lstStyle>
           <a:p>
             <a:r>
-              <a:rPr lang="en-US" smtClean="0"/>
+              <a:rPr lang="en-US"/>
               <a:t>Click to edit Master title style</a:t>
             </a:r>
             <a:endParaRPr lang="nb-NO"/>
@@ -982,7 +987,7 @@
           <a:p>
             <a:pPr lvl="0"/>
             <a:r>
-              <a:rPr lang="en-US" smtClean="0"/>
+              <a:rPr lang="en-US"/>
               <a:t>Edit Master text styles</a:t>
             </a:r>
           </a:p>
@@ -1099,7 +1104,7 @@
           <a:lstStyle/>
           <a:p>
             <a:r>
-              <a:rPr lang="en-US" smtClean="0"/>
+              <a:rPr lang="en-US"/>
               <a:t>Click to edit Master title style</a:t>
             </a:r>
             <a:endParaRPr lang="nb-NO"/>
@@ -1128,35 +1133,35 @@
           <a:p>
             <a:pPr lvl="0"/>
             <a:r>
-              <a:rPr lang="en-US" smtClean="0"/>
+              <a:rPr lang="en-US"/>
               <a:t>Edit Master text styles</a:t>
             </a:r>
           </a:p>
           <a:p>
             <a:pPr lvl="1"/>
             <a:r>
-              <a:rPr lang="en-US" smtClean="0"/>
+              <a:rPr lang="en-US"/>
               <a:t>Second level</a:t>
             </a:r>
           </a:p>
           <a:p>
             <a:pPr lvl="2"/>
             <a:r>
-              <a:rPr lang="en-US" smtClean="0"/>
+              <a:rPr lang="en-US"/>
               <a:t>Third level</a:t>
             </a:r>
           </a:p>
           <a:p>
             <a:pPr lvl="3"/>
             <a:r>
-              <a:rPr lang="en-US" smtClean="0"/>
+              <a:rPr lang="en-US"/>
               <a:t>Fourth level</a:t>
             </a:r>
           </a:p>
           <a:p>
             <a:pPr lvl="4"/>
             <a:r>
-              <a:rPr lang="en-US" smtClean="0"/>
+              <a:rPr lang="en-US"/>
               <a:t>Fifth level</a:t>
             </a:r>
             <a:endParaRPr lang="nb-NO"/>
@@ -1185,35 +1190,35 @@
           <a:p>
             <a:pPr lvl="0"/>
             <a:r>
-              <a:rPr lang="en-US" smtClean="0"/>
+              <a:rPr lang="en-US"/>
               <a:t>Edit Master text styles</a:t>
             </a:r>
           </a:p>
           <a:p>
             <a:pPr lvl="1"/>
             <a:r>
-              <a:rPr lang="en-US" smtClean="0"/>
+              <a:rPr lang="en-US"/>
               <a:t>Second level</a:t>
             </a:r>
           </a:p>
           <a:p>
             <a:pPr lvl="2"/>
             <a:r>
-              <a:rPr lang="en-US" smtClean="0"/>
+              <a:rPr lang="en-US"/>
               <a:t>Third level</a:t>
             </a:r>
           </a:p>
           <a:p>
             <a:pPr lvl="3"/>
             <a:r>
-              <a:rPr lang="en-US" smtClean="0"/>
+              <a:rPr lang="en-US"/>
               <a:t>Fourth level</a:t>
             </a:r>
           </a:p>
           <a:p>
             <a:pPr lvl="4"/>
             <a:r>
-              <a:rPr lang="en-US" smtClean="0"/>
+              <a:rPr lang="en-US"/>
               <a:t>Fifth level</a:t>
             </a:r>
             <a:endParaRPr lang="nb-NO"/>
@@ -1336,7 +1341,7 @@
           <a:lstStyle/>
           <a:p>
             <a:r>
-              <a:rPr lang="en-US" smtClean="0"/>
+              <a:rPr lang="en-US"/>
               <a:t>Click to edit Master title style</a:t>
             </a:r>
             <a:endParaRPr lang="nb-NO"/>
@@ -1402,7 +1407,7 @@
           <a:p>
             <a:pPr lvl="0"/>
             <a:r>
-              <a:rPr lang="en-US" smtClean="0"/>
+              <a:rPr lang="en-US"/>
               <a:t>Edit Master text styles</a:t>
             </a:r>
           </a:p>
@@ -1430,35 +1435,35 @@
           <a:p>
             <a:pPr lvl="0"/>
             <a:r>
-              <a:rPr lang="en-US" smtClean="0"/>
+              <a:rPr lang="en-US"/>
               <a:t>Edit Master text styles</a:t>
             </a:r>
           </a:p>
           <a:p>
             <a:pPr lvl="1"/>
             <a:r>
-              <a:rPr lang="en-US" smtClean="0"/>
+              <a:rPr lang="en-US"/>
               <a:t>Second level</a:t>
             </a:r>
           </a:p>
           <a:p>
             <a:pPr lvl="2"/>
             <a:r>
-              <a:rPr lang="en-US" smtClean="0"/>
+              <a:rPr lang="en-US"/>
               <a:t>Third level</a:t>
             </a:r>
           </a:p>
           <a:p>
             <a:pPr lvl="3"/>
             <a:r>
-              <a:rPr lang="en-US" smtClean="0"/>
+              <a:rPr lang="en-US"/>
               <a:t>Fourth level</a:t>
             </a:r>
           </a:p>
           <a:p>
             <a:pPr lvl="4"/>
             <a:r>
-              <a:rPr lang="en-US" smtClean="0"/>
+              <a:rPr lang="en-US"/>
               <a:t>Fifth level</a:t>
             </a:r>
             <a:endParaRPr lang="nb-NO"/>
@@ -1524,7 +1529,7 @@
           <a:p>
             <a:pPr lvl="0"/>
             <a:r>
-              <a:rPr lang="en-US" smtClean="0"/>
+              <a:rPr lang="en-US"/>
               <a:t>Edit Master text styles</a:t>
             </a:r>
           </a:p>
@@ -1552,35 +1557,35 @@
           <a:p>
             <a:pPr lvl="0"/>
             <a:r>
-              <a:rPr lang="en-US" smtClean="0"/>
+              <a:rPr lang="en-US"/>
               <a:t>Edit Master text styles</a:t>
             </a:r>
           </a:p>
           <a:p>
             <a:pPr lvl="1"/>
             <a:r>
-              <a:rPr lang="en-US" smtClean="0"/>
+              <a:rPr lang="en-US"/>
               <a:t>Second level</a:t>
             </a:r>
           </a:p>
           <a:p>
             <a:pPr lvl="2"/>
             <a:r>
-              <a:rPr lang="en-US" smtClean="0"/>
+              <a:rPr lang="en-US"/>
               <a:t>Third level</a:t>
             </a:r>
           </a:p>
           <a:p>
             <a:pPr lvl="3"/>
             <a:r>
-              <a:rPr lang="en-US" smtClean="0"/>
+              <a:rPr lang="en-US"/>
               <a:t>Fourth level</a:t>
             </a:r>
           </a:p>
           <a:p>
             <a:pPr lvl="4"/>
             <a:r>
-              <a:rPr lang="en-US" smtClean="0"/>
+              <a:rPr lang="en-US"/>
               <a:t>Fifth level</a:t>
             </a:r>
             <a:endParaRPr lang="nb-NO"/>
@@ -1698,7 +1703,7 @@
           <a:lstStyle/>
           <a:p>
             <a:r>
-              <a:rPr lang="en-US" smtClean="0"/>
+              <a:rPr lang="en-US"/>
               <a:t>Click to edit Master title style</a:t>
             </a:r>
             <a:endParaRPr lang="nb-NO"/>
@@ -1920,7 +1925,7 @@
           </a:lstStyle>
           <a:p>
             <a:r>
-              <a:rPr lang="en-US" smtClean="0"/>
+              <a:rPr lang="en-US"/>
               <a:t>Click to edit Master title style</a:t>
             </a:r>
             <a:endParaRPr lang="nb-NO"/>
@@ -1977,35 +1982,35 @@
           <a:p>
             <a:pPr lvl="0"/>
             <a:r>
-              <a:rPr lang="en-US" smtClean="0"/>
+              <a:rPr lang="en-US"/>
               <a:t>Edit Master text styles</a:t>
             </a:r>
           </a:p>
           <a:p>
             <a:pPr lvl="1"/>
             <a:r>
-              <a:rPr lang="en-US" smtClean="0"/>
+              <a:rPr lang="en-US"/>
               <a:t>Second level</a:t>
             </a:r>
           </a:p>
           <a:p>
             <a:pPr lvl="2"/>
             <a:r>
-              <a:rPr lang="en-US" smtClean="0"/>
+              <a:rPr lang="en-US"/>
               <a:t>Third level</a:t>
             </a:r>
           </a:p>
           <a:p>
             <a:pPr lvl="3"/>
             <a:r>
-              <a:rPr lang="en-US" smtClean="0"/>
+              <a:rPr lang="en-US"/>
               <a:t>Fourth level</a:t>
             </a:r>
           </a:p>
           <a:p>
             <a:pPr lvl="4"/>
             <a:r>
-              <a:rPr lang="en-US" smtClean="0"/>
+              <a:rPr lang="en-US"/>
               <a:t>Fifth level</a:t>
             </a:r>
             <a:endParaRPr lang="nb-NO"/>
@@ -2071,7 +2076,7 @@
           <a:p>
             <a:pPr lvl="0"/>
             <a:r>
-              <a:rPr lang="en-US" smtClean="0"/>
+              <a:rPr lang="en-US"/>
               <a:t>Edit Master text styles</a:t>
             </a:r>
           </a:p>
@@ -2197,7 +2202,7 @@
           </a:lstStyle>
           <a:p>
             <a:r>
-              <a:rPr lang="en-US" smtClean="0"/>
+              <a:rPr lang="en-US"/>
               <a:t>Click to edit Master title style</a:t>
             </a:r>
             <a:endParaRPr lang="nb-NO"/>
@@ -2324,7 +2329,7 @@
           <a:p>
             <a:pPr lvl="0"/>
             <a:r>
-              <a:rPr lang="en-US" smtClean="0"/>
+              <a:rPr lang="en-US"/>
               <a:t>Edit Master text styles</a:t>
             </a:r>
           </a:p>
@@ -2456,7 +2461,7 @@
           <a:lstStyle/>
           <a:p>
             <a:r>
-              <a:rPr lang="en-US" smtClean="0"/>
+              <a:rPr lang="en-US"/>
               <a:t>Click to edit Master title style</a:t>
             </a:r>
             <a:endParaRPr lang="nb-NO"/>
@@ -2490,35 +2495,35 @@
           <a:p>
             <a:pPr lvl="0"/>
             <a:r>
-              <a:rPr lang="en-US" smtClean="0"/>
+              <a:rPr lang="en-US"/>
               <a:t>Edit Master text styles</a:t>
             </a:r>
           </a:p>
           <a:p>
             <a:pPr lvl="1"/>
             <a:r>
-              <a:rPr lang="en-US" smtClean="0"/>
+              <a:rPr lang="en-US"/>
               <a:t>Second level</a:t>
             </a:r>
           </a:p>
           <a:p>
             <a:pPr lvl="2"/>
             <a:r>
-              <a:rPr lang="en-US" smtClean="0"/>
+              <a:rPr lang="en-US"/>
               <a:t>Third level</a:t>
             </a:r>
           </a:p>
           <a:p>
             <a:pPr lvl="3"/>
             <a:r>
-              <a:rPr lang="en-US" smtClean="0"/>
+              <a:rPr lang="en-US"/>
               <a:t>Fourth level</a:t>
             </a:r>
           </a:p>
           <a:p>
             <a:pPr lvl="4"/>
             <a:r>
-              <a:rPr lang="en-US" smtClean="0"/>
+              <a:rPr lang="en-US"/>
               <a:t>Fifth level</a:t>
             </a:r>
             <a:endParaRPr lang="nb-NO"/>

</xml_diff>

<commit_message>
Updated presentation and excel file
</commit_message>
<xml_diff>
--- a/Presentation_191025.pptx
+++ b/Presentation_191025.pptx
@@ -6,7 +6,9 @@
   </p:sldMasterIdLst>
   <p:sldIdLst>
     <p:sldId id="256" r:id="rId2"/>
-    <p:sldId id="257" r:id="rId3"/>
+    <p:sldId id="259" r:id="rId3"/>
+    <p:sldId id="257" r:id="rId4"/>
+    <p:sldId id="258" r:id="rId5"/>
   </p:sldIdLst>
   <p:sldSz cx="12192000" cy="6858000"/>
   <p:notesSz cx="6858000" cy="9144000"/>
@@ -111,6 +113,1472 @@
     </p:ext>
   </p:extLst>
 </p:presentation>
+</file>
+
+<file path=ppt/charts/chart1.xml><?xml version="1.0" encoding="utf-8"?>
+<c:chartSpace xmlns:c="http://schemas.openxmlformats.org/drawingml/2006/chart" xmlns:a="http://schemas.openxmlformats.org/drawingml/2006/main" xmlns:r="http://schemas.openxmlformats.org/officeDocument/2006/relationships" xmlns:c16r2="http://schemas.microsoft.com/office/drawing/2015/06/chart">
+  <c:date1904 val="0"/>
+  <c:lang val="en-GB"/>
+  <c:roundedCorners val="0"/>
+  <mc:AlternateContent xmlns:mc="http://schemas.openxmlformats.org/markup-compatibility/2006">
+    <mc:Choice xmlns:c14="http://schemas.microsoft.com/office/drawing/2007/8/2/chart" Requires="c14">
+      <c14:style val="102"/>
+    </mc:Choice>
+    <mc:Fallback>
+      <c:style val="2"/>
+    </mc:Fallback>
+  </mc:AlternateContent>
+  <c:chart>
+    <c:title>
+      <c:tx>
+        <c:rich>
+          <a:bodyPr rot="0" spcFirstLastPara="1" vertOverflow="ellipsis" vert="horz" wrap="square" anchor="ctr" anchorCtr="1"/>
+          <a:lstStyle/>
+          <a:p>
+            <a:pPr>
+              <a:defRPr sz="1920" b="0" i="0" u="none" strike="noStrike" kern="1200" spc="0" baseline="0">
+                <a:solidFill>
+                  <a:schemeClr val="tx1">
+                    <a:lumMod val="65000"/>
+                    <a:lumOff val="35000"/>
+                  </a:schemeClr>
+                </a:solidFill>
+                <a:latin typeface="+mn-lt"/>
+                <a:ea typeface="+mn-ea"/>
+                <a:cs typeface="+mn-cs"/>
+              </a:defRPr>
+            </a:pPr>
+            <a:r>
+              <a:rPr lang="en-GB"/>
+              <a:t>Useful Energy Demand [GWa]</a:t>
+            </a:r>
+          </a:p>
+        </c:rich>
+      </c:tx>
+      <c:overlay val="0"/>
+      <c:spPr>
+        <a:noFill/>
+        <a:ln>
+          <a:noFill/>
+        </a:ln>
+        <a:effectLst/>
+      </c:spPr>
+      <c:txPr>
+        <a:bodyPr rot="0" spcFirstLastPara="1" vertOverflow="ellipsis" vert="horz" wrap="square" anchor="ctr" anchorCtr="1"/>
+        <a:lstStyle/>
+        <a:p>
+          <a:pPr>
+            <a:defRPr sz="1920" b="0" i="0" u="none" strike="noStrike" kern="1200" spc="0" baseline="0">
+              <a:solidFill>
+                <a:schemeClr val="tx1">
+                  <a:lumMod val="65000"/>
+                  <a:lumOff val="35000"/>
+                </a:schemeClr>
+              </a:solidFill>
+              <a:latin typeface="+mn-lt"/>
+              <a:ea typeface="+mn-ea"/>
+              <a:cs typeface="+mn-cs"/>
+            </a:defRPr>
+          </a:pPr>
+          <a:endParaRPr lang="nb-NO"/>
+        </a:p>
+      </c:txPr>
+    </c:title>
+    <c:autoTitleDeleted val="0"/>
+    <c:plotArea>
+      <c:layout/>
+      <c:lineChart>
+        <c:grouping val="standard"/>
+        <c:varyColors val="0"/>
+        <c:ser>
+          <c:idx val="0"/>
+          <c:order val="0"/>
+          <c:tx>
+            <c:strRef>
+              <c:f>Sheet1!$B$1</c:f>
+              <c:strCache>
+                <c:ptCount val="1"/>
+                <c:pt idx="0">
+                  <c:v>Baseline</c:v>
+                </c:pt>
+              </c:strCache>
+            </c:strRef>
+          </c:tx>
+          <c:spPr>
+            <a:ln w="28575" cap="rnd">
+              <a:solidFill>
+                <a:schemeClr val="accent1"/>
+              </a:solidFill>
+              <a:round/>
+            </a:ln>
+            <a:effectLst/>
+          </c:spPr>
+          <c:marker>
+            <c:symbol val="circle"/>
+            <c:size val="5"/>
+            <c:spPr>
+              <a:solidFill>
+                <a:schemeClr val="accent1"/>
+              </a:solidFill>
+              <a:ln w="9525">
+                <a:solidFill>
+                  <a:schemeClr val="accent1"/>
+                </a:solidFill>
+              </a:ln>
+              <a:effectLst/>
+            </c:spPr>
+          </c:marker>
+          <c:dLbls>
+            <c:delete val="1"/>
+          </c:dLbls>
+          <c:cat>
+            <c:numRef>
+              <c:f>Sheet1!$A$2:$A$8</c:f>
+              <c:numCache>
+                <c:formatCode>General</c:formatCode>
+                <c:ptCount val="7"/>
+                <c:pt idx="0">
+                  <c:v>2010</c:v>
+                </c:pt>
+                <c:pt idx="1">
+                  <c:v>2020</c:v>
+                </c:pt>
+                <c:pt idx="2">
+                  <c:v>2030</c:v>
+                </c:pt>
+                <c:pt idx="3">
+                  <c:v>2040</c:v>
+                </c:pt>
+                <c:pt idx="4">
+                  <c:v>2050</c:v>
+                </c:pt>
+                <c:pt idx="5">
+                  <c:v>2060</c:v>
+                </c:pt>
+                <c:pt idx="6">
+                  <c:v>2070</c:v>
+                </c:pt>
+              </c:numCache>
+            </c:numRef>
+          </c:cat>
+          <c:val>
+            <c:numRef>
+              <c:f>Sheet1!$B$2:$B$8</c:f>
+              <c:numCache>
+                <c:formatCode>General</c:formatCode>
+                <c:ptCount val="7"/>
+                <c:pt idx="0">
+                  <c:v>51.409755499999996</c:v>
+                </c:pt>
+                <c:pt idx="1">
+                  <c:v>71.329882300000008</c:v>
+                </c:pt>
+                <c:pt idx="2">
+                  <c:v>92.5621838</c:v>
+                </c:pt>
+                <c:pt idx="3">
+                  <c:v>114.15445030000001</c:v>
+                </c:pt>
+                <c:pt idx="4">
+                  <c:v>135.13042970000001</c:v>
+                </c:pt>
+                <c:pt idx="5">
+                  <c:v>156.10640599999999</c:v>
+                </c:pt>
+                <c:pt idx="6">
+                  <c:v>177.0823785</c:v>
+                </c:pt>
+              </c:numCache>
+            </c:numRef>
+          </c:val>
+          <c:smooth val="0"/>
+          <c:extLst>
+            <c:ext xmlns:c16="http://schemas.microsoft.com/office/drawing/2014/chart" uri="{C3380CC4-5D6E-409C-BE32-E72D297353CC}">
+              <c16:uniqueId val="{00000000-D078-8D42-89AA-B75A93C963F4}"/>
+            </c:ext>
+          </c:extLst>
+        </c:ser>
+        <c:ser>
+          <c:idx val="1"/>
+          <c:order val="1"/>
+          <c:tx>
+            <c:strRef>
+              <c:f>Sheet1!$C$1</c:f>
+              <c:strCache>
+                <c:ptCount val="1"/>
+                <c:pt idx="0">
+                  <c:v>RCP1.9</c:v>
+                </c:pt>
+              </c:strCache>
+            </c:strRef>
+          </c:tx>
+          <c:spPr>
+            <a:ln w="28575" cap="rnd">
+              <a:solidFill>
+                <a:schemeClr val="accent2"/>
+              </a:solidFill>
+              <a:round/>
+            </a:ln>
+            <a:effectLst/>
+          </c:spPr>
+          <c:marker>
+            <c:symbol val="circle"/>
+            <c:size val="5"/>
+            <c:spPr>
+              <a:solidFill>
+                <a:schemeClr val="accent2"/>
+              </a:solidFill>
+              <a:ln w="9525">
+                <a:solidFill>
+                  <a:schemeClr val="accent2"/>
+                </a:solidFill>
+              </a:ln>
+              <a:effectLst/>
+            </c:spPr>
+          </c:marker>
+          <c:dLbls>
+            <c:delete val="1"/>
+          </c:dLbls>
+          <c:cat>
+            <c:numRef>
+              <c:f>Sheet1!$A$2:$A$8</c:f>
+              <c:numCache>
+                <c:formatCode>General</c:formatCode>
+                <c:ptCount val="7"/>
+                <c:pt idx="0">
+                  <c:v>2010</c:v>
+                </c:pt>
+                <c:pt idx="1">
+                  <c:v>2020</c:v>
+                </c:pt>
+                <c:pt idx="2">
+                  <c:v>2030</c:v>
+                </c:pt>
+                <c:pt idx="3">
+                  <c:v>2040</c:v>
+                </c:pt>
+                <c:pt idx="4">
+                  <c:v>2050</c:v>
+                </c:pt>
+                <c:pt idx="5">
+                  <c:v>2060</c:v>
+                </c:pt>
+                <c:pt idx="6">
+                  <c:v>2070</c:v>
+                </c:pt>
+              </c:numCache>
+            </c:numRef>
+          </c:cat>
+          <c:val>
+            <c:numRef>
+              <c:f>Sheet1!$C$2:$C$8</c:f>
+              <c:numCache>
+                <c:formatCode>General</c:formatCode>
+                <c:ptCount val="7"/>
+                <c:pt idx="0">
+                  <c:v>51.409755499999996</c:v>
+                </c:pt>
+                <c:pt idx="1">
+                  <c:v>71.329882300000008</c:v>
+                </c:pt>
+                <c:pt idx="2">
+                  <c:v>80.046033055223447</c:v>
+                </c:pt>
+                <c:pt idx="3">
+                  <c:v>82.261022141034488</c:v>
+                </c:pt>
+                <c:pt idx="4">
+                  <c:v>101.23563527584477</c:v>
+                </c:pt>
+                <c:pt idx="5">
+                  <c:v>116.02586018572084</c:v>
+                </c:pt>
+                <c:pt idx="6">
+                  <c:v>136.85855765491686</c:v>
+                </c:pt>
+              </c:numCache>
+            </c:numRef>
+          </c:val>
+          <c:smooth val="0"/>
+          <c:extLst>
+            <c:ext xmlns:c16="http://schemas.microsoft.com/office/drawing/2014/chart" uri="{C3380CC4-5D6E-409C-BE32-E72D297353CC}">
+              <c16:uniqueId val="{00000001-D078-8D42-89AA-B75A93C963F4}"/>
+            </c:ext>
+          </c:extLst>
+        </c:ser>
+        <c:ser>
+          <c:idx val="2"/>
+          <c:order val="2"/>
+          <c:tx>
+            <c:strRef>
+              <c:f>Sheet1!$D$1</c:f>
+              <c:strCache>
+                <c:ptCount val="1"/>
+                <c:pt idx="0">
+                  <c:v>RCP 2.6</c:v>
+                </c:pt>
+              </c:strCache>
+            </c:strRef>
+          </c:tx>
+          <c:spPr>
+            <a:ln w="28575" cap="rnd">
+              <a:solidFill>
+                <a:schemeClr val="accent3"/>
+              </a:solidFill>
+              <a:round/>
+            </a:ln>
+            <a:effectLst/>
+          </c:spPr>
+          <c:marker>
+            <c:symbol val="circle"/>
+            <c:size val="5"/>
+            <c:spPr>
+              <a:solidFill>
+                <a:schemeClr val="accent3"/>
+              </a:solidFill>
+              <a:ln w="9525">
+                <a:solidFill>
+                  <a:schemeClr val="accent3"/>
+                </a:solidFill>
+              </a:ln>
+              <a:effectLst/>
+            </c:spPr>
+          </c:marker>
+          <c:dLbls>
+            <c:delete val="1"/>
+          </c:dLbls>
+          <c:cat>
+            <c:numRef>
+              <c:f>Sheet1!$A$2:$A$8</c:f>
+              <c:numCache>
+                <c:formatCode>General</c:formatCode>
+                <c:ptCount val="7"/>
+                <c:pt idx="0">
+                  <c:v>2010</c:v>
+                </c:pt>
+                <c:pt idx="1">
+                  <c:v>2020</c:v>
+                </c:pt>
+                <c:pt idx="2">
+                  <c:v>2030</c:v>
+                </c:pt>
+                <c:pt idx="3">
+                  <c:v>2040</c:v>
+                </c:pt>
+                <c:pt idx="4">
+                  <c:v>2050</c:v>
+                </c:pt>
+                <c:pt idx="5">
+                  <c:v>2060</c:v>
+                </c:pt>
+                <c:pt idx="6">
+                  <c:v>2070</c:v>
+                </c:pt>
+              </c:numCache>
+            </c:numRef>
+          </c:cat>
+          <c:val>
+            <c:numRef>
+              <c:f>Sheet1!$D$2:$D$8</c:f>
+              <c:numCache>
+                <c:formatCode>General</c:formatCode>
+                <c:ptCount val="7"/>
+                <c:pt idx="0">
+                  <c:v>51.409755499999996</c:v>
+                </c:pt>
+                <c:pt idx="1">
+                  <c:v>71.329882300000008</c:v>
+                </c:pt>
+                <c:pt idx="2">
+                  <c:v>87.145659864349852</c:v>
+                </c:pt>
+                <c:pt idx="3">
+                  <c:v>98.130921429905356</c:v>
+                </c:pt>
+                <c:pt idx="4">
+                  <c:v>116.35858984234669</c:v>
+                </c:pt>
+                <c:pt idx="5">
+                  <c:v>126.90338608382454</c:v>
+                </c:pt>
+                <c:pt idx="6">
+                  <c:v>139.55258856777746</c:v>
+                </c:pt>
+              </c:numCache>
+            </c:numRef>
+          </c:val>
+          <c:smooth val="0"/>
+          <c:extLst>
+            <c:ext xmlns:c16="http://schemas.microsoft.com/office/drawing/2014/chart" uri="{C3380CC4-5D6E-409C-BE32-E72D297353CC}">
+              <c16:uniqueId val="{00000002-D078-8D42-89AA-B75A93C963F4}"/>
+            </c:ext>
+          </c:extLst>
+        </c:ser>
+        <c:ser>
+          <c:idx val="3"/>
+          <c:order val="3"/>
+          <c:tx>
+            <c:strRef>
+              <c:f>Sheet1!$E$1</c:f>
+              <c:strCache>
+                <c:ptCount val="1"/>
+                <c:pt idx="0">
+                  <c:v>RCP 3.4</c:v>
+                </c:pt>
+              </c:strCache>
+            </c:strRef>
+          </c:tx>
+          <c:spPr>
+            <a:ln w="28575" cap="rnd">
+              <a:solidFill>
+                <a:schemeClr val="accent4"/>
+              </a:solidFill>
+              <a:round/>
+            </a:ln>
+            <a:effectLst/>
+          </c:spPr>
+          <c:marker>
+            <c:symbol val="circle"/>
+            <c:size val="5"/>
+            <c:spPr>
+              <a:solidFill>
+                <a:schemeClr val="accent4"/>
+              </a:solidFill>
+              <a:ln w="9525">
+                <a:solidFill>
+                  <a:schemeClr val="accent4"/>
+                </a:solidFill>
+              </a:ln>
+              <a:effectLst/>
+            </c:spPr>
+          </c:marker>
+          <c:dLbls>
+            <c:delete val="1"/>
+          </c:dLbls>
+          <c:cat>
+            <c:numRef>
+              <c:f>Sheet1!$A$2:$A$8</c:f>
+              <c:numCache>
+                <c:formatCode>General</c:formatCode>
+                <c:ptCount val="7"/>
+                <c:pt idx="0">
+                  <c:v>2010</c:v>
+                </c:pt>
+                <c:pt idx="1">
+                  <c:v>2020</c:v>
+                </c:pt>
+                <c:pt idx="2">
+                  <c:v>2030</c:v>
+                </c:pt>
+                <c:pt idx="3">
+                  <c:v>2040</c:v>
+                </c:pt>
+                <c:pt idx="4">
+                  <c:v>2050</c:v>
+                </c:pt>
+                <c:pt idx="5">
+                  <c:v>2060</c:v>
+                </c:pt>
+                <c:pt idx="6">
+                  <c:v>2070</c:v>
+                </c:pt>
+              </c:numCache>
+            </c:numRef>
+          </c:cat>
+          <c:val>
+            <c:numRef>
+              <c:f>Sheet1!$E$2:$E$8</c:f>
+              <c:numCache>
+                <c:formatCode>General</c:formatCode>
+                <c:ptCount val="7"/>
+                <c:pt idx="0">
+                  <c:v>51.409755499999996</c:v>
+                </c:pt>
+                <c:pt idx="1">
+                  <c:v>71.329882300000008</c:v>
+                </c:pt>
+                <c:pt idx="2">
+                  <c:v>87.177886662923441</c:v>
+                </c:pt>
+                <c:pt idx="3">
+                  <c:v>102.59199145794778</c:v>
+                </c:pt>
+                <c:pt idx="4">
+                  <c:v>125.02231111798984</c:v>
+                </c:pt>
+                <c:pt idx="5">
+                  <c:v>136.59857003484916</c:v>
+                </c:pt>
+                <c:pt idx="6">
+                  <c:v>145.51471868276354</c:v>
+                </c:pt>
+              </c:numCache>
+            </c:numRef>
+          </c:val>
+          <c:smooth val="0"/>
+          <c:extLst>
+            <c:ext xmlns:c16="http://schemas.microsoft.com/office/drawing/2014/chart" uri="{C3380CC4-5D6E-409C-BE32-E72D297353CC}">
+              <c16:uniqueId val="{00000003-D078-8D42-89AA-B75A93C963F4}"/>
+            </c:ext>
+          </c:extLst>
+        </c:ser>
+        <c:ser>
+          <c:idx val="4"/>
+          <c:order val="4"/>
+          <c:tx>
+            <c:strRef>
+              <c:f>Sheet1!$F$1</c:f>
+              <c:strCache>
+                <c:ptCount val="1"/>
+                <c:pt idx="0">
+                  <c:v>RCP 4.5</c:v>
+                </c:pt>
+              </c:strCache>
+            </c:strRef>
+          </c:tx>
+          <c:spPr>
+            <a:ln w="28575" cap="rnd">
+              <a:solidFill>
+                <a:schemeClr val="accent5"/>
+              </a:solidFill>
+              <a:round/>
+            </a:ln>
+            <a:effectLst/>
+          </c:spPr>
+          <c:marker>
+            <c:symbol val="circle"/>
+            <c:size val="5"/>
+            <c:spPr>
+              <a:solidFill>
+                <a:schemeClr val="accent5"/>
+              </a:solidFill>
+              <a:ln w="9525">
+                <a:solidFill>
+                  <a:schemeClr val="accent5"/>
+                </a:solidFill>
+              </a:ln>
+              <a:effectLst/>
+            </c:spPr>
+          </c:marker>
+          <c:dLbls>
+            <c:delete val="1"/>
+          </c:dLbls>
+          <c:cat>
+            <c:numRef>
+              <c:f>Sheet1!$A$2:$A$8</c:f>
+              <c:numCache>
+                <c:formatCode>General</c:formatCode>
+                <c:ptCount val="7"/>
+                <c:pt idx="0">
+                  <c:v>2010</c:v>
+                </c:pt>
+                <c:pt idx="1">
+                  <c:v>2020</c:v>
+                </c:pt>
+                <c:pt idx="2">
+                  <c:v>2030</c:v>
+                </c:pt>
+                <c:pt idx="3">
+                  <c:v>2040</c:v>
+                </c:pt>
+                <c:pt idx="4">
+                  <c:v>2050</c:v>
+                </c:pt>
+                <c:pt idx="5">
+                  <c:v>2060</c:v>
+                </c:pt>
+                <c:pt idx="6">
+                  <c:v>2070</c:v>
+                </c:pt>
+              </c:numCache>
+            </c:numRef>
+          </c:cat>
+          <c:val>
+            <c:numRef>
+              <c:f>Sheet1!$F$2:$F$8</c:f>
+              <c:numCache>
+                <c:formatCode>General</c:formatCode>
+                <c:ptCount val="7"/>
+                <c:pt idx="0">
+                  <c:v>51.409755499999996</c:v>
+                </c:pt>
+                <c:pt idx="1">
+                  <c:v>71.329882300000008</c:v>
+                </c:pt>
+                <c:pt idx="2">
+                  <c:v>87.591556230269617</c:v>
+                </c:pt>
+                <c:pt idx="3">
+                  <c:v>104.60566359162063</c:v>
+                </c:pt>
+                <c:pt idx="4">
+                  <c:v>129.59874890272425</c:v>
+                </c:pt>
+                <c:pt idx="5">
+                  <c:v>146.4954818191874</c:v>
+                </c:pt>
+                <c:pt idx="6">
+                  <c:v>157.87738667362072</c:v>
+                </c:pt>
+              </c:numCache>
+            </c:numRef>
+          </c:val>
+          <c:smooth val="0"/>
+          <c:extLst>
+            <c:ext xmlns:c16="http://schemas.microsoft.com/office/drawing/2014/chart" uri="{C3380CC4-5D6E-409C-BE32-E72D297353CC}">
+              <c16:uniqueId val="{00000004-D078-8D42-89AA-B75A93C963F4}"/>
+            </c:ext>
+          </c:extLst>
+        </c:ser>
+        <c:ser>
+          <c:idx val="5"/>
+          <c:order val="5"/>
+          <c:tx>
+            <c:strRef>
+              <c:f>Sheet1!$G$1</c:f>
+              <c:strCache>
+                <c:ptCount val="1"/>
+                <c:pt idx="0">
+                  <c:v>RCP 6.0</c:v>
+                </c:pt>
+              </c:strCache>
+            </c:strRef>
+          </c:tx>
+          <c:spPr>
+            <a:ln w="28575" cap="rnd">
+              <a:solidFill>
+                <a:schemeClr val="accent6"/>
+              </a:solidFill>
+              <a:round/>
+            </a:ln>
+            <a:effectLst/>
+          </c:spPr>
+          <c:marker>
+            <c:symbol val="circle"/>
+            <c:size val="5"/>
+            <c:spPr>
+              <a:solidFill>
+                <a:schemeClr val="accent6"/>
+              </a:solidFill>
+              <a:ln w="9525">
+                <a:solidFill>
+                  <a:schemeClr val="accent6"/>
+                </a:solidFill>
+              </a:ln>
+              <a:effectLst/>
+            </c:spPr>
+          </c:marker>
+          <c:dLbls>
+            <c:delete val="1"/>
+          </c:dLbls>
+          <c:cat>
+            <c:numRef>
+              <c:f>Sheet1!$A$2:$A$8</c:f>
+              <c:numCache>
+                <c:formatCode>General</c:formatCode>
+                <c:ptCount val="7"/>
+                <c:pt idx="0">
+                  <c:v>2010</c:v>
+                </c:pt>
+                <c:pt idx="1">
+                  <c:v>2020</c:v>
+                </c:pt>
+                <c:pt idx="2">
+                  <c:v>2030</c:v>
+                </c:pt>
+                <c:pt idx="3">
+                  <c:v>2040</c:v>
+                </c:pt>
+                <c:pt idx="4">
+                  <c:v>2050</c:v>
+                </c:pt>
+                <c:pt idx="5">
+                  <c:v>2060</c:v>
+                </c:pt>
+                <c:pt idx="6">
+                  <c:v>2070</c:v>
+                </c:pt>
+              </c:numCache>
+            </c:numRef>
+          </c:cat>
+          <c:val>
+            <c:numRef>
+              <c:f>Sheet1!$G$2:$G$8</c:f>
+              <c:numCache>
+                <c:formatCode>General</c:formatCode>
+                <c:ptCount val="7"/>
+                <c:pt idx="0">
+                  <c:v>51.409755499999996</c:v>
+                </c:pt>
+                <c:pt idx="1">
+                  <c:v>71.329882300000008</c:v>
+                </c:pt>
+                <c:pt idx="2">
+                  <c:v>90.883415444095291</c:v>
+                </c:pt>
+                <c:pt idx="3">
+                  <c:v>113.30777391671347</c:v>
+                </c:pt>
+                <c:pt idx="4">
+                  <c:v>141.1841113809725</c:v>
+                </c:pt>
+                <c:pt idx="5">
+                  <c:v>160.77030042799049</c:v>
+                </c:pt>
+                <c:pt idx="6">
+                  <c:v>176.38704793720467</c:v>
+                </c:pt>
+              </c:numCache>
+            </c:numRef>
+          </c:val>
+          <c:smooth val="0"/>
+          <c:extLst>
+            <c:ext xmlns:c16="http://schemas.microsoft.com/office/drawing/2014/chart" uri="{C3380CC4-5D6E-409C-BE32-E72D297353CC}">
+              <c16:uniqueId val="{00000005-D078-8D42-89AA-B75A93C963F4}"/>
+            </c:ext>
+          </c:extLst>
+        </c:ser>
+        <c:dLbls>
+          <c:dLblPos val="ctr"/>
+          <c:showLegendKey val="0"/>
+          <c:showVal val="1"/>
+          <c:showCatName val="0"/>
+          <c:showSerName val="0"/>
+          <c:showPercent val="0"/>
+          <c:showBubbleSize val="0"/>
+        </c:dLbls>
+        <c:marker val="1"/>
+        <c:smooth val="0"/>
+        <c:axId val="704648415"/>
+        <c:axId val="704650047"/>
+      </c:lineChart>
+      <c:catAx>
+        <c:axId val="704648415"/>
+        <c:scaling>
+          <c:orientation val="minMax"/>
+        </c:scaling>
+        <c:delete val="0"/>
+        <c:axPos val="b"/>
+        <c:numFmt formatCode="General" sourceLinked="1"/>
+        <c:majorTickMark val="none"/>
+        <c:minorTickMark val="none"/>
+        <c:tickLblPos val="nextTo"/>
+        <c:spPr>
+          <a:noFill/>
+          <a:ln w="9525" cap="flat" cmpd="sng" algn="ctr">
+            <a:solidFill>
+              <a:schemeClr val="tx1">
+                <a:lumMod val="15000"/>
+                <a:lumOff val="85000"/>
+              </a:schemeClr>
+            </a:solidFill>
+            <a:round/>
+          </a:ln>
+          <a:effectLst/>
+        </c:spPr>
+        <c:txPr>
+          <a:bodyPr rot="-60000000" spcFirstLastPara="1" vertOverflow="ellipsis" vert="horz" wrap="square" anchor="ctr" anchorCtr="1"/>
+          <a:lstStyle/>
+          <a:p>
+            <a:pPr>
+              <a:defRPr sz="1600" b="0" i="0" u="none" strike="noStrike" kern="1200" baseline="0">
+                <a:solidFill>
+                  <a:schemeClr val="tx1">
+                    <a:lumMod val="65000"/>
+                    <a:lumOff val="35000"/>
+                  </a:schemeClr>
+                </a:solidFill>
+                <a:latin typeface="+mn-lt"/>
+                <a:ea typeface="+mn-ea"/>
+                <a:cs typeface="+mn-cs"/>
+              </a:defRPr>
+            </a:pPr>
+            <a:endParaRPr lang="nb-NO"/>
+          </a:p>
+        </c:txPr>
+        <c:crossAx val="704650047"/>
+        <c:crosses val="autoZero"/>
+        <c:auto val="1"/>
+        <c:lblAlgn val="ctr"/>
+        <c:lblOffset val="100"/>
+        <c:noMultiLvlLbl val="0"/>
+      </c:catAx>
+      <c:valAx>
+        <c:axId val="704650047"/>
+        <c:scaling>
+          <c:orientation val="minMax"/>
+        </c:scaling>
+        <c:delete val="0"/>
+        <c:axPos val="l"/>
+        <c:majorGridlines>
+          <c:spPr>
+            <a:ln w="9525" cap="flat" cmpd="sng" algn="ctr">
+              <a:solidFill>
+                <a:schemeClr val="tx1">
+                  <a:lumMod val="15000"/>
+                  <a:lumOff val="85000"/>
+                </a:schemeClr>
+              </a:solidFill>
+              <a:round/>
+            </a:ln>
+            <a:effectLst/>
+          </c:spPr>
+        </c:majorGridlines>
+        <c:numFmt formatCode="General" sourceLinked="1"/>
+        <c:majorTickMark val="none"/>
+        <c:minorTickMark val="none"/>
+        <c:tickLblPos val="nextTo"/>
+        <c:spPr>
+          <a:noFill/>
+          <a:ln>
+            <a:noFill/>
+          </a:ln>
+          <a:effectLst/>
+        </c:spPr>
+        <c:txPr>
+          <a:bodyPr rot="-60000000" spcFirstLastPara="1" vertOverflow="ellipsis" vert="horz" wrap="square" anchor="ctr" anchorCtr="1"/>
+          <a:lstStyle/>
+          <a:p>
+            <a:pPr>
+              <a:defRPr sz="1600" b="0" i="0" u="none" strike="noStrike" kern="1200" baseline="0">
+                <a:solidFill>
+                  <a:schemeClr val="tx1">
+                    <a:lumMod val="65000"/>
+                    <a:lumOff val="35000"/>
+                  </a:schemeClr>
+                </a:solidFill>
+                <a:latin typeface="+mn-lt"/>
+                <a:ea typeface="+mn-ea"/>
+                <a:cs typeface="+mn-cs"/>
+              </a:defRPr>
+            </a:pPr>
+            <a:endParaRPr lang="nb-NO"/>
+          </a:p>
+        </c:txPr>
+        <c:crossAx val="704648415"/>
+        <c:crosses val="autoZero"/>
+        <c:crossBetween val="between"/>
+      </c:valAx>
+      <c:spPr>
+        <a:noFill/>
+        <a:ln>
+          <a:noFill/>
+        </a:ln>
+        <a:effectLst/>
+      </c:spPr>
+    </c:plotArea>
+    <c:legend>
+      <c:legendPos val="r"/>
+      <c:overlay val="0"/>
+      <c:spPr>
+        <a:noFill/>
+        <a:ln>
+          <a:noFill/>
+        </a:ln>
+        <a:effectLst/>
+      </c:spPr>
+      <c:txPr>
+        <a:bodyPr rot="0" spcFirstLastPara="1" vertOverflow="ellipsis" vert="horz" wrap="square" anchor="ctr" anchorCtr="1"/>
+        <a:lstStyle/>
+        <a:p>
+          <a:pPr>
+            <a:defRPr sz="1600" b="0" i="0" u="none" strike="noStrike" kern="1200" baseline="0">
+              <a:solidFill>
+                <a:schemeClr val="tx1">
+                  <a:lumMod val="65000"/>
+                  <a:lumOff val="35000"/>
+                </a:schemeClr>
+              </a:solidFill>
+              <a:latin typeface="+mn-lt"/>
+              <a:ea typeface="+mn-ea"/>
+              <a:cs typeface="+mn-cs"/>
+            </a:defRPr>
+          </a:pPr>
+          <a:endParaRPr lang="nb-NO"/>
+        </a:p>
+      </c:txPr>
+    </c:legend>
+    <c:plotVisOnly val="1"/>
+    <c:dispBlanksAs val="gap"/>
+    <c:showDLblsOverMax val="0"/>
+  </c:chart>
+  <c:spPr>
+    <a:noFill/>
+    <a:ln>
+      <a:noFill/>
+    </a:ln>
+    <a:effectLst/>
+  </c:spPr>
+  <c:txPr>
+    <a:bodyPr/>
+    <a:lstStyle/>
+    <a:p>
+      <a:pPr>
+        <a:defRPr sz="1600"/>
+      </a:pPr>
+      <a:endParaRPr lang="nb-NO"/>
+    </a:p>
+  </c:txPr>
+  <c:externalData r:id="rId3">
+    <c:autoUpdate val="0"/>
+  </c:externalData>
+</c:chartSpace>
+</file>
+
+<file path=ppt/charts/colors1.xml><?xml version="1.0" encoding="utf-8"?>
+<cs:colorStyle xmlns:cs="http://schemas.microsoft.com/office/drawing/2012/chartStyle" xmlns:a="http://schemas.openxmlformats.org/drawingml/2006/main" meth="cycle" id="10">
+  <a:schemeClr val="accent1"/>
+  <a:schemeClr val="accent2"/>
+  <a:schemeClr val="accent3"/>
+  <a:schemeClr val="accent4"/>
+  <a:schemeClr val="accent5"/>
+  <a:schemeClr val="accent6"/>
+  <cs:variation/>
+  <cs:variation>
+    <a:lumMod val="60000"/>
+  </cs:variation>
+  <cs:variation>
+    <a:lumMod val="80000"/>
+    <a:lumOff val="20000"/>
+  </cs:variation>
+  <cs:variation>
+    <a:lumMod val="80000"/>
+  </cs:variation>
+  <cs:variation>
+    <a:lumMod val="60000"/>
+    <a:lumOff val="40000"/>
+  </cs:variation>
+  <cs:variation>
+    <a:lumMod val="50000"/>
+  </cs:variation>
+  <cs:variation>
+    <a:lumMod val="70000"/>
+    <a:lumOff val="30000"/>
+  </cs:variation>
+  <cs:variation>
+    <a:lumMod val="70000"/>
+  </cs:variation>
+  <cs:variation>
+    <a:lumMod val="50000"/>
+    <a:lumOff val="50000"/>
+  </cs:variation>
+</cs:colorStyle>
+</file>
+
+<file path=ppt/charts/style1.xml><?xml version="1.0" encoding="utf-8"?>
+<cs:chartStyle xmlns:cs="http://schemas.microsoft.com/office/drawing/2012/chartStyle" xmlns:a="http://schemas.openxmlformats.org/drawingml/2006/main" id="227">
+  <cs:axisTitle>
+    <cs:lnRef idx="0"/>
+    <cs:fillRef idx="0"/>
+    <cs:effectRef idx="0"/>
+    <cs:fontRef idx="minor">
+      <a:schemeClr val="tx1">
+        <a:lumMod val="65000"/>
+        <a:lumOff val="35000"/>
+      </a:schemeClr>
+    </cs:fontRef>
+    <cs:defRPr sz="1000" kern="1200"/>
+  </cs:axisTitle>
+  <cs:categoryAxis>
+    <cs:lnRef idx="0"/>
+    <cs:fillRef idx="0"/>
+    <cs:effectRef idx="0"/>
+    <cs:fontRef idx="minor">
+      <a:schemeClr val="tx1">
+        <a:lumMod val="65000"/>
+        <a:lumOff val="35000"/>
+      </a:schemeClr>
+    </cs:fontRef>
+    <cs:spPr>
+      <a:ln w="9525" cap="flat" cmpd="sng" algn="ctr">
+        <a:solidFill>
+          <a:schemeClr val="tx1">
+            <a:lumMod val="15000"/>
+            <a:lumOff val="85000"/>
+          </a:schemeClr>
+        </a:solidFill>
+        <a:round/>
+      </a:ln>
+    </cs:spPr>
+    <cs:defRPr sz="900" kern="1200"/>
+  </cs:categoryAxis>
+  <cs:chartArea mods="allowNoFillOverride allowNoLineOverride">
+    <cs:lnRef idx="0"/>
+    <cs:fillRef idx="0"/>
+    <cs:effectRef idx="0"/>
+    <cs:fontRef idx="minor">
+      <a:schemeClr val="tx1"/>
+    </cs:fontRef>
+    <cs:spPr>
+      <a:solidFill>
+        <a:schemeClr val="bg1"/>
+      </a:solidFill>
+      <a:ln w="9525" cap="flat" cmpd="sng" algn="ctr">
+        <a:solidFill>
+          <a:schemeClr val="tx1">
+            <a:lumMod val="15000"/>
+            <a:lumOff val="85000"/>
+          </a:schemeClr>
+        </a:solidFill>
+        <a:round/>
+      </a:ln>
+    </cs:spPr>
+    <cs:defRPr sz="1000" kern="1200"/>
+  </cs:chartArea>
+  <cs:dataLabel>
+    <cs:lnRef idx="0"/>
+    <cs:fillRef idx="0"/>
+    <cs:effectRef idx="0"/>
+    <cs:fontRef idx="minor">
+      <a:schemeClr val="tx1">
+        <a:lumMod val="75000"/>
+        <a:lumOff val="25000"/>
+      </a:schemeClr>
+    </cs:fontRef>
+    <cs:defRPr sz="900" kern="1200"/>
+  </cs:dataLabel>
+  <cs:dataLabelCallout>
+    <cs:lnRef idx="0"/>
+    <cs:fillRef idx="0"/>
+    <cs:effectRef idx="0"/>
+    <cs:fontRef idx="minor">
+      <a:schemeClr val="dk1">
+        <a:lumMod val="65000"/>
+        <a:lumOff val="35000"/>
+      </a:schemeClr>
+    </cs:fontRef>
+    <cs:spPr>
+      <a:solidFill>
+        <a:schemeClr val="lt1"/>
+      </a:solidFill>
+      <a:ln>
+        <a:solidFill>
+          <a:schemeClr val="dk1">
+            <a:lumMod val="25000"/>
+            <a:lumOff val="75000"/>
+          </a:schemeClr>
+        </a:solidFill>
+      </a:ln>
+    </cs:spPr>
+    <cs:defRPr sz="900" kern="1200"/>
+    <cs:bodyPr rot="0" spcFirstLastPara="1" vertOverflow="clip" horzOverflow="clip" vert="horz" wrap="square" lIns="36576" tIns="18288" rIns="36576" bIns="18288" anchor="ctr" anchorCtr="1">
+      <a:spAutoFit/>
+    </cs:bodyPr>
+  </cs:dataLabelCallout>
+  <cs:dataPoint>
+    <cs:lnRef idx="0"/>
+    <cs:fillRef idx="1">
+      <cs:styleClr val="auto"/>
+    </cs:fillRef>
+    <cs:effectRef idx="0"/>
+    <cs:fontRef idx="minor">
+      <a:schemeClr val="tx1"/>
+    </cs:fontRef>
+    <cs:spPr>
+      <a:solidFill>
+        <a:schemeClr val="phClr"/>
+      </a:solidFill>
+    </cs:spPr>
+  </cs:dataPoint>
+  <cs:dataPoint3D>
+    <cs:lnRef idx="0"/>
+    <cs:fillRef idx="1">
+      <cs:styleClr val="auto"/>
+    </cs:fillRef>
+    <cs:effectRef idx="0"/>
+    <cs:fontRef idx="minor">
+      <a:schemeClr val="tx1"/>
+    </cs:fontRef>
+    <cs:spPr>
+      <a:solidFill>
+        <a:schemeClr val="phClr"/>
+      </a:solidFill>
+    </cs:spPr>
+  </cs:dataPoint3D>
+  <cs:dataPointLine>
+    <cs:lnRef idx="0">
+      <cs:styleClr val="auto"/>
+    </cs:lnRef>
+    <cs:fillRef idx="1"/>
+    <cs:effectRef idx="0"/>
+    <cs:fontRef idx="minor">
+      <a:schemeClr val="tx1"/>
+    </cs:fontRef>
+    <cs:spPr>
+      <a:ln w="28575" cap="rnd">
+        <a:solidFill>
+          <a:schemeClr val="phClr"/>
+        </a:solidFill>
+        <a:round/>
+      </a:ln>
+    </cs:spPr>
+  </cs:dataPointLine>
+  <cs:dataPointMarker>
+    <cs:lnRef idx="0">
+      <cs:styleClr val="auto"/>
+    </cs:lnRef>
+    <cs:fillRef idx="1">
+      <cs:styleClr val="auto"/>
+    </cs:fillRef>
+    <cs:effectRef idx="0"/>
+    <cs:fontRef idx="minor">
+      <a:schemeClr val="tx1"/>
+    </cs:fontRef>
+    <cs:spPr>
+      <a:solidFill>
+        <a:schemeClr val="phClr"/>
+      </a:solidFill>
+      <a:ln w="9525">
+        <a:solidFill>
+          <a:schemeClr val="phClr"/>
+        </a:solidFill>
+      </a:ln>
+    </cs:spPr>
+  </cs:dataPointMarker>
+  <cs:dataPointMarkerLayout symbol="circle" size="5"/>
+  <cs:dataPointWireframe>
+    <cs:lnRef idx="0">
+      <cs:styleClr val="auto"/>
+    </cs:lnRef>
+    <cs:fillRef idx="1"/>
+    <cs:effectRef idx="0"/>
+    <cs:fontRef idx="minor">
+      <a:schemeClr val="tx1"/>
+    </cs:fontRef>
+    <cs:spPr>
+      <a:ln w="9525" cap="rnd">
+        <a:solidFill>
+          <a:schemeClr val="phClr"/>
+        </a:solidFill>
+        <a:round/>
+      </a:ln>
+    </cs:spPr>
+  </cs:dataPointWireframe>
+  <cs:dataTable>
+    <cs:lnRef idx="0"/>
+    <cs:fillRef idx="0"/>
+    <cs:effectRef idx="0"/>
+    <cs:fontRef idx="minor">
+      <a:schemeClr val="tx1">
+        <a:lumMod val="65000"/>
+        <a:lumOff val="35000"/>
+      </a:schemeClr>
+    </cs:fontRef>
+    <cs:spPr>
+      <a:noFill/>
+      <a:ln w="9525" cap="flat" cmpd="sng" algn="ctr">
+        <a:solidFill>
+          <a:schemeClr val="tx1">
+            <a:lumMod val="15000"/>
+            <a:lumOff val="85000"/>
+          </a:schemeClr>
+        </a:solidFill>
+        <a:round/>
+      </a:ln>
+    </cs:spPr>
+    <cs:defRPr sz="900" kern="1200"/>
+  </cs:dataTable>
+  <cs:downBar>
+    <cs:lnRef idx="0"/>
+    <cs:fillRef idx="0"/>
+    <cs:effectRef idx="0"/>
+    <cs:fontRef idx="minor">
+      <a:schemeClr val="dk1"/>
+    </cs:fontRef>
+    <cs:spPr>
+      <a:solidFill>
+        <a:schemeClr val="dk1">
+          <a:lumMod val="65000"/>
+          <a:lumOff val="35000"/>
+        </a:schemeClr>
+      </a:solidFill>
+      <a:ln w="9525">
+        <a:solidFill>
+          <a:schemeClr val="tx1">
+            <a:lumMod val="65000"/>
+            <a:lumOff val="35000"/>
+          </a:schemeClr>
+        </a:solidFill>
+      </a:ln>
+    </cs:spPr>
+  </cs:downBar>
+  <cs:dropLine>
+    <cs:lnRef idx="0"/>
+    <cs:fillRef idx="0"/>
+    <cs:effectRef idx="0"/>
+    <cs:fontRef idx="minor">
+      <a:schemeClr val="tx1"/>
+    </cs:fontRef>
+    <cs:spPr>
+      <a:ln w="9525" cap="flat" cmpd="sng" algn="ctr">
+        <a:solidFill>
+          <a:schemeClr val="tx1">
+            <a:lumMod val="35000"/>
+            <a:lumOff val="65000"/>
+          </a:schemeClr>
+        </a:solidFill>
+        <a:round/>
+      </a:ln>
+    </cs:spPr>
+  </cs:dropLine>
+  <cs:errorBar>
+    <cs:lnRef idx="0"/>
+    <cs:fillRef idx="0"/>
+    <cs:effectRef idx="0"/>
+    <cs:fontRef idx="minor">
+      <a:schemeClr val="tx1"/>
+    </cs:fontRef>
+    <cs:spPr>
+      <a:ln w="9525" cap="flat" cmpd="sng" algn="ctr">
+        <a:solidFill>
+          <a:schemeClr val="tx1">
+            <a:lumMod val="65000"/>
+            <a:lumOff val="35000"/>
+          </a:schemeClr>
+        </a:solidFill>
+        <a:round/>
+      </a:ln>
+    </cs:spPr>
+  </cs:errorBar>
+  <cs:floor>
+    <cs:lnRef idx="0"/>
+    <cs:fillRef idx="0"/>
+    <cs:effectRef idx="0"/>
+    <cs:fontRef idx="minor">
+      <a:schemeClr val="tx1"/>
+    </cs:fontRef>
+    <cs:spPr>
+      <a:noFill/>
+      <a:ln>
+        <a:noFill/>
+      </a:ln>
+    </cs:spPr>
+  </cs:floor>
+  <cs:gridlineMajor>
+    <cs:lnRef idx="0"/>
+    <cs:fillRef idx="0"/>
+    <cs:effectRef idx="0"/>
+    <cs:fontRef idx="minor">
+      <a:schemeClr val="tx1"/>
+    </cs:fontRef>
+    <cs:spPr>
+      <a:ln w="9525" cap="flat" cmpd="sng" algn="ctr">
+        <a:solidFill>
+          <a:schemeClr val="tx1">
+            <a:lumMod val="15000"/>
+            <a:lumOff val="85000"/>
+          </a:schemeClr>
+        </a:solidFill>
+        <a:round/>
+      </a:ln>
+    </cs:spPr>
+  </cs:gridlineMajor>
+  <cs:gridlineMinor>
+    <cs:lnRef idx="0"/>
+    <cs:fillRef idx="0"/>
+    <cs:effectRef idx="0"/>
+    <cs:fontRef idx="minor">
+      <a:schemeClr val="tx1"/>
+    </cs:fontRef>
+    <cs:spPr>
+      <a:ln w="9525" cap="flat" cmpd="sng" algn="ctr">
+        <a:solidFill>
+          <a:schemeClr val="tx1">
+            <a:lumMod val="5000"/>
+            <a:lumOff val="95000"/>
+          </a:schemeClr>
+        </a:solidFill>
+        <a:round/>
+      </a:ln>
+    </cs:spPr>
+  </cs:gridlineMinor>
+  <cs:hiLoLine>
+    <cs:lnRef idx="0"/>
+    <cs:fillRef idx="0"/>
+    <cs:effectRef idx="0"/>
+    <cs:fontRef idx="minor">
+      <a:schemeClr val="tx1"/>
+    </cs:fontRef>
+    <cs:spPr>
+      <a:ln w="9525" cap="flat" cmpd="sng" algn="ctr">
+        <a:solidFill>
+          <a:schemeClr val="tx1">
+            <a:lumMod val="75000"/>
+            <a:lumOff val="25000"/>
+          </a:schemeClr>
+        </a:solidFill>
+        <a:round/>
+      </a:ln>
+    </cs:spPr>
+  </cs:hiLoLine>
+  <cs:leaderLine>
+    <cs:lnRef idx="0"/>
+    <cs:fillRef idx="0"/>
+    <cs:effectRef idx="0"/>
+    <cs:fontRef idx="minor">
+      <a:schemeClr val="tx1"/>
+    </cs:fontRef>
+    <cs:spPr>
+      <a:ln w="9525" cap="flat" cmpd="sng" algn="ctr">
+        <a:solidFill>
+          <a:schemeClr val="tx1">
+            <a:lumMod val="35000"/>
+            <a:lumOff val="65000"/>
+          </a:schemeClr>
+        </a:solidFill>
+        <a:round/>
+      </a:ln>
+    </cs:spPr>
+  </cs:leaderLine>
+  <cs:legend>
+    <cs:lnRef idx="0"/>
+    <cs:fillRef idx="0"/>
+    <cs:effectRef idx="0"/>
+    <cs:fontRef idx="minor">
+      <a:schemeClr val="tx1">
+        <a:lumMod val="65000"/>
+        <a:lumOff val="35000"/>
+      </a:schemeClr>
+    </cs:fontRef>
+    <cs:defRPr sz="900" kern="1200"/>
+  </cs:legend>
+  <cs:plotArea mods="allowNoFillOverride allowNoLineOverride">
+    <cs:lnRef idx="0"/>
+    <cs:fillRef idx="0"/>
+    <cs:effectRef idx="0"/>
+    <cs:fontRef idx="minor">
+      <a:schemeClr val="tx1"/>
+    </cs:fontRef>
+  </cs:plotArea>
+  <cs:plotArea3D mods="allowNoFillOverride allowNoLineOverride">
+    <cs:lnRef idx="0"/>
+    <cs:fillRef idx="0"/>
+    <cs:effectRef idx="0"/>
+    <cs:fontRef idx="minor">
+      <a:schemeClr val="tx1"/>
+    </cs:fontRef>
+  </cs:plotArea3D>
+  <cs:seriesAxis>
+    <cs:lnRef idx="0"/>
+    <cs:fillRef idx="0"/>
+    <cs:effectRef idx="0"/>
+    <cs:fontRef idx="minor">
+      <a:schemeClr val="tx1">
+        <a:lumMod val="65000"/>
+        <a:lumOff val="35000"/>
+      </a:schemeClr>
+    </cs:fontRef>
+    <cs:defRPr sz="900" kern="1200"/>
+  </cs:seriesAxis>
+  <cs:seriesLine>
+    <cs:lnRef idx="0"/>
+    <cs:fillRef idx="0"/>
+    <cs:effectRef idx="0"/>
+    <cs:fontRef idx="minor">
+      <a:schemeClr val="tx1"/>
+    </cs:fontRef>
+    <cs:spPr>
+      <a:ln w="9525" cap="flat" cmpd="sng" algn="ctr">
+        <a:solidFill>
+          <a:schemeClr val="tx1">
+            <a:lumMod val="35000"/>
+            <a:lumOff val="65000"/>
+          </a:schemeClr>
+        </a:solidFill>
+        <a:round/>
+      </a:ln>
+    </cs:spPr>
+  </cs:seriesLine>
+  <cs:title>
+    <cs:lnRef idx="0"/>
+    <cs:fillRef idx="0"/>
+    <cs:effectRef idx="0"/>
+    <cs:fontRef idx="minor">
+      <a:schemeClr val="tx1">
+        <a:lumMod val="65000"/>
+        <a:lumOff val="35000"/>
+      </a:schemeClr>
+    </cs:fontRef>
+    <cs:defRPr sz="1400" b="0" kern="1200" spc="0" baseline="0"/>
+  </cs:title>
+  <cs:trendline>
+    <cs:lnRef idx="0">
+      <cs:styleClr val="auto"/>
+    </cs:lnRef>
+    <cs:fillRef idx="0"/>
+    <cs:effectRef idx="0"/>
+    <cs:fontRef idx="minor">
+      <a:schemeClr val="tx1"/>
+    </cs:fontRef>
+    <cs:spPr>
+      <a:ln w="19050" cap="rnd">
+        <a:solidFill>
+          <a:schemeClr val="phClr"/>
+        </a:solidFill>
+        <a:prstDash val="sysDot"/>
+      </a:ln>
+    </cs:spPr>
+  </cs:trendline>
+  <cs:trendlineLabel>
+    <cs:lnRef idx="0"/>
+    <cs:fillRef idx="0"/>
+    <cs:effectRef idx="0"/>
+    <cs:fontRef idx="minor">
+      <a:schemeClr val="tx1">
+        <a:lumMod val="65000"/>
+        <a:lumOff val="35000"/>
+      </a:schemeClr>
+    </cs:fontRef>
+    <cs:defRPr sz="900" kern="1200"/>
+  </cs:trendlineLabel>
+  <cs:upBar>
+    <cs:lnRef idx="0"/>
+    <cs:fillRef idx="0"/>
+    <cs:effectRef idx="0"/>
+    <cs:fontRef idx="minor">
+      <a:schemeClr val="dk1"/>
+    </cs:fontRef>
+    <cs:spPr>
+      <a:solidFill>
+        <a:schemeClr val="lt1"/>
+      </a:solidFill>
+      <a:ln w="9525">
+        <a:solidFill>
+          <a:schemeClr val="tx1">
+            <a:lumMod val="15000"/>
+            <a:lumOff val="85000"/>
+          </a:schemeClr>
+        </a:solidFill>
+      </a:ln>
+    </cs:spPr>
+  </cs:upBar>
+  <cs:valueAxis>
+    <cs:lnRef idx="0"/>
+    <cs:fillRef idx="0"/>
+    <cs:effectRef idx="0"/>
+    <cs:fontRef idx="minor">
+      <a:schemeClr val="tx1">
+        <a:lumMod val="65000"/>
+        <a:lumOff val="35000"/>
+      </a:schemeClr>
+    </cs:fontRef>
+    <cs:defRPr sz="900" kern="1200"/>
+  </cs:valueAxis>
+  <cs:wall>
+    <cs:lnRef idx="0"/>
+    <cs:fillRef idx="0"/>
+    <cs:effectRef idx="0"/>
+    <cs:fontRef idx="minor">
+      <a:schemeClr val="tx1"/>
+    </cs:fontRef>
+    <cs:spPr>
+      <a:noFill/>
+      <a:ln>
+        <a:noFill/>
+      </a:ln>
+    </cs:spPr>
+  </cs:wall>
+</cs:chartStyle>
 </file>
 
 <file path=ppt/slideLayouts/slideLayout1.xml><?xml version="1.0" encoding="utf-8"?>
@@ -3040,6 +4508,975 @@
       </p:grpSpPr>
       <p:sp>
         <p:nvSpPr>
+          <p:cNvPr id="2" name="Title 1">
+            <a:extLst>
+              <a:ext uri="{FF2B5EF4-FFF2-40B4-BE49-F238E27FC236}">
+                <a16:creationId xmlns:a16="http://schemas.microsoft.com/office/drawing/2014/main" id="{94FE2181-0FF0-FF4D-B38E-8925E20015BC}"/>
+              </a:ext>
+            </a:extLst>
+          </p:cNvPr>
+          <p:cNvSpPr>
+            <a:spLocks noGrp="1"/>
+          </p:cNvSpPr>
+          <p:nvPr>
+            <p:ph type="title"/>
+          </p:nvPr>
+        </p:nvSpPr>
+        <p:spPr/>
+        <p:txBody>
+          <a:bodyPr/>
+          <a:lstStyle/>
+          <a:p>
+            <a:r>
+              <a:rPr lang="en-GB" dirty="0"/>
+              <a:t>Calculating the Energy Demand</a:t>
+            </a:r>
+          </a:p>
+        </p:txBody>
+      </p:sp>
+      <mc:AlternateContent xmlns:mc="http://schemas.openxmlformats.org/markup-compatibility/2006">
+        <mc:Choice xmlns:a14="http://schemas.microsoft.com/office/drawing/2010/main" Requires="a14">
+          <p:sp>
+            <p:nvSpPr>
+              <p:cNvPr id="3" name="Content Placeholder 2">
+                <a:extLst>
+                  <a:ext uri="{FF2B5EF4-FFF2-40B4-BE49-F238E27FC236}">
+                    <a16:creationId xmlns:a16="http://schemas.microsoft.com/office/drawing/2014/main" id="{4AF57C2C-1504-6642-841D-BBE738466548}"/>
+                  </a:ext>
+                </a:extLst>
+              </p:cNvPr>
+              <p:cNvSpPr>
+                <a:spLocks noGrp="1"/>
+              </p:cNvSpPr>
+              <p:nvPr>
+                <p:ph idx="1"/>
+              </p:nvPr>
+            </p:nvSpPr>
+            <p:spPr>
+              <a:xfrm>
+                <a:off x="838200" y="1825625"/>
+                <a:ext cx="10515600" cy="1500505"/>
+              </a:xfrm>
+            </p:spPr>
+            <p:txBody>
+              <a:bodyPr/>
+              <a:lstStyle/>
+              <a:p>
+                <a:r>
+                  <a:rPr lang="en-GB" dirty="0"/>
+                  <a:t>Main assumption: GDP directly related to energy consumption</a:t>
+                </a:r>
+              </a:p>
+              <a:p>
+                <a:pPr marL="457200" lvl="1" indent="0">
+                  <a:buNone/>
+                </a:pPr>
+                <a:r>
+                  <a:rPr lang="en-GB" dirty="0"/>
+                  <a:t>		</a:t>
+                </a:r>
+                <a:r>
+                  <a:rPr lang="en-GB" dirty="0">
+                    <a:sym typeface="Wingdings" pitchFamily="2" charset="2"/>
+                  </a:rPr>
+                  <a:t> </a:t>
+                </a:r>
+                <a14:m>
+                  <m:oMath xmlns:m="http://schemas.openxmlformats.org/officeDocument/2006/math">
+                    <m:sSub>
+                      <m:sSubPr>
+                        <m:ctrlPr>
+                          <a:rPr lang="nb-NO" b="0" i="1" smtClean="0">
+                            <a:latin typeface="Cambria Math" panose="02040503050406030204" pitchFamily="18" charset="0"/>
+                            <a:sym typeface="Wingdings" pitchFamily="2" charset="2"/>
+                          </a:rPr>
+                        </m:ctrlPr>
+                      </m:sSubPr>
+                      <m:e>
+                        <m:r>
+                          <a:rPr lang="nb-NO" b="0" i="1" smtClean="0">
+                            <a:latin typeface="Cambria Math" panose="02040503050406030204" pitchFamily="18" charset="0"/>
+                            <a:sym typeface="Wingdings" pitchFamily="2" charset="2"/>
+                          </a:rPr>
+                          <m:t>𝐸</m:t>
+                        </m:r>
+                      </m:e>
+                      <m:sub>
+                        <m:r>
+                          <a:rPr lang="nb-NO" b="0" i="1" smtClean="0">
+                            <a:latin typeface="Cambria Math" panose="02040503050406030204" pitchFamily="18" charset="0"/>
+                            <a:sym typeface="Wingdings" pitchFamily="2" charset="2"/>
+                          </a:rPr>
+                          <m:t>𝑆𝐴</m:t>
+                        </m:r>
+                      </m:sub>
+                    </m:sSub>
+                    <m:d>
+                      <m:dPr>
+                        <m:ctrlPr>
+                          <a:rPr lang="nb-NO" b="0" i="1" smtClean="0">
+                            <a:latin typeface="Cambria Math" panose="02040503050406030204" pitchFamily="18" charset="0"/>
+                            <a:sym typeface="Wingdings" pitchFamily="2" charset="2"/>
+                          </a:rPr>
+                        </m:ctrlPr>
+                      </m:dPr>
+                      <m:e>
+                        <m:r>
+                          <a:rPr lang="nb-NO" b="0" i="1" smtClean="0">
+                            <a:latin typeface="Cambria Math" panose="02040503050406030204" pitchFamily="18" charset="0"/>
+                            <a:sym typeface="Wingdings" pitchFamily="2" charset="2"/>
+                          </a:rPr>
+                          <m:t>𝑡</m:t>
+                        </m:r>
+                      </m:e>
+                    </m:d>
+                    <m:r>
+                      <a:rPr lang="nb-NO" b="0" i="1" smtClean="0">
+                        <a:latin typeface="Cambria Math" panose="02040503050406030204" pitchFamily="18" charset="0"/>
+                        <a:sym typeface="Wingdings" pitchFamily="2" charset="2"/>
+                      </a:rPr>
+                      <m:t>=</m:t>
+                    </m:r>
+                    <m:sSub>
+                      <m:sSubPr>
+                        <m:ctrlPr>
+                          <a:rPr lang="nb-NO" b="0" i="1" smtClean="0">
+                            <a:latin typeface="Cambria Math" panose="02040503050406030204" pitchFamily="18" charset="0"/>
+                            <a:sym typeface="Wingdings" pitchFamily="2" charset="2"/>
+                          </a:rPr>
+                        </m:ctrlPr>
+                      </m:sSubPr>
+                      <m:e>
+                        <m:r>
+                          <a:rPr lang="nb-NO" b="0" i="1" smtClean="0">
+                            <a:latin typeface="Cambria Math" panose="02040503050406030204" pitchFamily="18" charset="0"/>
+                            <a:sym typeface="Wingdings" pitchFamily="2" charset="2"/>
+                          </a:rPr>
+                          <m:t>𝐸</m:t>
+                        </m:r>
+                      </m:e>
+                      <m:sub>
+                        <m:r>
+                          <a:rPr lang="nb-NO" b="0" i="1" smtClean="0">
+                            <a:latin typeface="Cambria Math" panose="02040503050406030204" pitchFamily="18" charset="0"/>
+                            <a:sym typeface="Wingdings" pitchFamily="2" charset="2"/>
+                          </a:rPr>
+                          <m:t>𝐴</m:t>
+                        </m:r>
+                      </m:sub>
+                    </m:sSub>
+                    <m:d>
+                      <m:dPr>
+                        <m:ctrlPr>
+                          <a:rPr lang="nb-NO" b="0" i="1" smtClean="0">
+                            <a:latin typeface="Cambria Math" panose="02040503050406030204" pitchFamily="18" charset="0"/>
+                            <a:sym typeface="Wingdings" pitchFamily="2" charset="2"/>
+                          </a:rPr>
+                        </m:ctrlPr>
+                      </m:dPr>
+                      <m:e>
+                        <m:r>
+                          <a:rPr lang="nb-NO" b="0" i="1" smtClean="0">
+                            <a:latin typeface="Cambria Math" panose="02040503050406030204" pitchFamily="18" charset="0"/>
+                            <a:sym typeface="Wingdings" pitchFamily="2" charset="2"/>
+                          </a:rPr>
+                          <m:t>𝑡</m:t>
+                        </m:r>
+                      </m:e>
+                    </m:d>
+                    <m:r>
+                      <a:rPr lang="nb-NO" i="1">
+                        <a:latin typeface="Cambria Math" panose="02040503050406030204" pitchFamily="18" charset="0"/>
+                        <a:ea typeface="Cambria Math" panose="02040503050406030204" pitchFamily="18" charset="0"/>
+                        <a:sym typeface="Wingdings" pitchFamily="2" charset="2"/>
+                      </a:rPr>
+                      <m:t>∙</m:t>
+                    </m:r>
+                    <m:r>
+                      <a:rPr lang="nb-NO" b="0" i="1" smtClean="0">
+                        <a:latin typeface="Cambria Math" panose="02040503050406030204" pitchFamily="18" charset="0"/>
+                        <a:ea typeface="Cambria Math" panose="02040503050406030204" pitchFamily="18" charset="0"/>
+                        <a:sym typeface="Wingdings" pitchFamily="2" charset="2"/>
+                      </a:rPr>
+                      <m:t> </m:t>
+                    </m:r>
+                    <m:f>
+                      <m:fPr>
+                        <m:ctrlPr>
+                          <a:rPr lang="nb-NO" b="0" i="1" smtClean="0">
+                            <a:latin typeface="Cambria Math" panose="02040503050406030204" pitchFamily="18" charset="0"/>
+                            <a:ea typeface="Cambria Math" panose="02040503050406030204" pitchFamily="18" charset="0"/>
+                            <a:sym typeface="Wingdings" pitchFamily="2" charset="2"/>
+                          </a:rPr>
+                        </m:ctrlPr>
+                      </m:fPr>
+                      <m:num>
+                        <m:r>
+                          <a:rPr lang="nb-NO" b="0" i="1" smtClean="0">
+                            <a:latin typeface="Cambria Math" panose="02040503050406030204" pitchFamily="18" charset="0"/>
+                            <a:ea typeface="Cambria Math" panose="02040503050406030204" pitchFamily="18" charset="0"/>
+                            <a:sym typeface="Wingdings" pitchFamily="2" charset="2"/>
+                          </a:rPr>
+                          <m:t>𝐺𝐷</m:t>
+                        </m:r>
+                        <m:sSub>
+                          <m:sSubPr>
+                            <m:ctrlPr>
+                              <a:rPr lang="nb-NO" b="0" i="1" smtClean="0">
+                                <a:latin typeface="Cambria Math" panose="02040503050406030204" pitchFamily="18" charset="0"/>
+                                <a:ea typeface="Cambria Math" panose="02040503050406030204" pitchFamily="18" charset="0"/>
+                                <a:sym typeface="Wingdings" pitchFamily="2" charset="2"/>
+                              </a:rPr>
+                            </m:ctrlPr>
+                          </m:sSubPr>
+                          <m:e>
+                            <m:r>
+                              <a:rPr lang="nb-NO" b="0" i="1" smtClean="0">
+                                <a:latin typeface="Cambria Math" panose="02040503050406030204" pitchFamily="18" charset="0"/>
+                                <a:ea typeface="Cambria Math" panose="02040503050406030204" pitchFamily="18" charset="0"/>
+                                <a:sym typeface="Wingdings" pitchFamily="2" charset="2"/>
+                              </a:rPr>
+                              <m:t>𝑃</m:t>
+                            </m:r>
+                          </m:e>
+                          <m:sub>
+                            <m:r>
+                              <a:rPr lang="nb-NO" b="0" i="1" smtClean="0">
+                                <a:latin typeface="Cambria Math" panose="02040503050406030204" pitchFamily="18" charset="0"/>
+                                <a:ea typeface="Cambria Math" panose="02040503050406030204" pitchFamily="18" charset="0"/>
+                                <a:sym typeface="Wingdings" pitchFamily="2" charset="2"/>
+                              </a:rPr>
+                              <m:t>𝑆𝐴</m:t>
+                            </m:r>
+                          </m:sub>
+                        </m:sSub>
+                        <m:d>
+                          <m:dPr>
+                            <m:ctrlPr>
+                              <a:rPr lang="nb-NO" b="0" i="1" smtClean="0">
+                                <a:latin typeface="Cambria Math" panose="02040503050406030204" pitchFamily="18" charset="0"/>
+                                <a:ea typeface="Cambria Math" panose="02040503050406030204" pitchFamily="18" charset="0"/>
+                                <a:sym typeface="Wingdings" pitchFamily="2" charset="2"/>
+                              </a:rPr>
+                            </m:ctrlPr>
+                          </m:dPr>
+                          <m:e>
+                            <m:r>
+                              <a:rPr lang="nb-NO" b="0" i="1" smtClean="0">
+                                <a:latin typeface="Cambria Math" panose="02040503050406030204" pitchFamily="18" charset="0"/>
+                                <a:ea typeface="Cambria Math" panose="02040503050406030204" pitchFamily="18" charset="0"/>
+                                <a:sym typeface="Wingdings" pitchFamily="2" charset="2"/>
+                              </a:rPr>
+                              <m:t>𝑡</m:t>
+                            </m:r>
+                          </m:e>
+                        </m:d>
+                      </m:num>
+                      <m:den>
+                        <m:r>
+                          <a:rPr lang="nb-NO" b="0" i="1" smtClean="0">
+                            <a:latin typeface="Cambria Math" panose="02040503050406030204" pitchFamily="18" charset="0"/>
+                            <a:ea typeface="Cambria Math" panose="02040503050406030204" pitchFamily="18" charset="0"/>
+                            <a:sym typeface="Wingdings" pitchFamily="2" charset="2"/>
+                          </a:rPr>
+                          <m:t>𝐺𝐷</m:t>
+                        </m:r>
+                        <m:sSub>
+                          <m:sSubPr>
+                            <m:ctrlPr>
+                              <a:rPr lang="nb-NO" b="0" i="1" smtClean="0">
+                                <a:latin typeface="Cambria Math" panose="02040503050406030204" pitchFamily="18" charset="0"/>
+                                <a:ea typeface="Cambria Math" panose="02040503050406030204" pitchFamily="18" charset="0"/>
+                                <a:sym typeface="Wingdings" pitchFamily="2" charset="2"/>
+                              </a:rPr>
+                            </m:ctrlPr>
+                          </m:sSubPr>
+                          <m:e>
+                            <m:r>
+                              <a:rPr lang="nb-NO" b="0" i="1" smtClean="0">
+                                <a:latin typeface="Cambria Math" panose="02040503050406030204" pitchFamily="18" charset="0"/>
+                                <a:ea typeface="Cambria Math" panose="02040503050406030204" pitchFamily="18" charset="0"/>
+                                <a:sym typeface="Wingdings" pitchFamily="2" charset="2"/>
+                              </a:rPr>
+                              <m:t>𝑃</m:t>
+                            </m:r>
+                          </m:e>
+                          <m:sub>
+                            <m:r>
+                              <a:rPr lang="nb-NO" b="0" i="1" smtClean="0">
+                                <a:latin typeface="Cambria Math" panose="02040503050406030204" pitchFamily="18" charset="0"/>
+                                <a:ea typeface="Cambria Math" panose="02040503050406030204" pitchFamily="18" charset="0"/>
+                                <a:sym typeface="Wingdings" pitchFamily="2" charset="2"/>
+                              </a:rPr>
+                              <m:t>𝐴</m:t>
+                            </m:r>
+                          </m:sub>
+                        </m:sSub>
+                        <m:d>
+                          <m:dPr>
+                            <m:ctrlPr>
+                              <a:rPr lang="nb-NO" b="0" i="1" smtClean="0">
+                                <a:latin typeface="Cambria Math" panose="02040503050406030204" pitchFamily="18" charset="0"/>
+                                <a:ea typeface="Cambria Math" panose="02040503050406030204" pitchFamily="18" charset="0"/>
+                                <a:sym typeface="Wingdings" pitchFamily="2" charset="2"/>
+                              </a:rPr>
+                            </m:ctrlPr>
+                          </m:dPr>
+                          <m:e>
+                            <m:r>
+                              <a:rPr lang="nb-NO" b="0" i="1" smtClean="0">
+                                <a:latin typeface="Cambria Math" panose="02040503050406030204" pitchFamily="18" charset="0"/>
+                                <a:ea typeface="Cambria Math" panose="02040503050406030204" pitchFamily="18" charset="0"/>
+                                <a:sym typeface="Wingdings" pitchFamily="2" charset="2"/>
+                              </a:rPr>
+                              <m:t>𝑡</m:t>
+                            </m:r>
+                          </m:e>
+                        </m:d>
+                      </m:den>
+                    </m:f>
+                    <m:r>
+                      <a:rPr lang="nb-NO" b="0" i="1" smtClean="0">
+                        <a:latin typeface="Cambria Math" panose="02040503050406030204" pitchFamily="18" charset="0"/>
+                        <a:ea typeface="Cambria Math" panose="02040503050406030204" pitchFamily="18" charset="0"/>
+                        <a:sym typeface="Wingdings" pitchFamily="2" charset="2"/>
+                      </a:rPr>
+                      <m:t>∙ </m:t>
+                    </m:r>
+                    <m:r>
+                      <a:rPr lang="nb-NO" b="0" i="1" smtClean="0">
+                        <a:latin typeface="Cambria Math" panose="02040503050406030204" pitchFamily="18" charset="0"/>
+                        <a:ea typeface="Cambria Math" panose="02040503050406030204" pitchFamily="18" charset="0"/>
+                        <a:sym typeface="Wingdings" pitchFamily="2" charset="2"/>
+                      </a:rPr>
+                      <m:t>𝜂</m:t>
+                    </m:r>
+                    <m:r>
+                      <a:rPr lang="nb-NO" b="0" i="1" smtClean="0">
+                        <a:latin typeface="Cambria Math" panose="02040503050406030204" pitchFamily="18" charset="0"/>
+                        <a:ea typeface="Cambria Math" panose="02040503050406030204" pitchFamily="18" charset="0"/>
+                        <a:sym typeface="Wingdings" pitchFamily="2" charset="2"/>
+                      </a:rPr>
+                      <m:t>(</m:t>
+                    </m:r>
+                    <m:r>
+                      <a:rPr lang="nb-NO" b="0" i="1" smtClean="0">
+                        <a:latin typeface="Cambria Math" panose="02040503050406030204" pitchFamily="18" charset="0"/>
+                        <a:ea typeface="Cambria Math" panose="02040503050406030204" pitchFamily="18" charset="0"/>
+                        <a:sym typeface="Wingdings" pitchFamily="2" charset="2"/>
+                      </a:rPr>
+                      <m:t>𝑡</m:t>
+                    </m:r>
+                    <m:r>
+                      <a:rPr lang="nb-NO" b="0" i="1" smtClean="0">
+                        <a:latin typeface="Cambria Math" panose="02040503050406030204" pitchFamily="18" charset="0"/>
+                        <a:ea typeface="Cambria Math" panose="02040503050406030204" pitchFamily="18" charset="0"/>
+                        <a:sym typeface="Wingdings" pitchFamily="2" charset="2"/>
+                      </a:rPr>
+                      <m:t>)</m:t>
+                    </m:r>
+                  </m:oMath>
+                </a14:m>
+                <a:endParaRPr lang="en-GB" dirty="0"/>
+              </a:p>
+            </p:txBody>
+          </p:sp>
+        </mc:Choice>
+        <mc:Fallback>
+          <p:sp>
+            <p:nvSpPr>
+              <p:cNvPr id="3" name="Content Placeholder 2">
+                <a:extLst>
+                  <a:ext uri="{FF2B5EF4-FFF2-40B4-BE49-F238E27FC236}">
+                    <a16:creationId xmlns:a16="http://schemas.microsoft.com/office/drawing/2014/main" id="{4AF57C2C-1504-6642-841D-BBE738466548}"/>
+                  </a:ext>
+                </a:extLst>
+              </p:cNvPr>
+              <p:cNvSpPr>
+                <a:spLocks noGrp="1" noRot="1" noChangeAspect="1" noMove="1" noResize="1" noEditPoints="1" noAdjustHandles="1" noChangeArrowheads="1" noChangeShapeType="1" noTextEdit="1"/>
+              </p:cNvSpPr>
+              <p:nvPr>
+                <p:ph idx="1"/>
+              </p:nvPr>
+            </p:nvSpPr>
+            <p:spPr>
+              <a:xfrm>
+                <a:off x="838200" y="1825625"/>
+                <a:ext cx="10515600" cy="1500505"/>
+              </a:xfrm>
+              <a:blipFill>
+                <a:blip r:embed="rId2"/>
+                <a:stretch>
+                  <a:fillRect l="-965" t="-7627"/>
+                </a:stretch>
+              </a:blipFill>
+            </p:spPr>
+            <p:txBody>
+              <a:bodyPr/>
+              <a:lstStyle/>
+              <a:p>
+                <a:r>
+                  <a:rPr lang="en-GB">
+                    <a:noFill/>
+                  </a:rPr>
+                  <a:t> </a:t>
+                </a:r>
+              </a:p>
+            </p:txBody>
+          </p:sp>
+        </mc:Fallback>
+      </mc:AlternateContent>
+      <p:cxnSp>
+        <p:nvCxnSpPr>
+          <p:cNvPr id="5" name="Straight Arrow Connector 4">
+            <a:extLst>
+              <a:ext uri="{FF2B5EF4-FFF2-40B4-BE49-F238E27FC236}">
+                <a16:creationId xmlns:a16="http://schemas.microsoft.com/office/drawing/2014/main" id="{89FC0C5F-0705-1B48-B016-5EA83638866B}"/>
+              </a:ext>
+            </a:extLst>
+          </p:cNvPr>
+          <p:cNvCxnSpPr/>
+          <p:nvPr/>
+        </p:nvCxnSpPr>
+        <p:spPr>
+          <a:xfrm flipV="1">
+            <a:off x="2240280" y="2811780"/>
+            <a:ext cx="960120" cy="1062990"/>
+          </a:xfrm>
+          <a:prstGeom prst="straightConnector1">
+            <a:avLst/>
+          </a:prstGeom>
+          <a:ln>
+            <a:tailEnd type="triangle"/>
+          </a:ln>
+        </p:spPr>
+        <p:style>
+          <a:lnRef idx="1">
+            <a:schemeClr val="accent2"/>
+          </a:lnRef>
+          <a:fillRef idx="0">
+            <a:schemeClr val="accent2"/>
+          </a:fillRef>
+          <a:effectRef idx="0">
+            <a:schemeClr val="accent2"/>
+          </a:effectRef>
+          <a:fontRef idx="minor">
+            <a:schemeClr val="tx1"/>
+          </a:fontRef>
+        </p:style>
+      </p:cxnSp>
+      <p:sp>
+        <p:nvSpPr>
+          <p:cNvPr id="6" name="TextBox 5">
+            <a:extLst>
+              <a:ext uri="{FF2B5EF4-FFF2-40B4-BE49-F238E27FC236}">
+                <a16:creationId xmlns:a16="http://schemas.microsoft.com/office/drawing/2014/main" id="{21B9E36C-371D-894A-A453-6B4840BA1AE9}"/>
+              </a:ext>
+            </a:extLst>
+          </p:cNvPr>
+          <p:cNvSpPr txBox="1"/>
+          <p:nvPr/>
+        </p:nvSpPr>
+        <p:spPr>
+          <a:xfrm>
+            <a:off x="1525904" y="3946525"/>
+            <a:ext cx="2417445" cy="646331"/>
+          </a:xfrm>
+          <a:prstGeom prst="rect">
+            <a:avLst/>
+          </a:prstGeom>
+          <a:noFill/>
+        </p:spPr>
+        <p:txBody>
+          <a:bodyPr wrap="square" rtlCol="0">
+            <a:spAutoFit/>
+          </a:bodyPr>
+          <a:lstStyle/>
+          <a:p>
+            <a:r>
+              <a:rPr lang="en-GB" dirty="0"/>
+              <a:t>Useful energy demand in SA</a:t>
+            </a:r>
+          </a:p>
+        </p:txBody>
+      </p:sp>
+      <p:sp>
+        <p:nvSpPr>
+          <p:cNvPr id="7" name="TextBox 6">
+            <a:extLst>
+              <a:ext uri="{FF2B5EF4-FFF2-40B4-BE49-F238E27FC236}">
+                <a16:creationId xmlns:a16="http://schemas.microsoft.com/office/drawing/2014/main" id="{50A9E699-240A-3C4E-AD61-C1D6B5F94063}"/>
+              </a:ext>
+            </a:extLst>
+          </p:cNvPr>
+          <p:cNvSpPr txBox="1"/>
+          <p:nvPr/>
+        </p:nvSpPr>
+        <p:spPr>
+          <a:xfrm>
+            <a:off x="7039930" y="3946524"/>
+            <a:ext cx="2417445" cy="369332"/>
+          </a:xfrm>
+          <a:prstGeom prst="rect">
+            <a:avLst/>
+          </a:prstGeom>
+          <a:noFill/>
+        </p:spPr>
+        <p:txBody>
+          <a:bodyPr wrap="square" rtlCol="0">
+            <a:spAutoFit/>
+          </a:bodyPr>
+          <a:lstStyle/>
+          <a:p>
+            <a:r>
+              <a:rPr lang="en-GB" dirty="0"/>
+              <a:t>Efficiency</a:t>
+            </a:r>
+          </a:p>
+        </p:txBody>
+      </p:sp>
+      <p:cxnSp>
+        <p:nvCxnSpPr>
+          <p:cNvPr id="8" name="Straight Arrow Connector 7">
+            <a:extLst>
+              <a:ext uri="{FF2B5EF4-FFF2-40B4-BE49-F238E27FC236}">
+                <a16:creationId xmlns:a16="http://schemas.microsoft.com/office/drawing/2014/main" id="{9582EE6B-CE2E-3249-905C-C01D421231E9}"/>
+              </a:ext>
+            </a:extLst>
+          </p:cNvPr>
+          <p:cNvCxnSpPr>
+            <a:cxnSpLocks/>
+          </p:cNvCxnSpPr>
+          <p:nvPr/>
+        </p:nvCxnSpPr>
+        <p:spPr>
+          <a:xfrm flipV="1">
+            <a:off x="4602480" y="2828290"/>
+            <a:ext cx="0" cy="1118235"/>
+          </a:xfrm>
+          <a:prstGeom prst="straightConnector1">
+            <a:avLst/>
+          </a:prstGeom>
+          <a:ln>
+            <a:tailEnd type="triangle"/>
+          </a:ln>
+        </p:spPr>
+        <p:style>
+          <a:lnRef idx="1">
+            <a:schemeClr val="accent2"/>
+          </a:lnRef>
+          <a:fillRef idx="0">
+            <a:schemeClr val="accent2"/>
+          </a:fillRef>
+          <a:effectRef idx="0">
+            <a:schemeClr val="accent2"/>
+          </a:effectRef>
+          <a:fontRef idx="minor">
+            <a:schemeClr val="tx1"/>
+          </a:fontRef>
+        </p:style>
+      </p:cxnSp>
+      <p:cxnSp>
+        <p:nvCxnSpPr>
+          <p:cNvPr id="10" name="Straight Arrow Connector 9">
+            <a:extLst>
+              <a:ext uri="{FF2B5EF4-FFF2-40B4-BE49-F238E27FC236}">
+                <a16:creationId xmlns:a16="http://schemas.microsoft.com/office/drawing/2014/main" id="{232D4EF7-8633-E74A-A405-9AEC5A7DACE6}"/>
+              </a:ext>
+            </a:extLst>
+          </p:cNvPr>
+          <p:cNvCxnSpPr>
+            <a:cxnSpLocks/>
+          </p:cNvCxnSpPr>
+          <p:nvPr/>
+        </p:nvCxnSpPr>
+        <p:spPr>
+          <a:xfrm flipH="1" flipV="1">
+            <a:off x="6964681" y="2867343"/>
+            <a:ext cx="533399" cy="1007427"/>
+          </a:xfrm>
+          <a:prstGeom prst="straightConnector1">
+            <a:avLst/>
+          </a:prstGeom>
+          <a:ln>
+            <a:tailEnd type="triangle"/>
+          </a:ln>
+        </p:spPr>
+        <p:style>
+          <a:lnRef idx="1">
+            <a:schemeClr val="accent2"/>
+          </a:lnRef>
+          <a:fillRef idx="0">
+            <a:schemeClr val="accent2"/>
+          </a:fillRef>
+          <a:effectRef idx="0">
+            <a:schemeClr val="accent2"/>
+          </a:effectRef>
+          <a:fontRef idx="minor">
+            <a:schemeClr val="tx1"/>
+          </a:fontRef>
+        </p:style>
+      </p:cxnSp>
+      <p:sp>
+        <p:nvSpPr>
+          <p:cNvPr id="12" name="TextBox 11">
+            <a:extLst>
+              <a:ext uri="{FF2B5EF4-FFF2-40B4-BE49-F238E27FC236}">
+                <a16:creationId xmlns:a16="http://schemas.microsoft.com/office/drawing/2014/main" id="{A71A0B63-73C1-FC4E-9C3D-296E69558482}"/>
+              </a:ext>
+            </a:extLst>
+          </p:cNvPr>
+          <p:cNvSpPr txBox="1"/>
+          <p:nvPr/>
+        </p:nvSpPr>
+        <p:spPr>
+          <a:xfrm>
+            <a:off x="3796664" y="3992690"/>
+            <a:ext cx="2417445" cy="369332"/>
+          </a:xfrm>
+          <a:prstGeom prst="rect">
+            <a:avLst/>
+          </a:prstGeom>
+          <a:noFill/>
+        </p:spPr>
+        <p:txBody>
+          <a:bodyPr wrap="square" rtlCol="0">
+            <a:spAutoFit/>
+          </a:bodyPr>
+          <a:lstStyle/>
+          <a:p>
+            <a:r>
+              <a:rPr lang="en-GB" dirty="0"/>
+              <a:t>Final demand in Africa</a:t>
+            </a:r>
+          </a:p>
+        </p:txBody>
+      </p:sp>
+      <mc:AlternateContent xmlns:mc="http://schemas.openxmlformats.org/markup-compatibility/2006">
+        <mc:Choice xmlns:a14="http://schemas.microsoft.com/office/drawing/2010/main" Requires="a14">
+          <p:sp>
+            <p:nvSpPr>
+              <p:cNvPr id="13" name="Content Placeholder 2">
+                <a:extLst>
+                  <a:ext uri="{FF2B5EF4-FFF2-40B4-BE49-F238E27FC236}">
+                    <a16:creationId xmlns:a16="http://schemas.microsoft.com/office/drawing/2014/main" id="{7B143C5A-6BC4-CA4B-8F65-9C6DEE604B52}"/>
+                  </a:ext>
+                </a:extLst>
+              </p:cNvPr>
+              <p:cNvSpPr txBox="1">
+                <a:spLocks/>
+              </p:cNvSpPr>
+              <p:nvPr/>
+            </p:nvSpPr>
+            <p:spPr>
+              <a:xfrm>
+                <a:off x="838200" y="4949190"/>
+                <a:ext cx="10515600" cy="1500505"/>
+              </a:xfrm>
+              <a:prstGeom prst="rect">
+                <a:avLst/>
+              </a:prstGeom>
+            </p:spPr>
+            <p:txBody>
+              <a:bodyPr vert="horz" lIns="91440" tIns="45720" rIns="91440" bIns="45720" rtlCol="0">
+                <a:normAutofit/>
+              </a:bodyPr>
+              <a:lstStyle>
+                <a:lvl1pPr marL="228600" indent="-228600" algn="l" defTabSz="914400" rtl="0" eaLnBrk="1" latinLnBrk="0" hangingPunct="1">
+                  <a:lnSpc>
+                    <a:spcPct val="90000"/>
+                  </a:lnSpc>
+                  <a:spcBef>
+                    <a:spcPts val="1000"/>
+                  </a:spcBef>
+                  <a:buFont typeface="Arial" panose="020B0604020202020204" pitchFamily="34" charset="0"/>
+                  <a:buChar char="•"/>
+                  <a:defRPr sz="2800" kern="1200">
+                    <a:solidFill>
+                      <a:schemeClr val="tx1"/>
+                    </a:solidFill>
+                    <a:latin typeface="+mn-lt"/>
+                    <a:ea typeface="+mn-ea"/>
+                    <a:cs typeface="+mn-cs"/>
+                  </a:defRPr>
+                </a:lvl1pPr>
+                <a:lvl2pPr marL="685800" indent="-228600" algn="l" defTabSz="914400" rtl="0" eaLnBrk="1" latinLnBrk="0" hangingPunct="1">
+                  <a:lnSpc>
+                    <a:spcPct val="90000"/>
+                  </a:lnSpc>
+                  <a:spcBef>
+                    <a:spcPts val="500"/>
+                  </a:spcBef>
+                  <a:buFont typeface="Arial" panose="020B0604020202020204" pitchFamily="34" charset="0"/>
+                  <a:buChar char="•"/>
+                  <a:defRPr sz="2400" kern="1200">
+                    <a:solidFill>
+                      <a:schemeClr val="tx1"/>
+                    </a:solidFill>
+                    <a:latin typeface="+mn-lt"/>
+                    <a:ea typeface="+mn-ea"/>
+                    <a:cs typeface="+mn-cs"/>
+                  </a:defRPr>
+                </a:lvl2pPr>
+                <a:lvl3pPr marL="1143000" indent="-228600" algn="l" defTabSz="914400" rtl="0" eaLnBrk="1" latinLnBrk="0" hangingPunct="1">
+                  <a:lnSpc>
+                    <a:spcPct val="90000"/>
+                  </a:lnSpc>
+                  <a:spcBef>
+                    <a:spcPts val="500"/>
+                  </a:spcBef>
+                  <a:buFont typeface="Arial" panose="020B0604020202020204" pitchFamily="34" charset="0"/>
+                  <a:buChar char="•"/>
+                  <a:defRPr sz="2000" kern="1200">
+                    <a:solidFill>
+                      <a:schemeClr val="tx1"/>
+                    </a:solidFill>
+                    <a:latin typeface="+mn-lt"/>
+                    <a:ea typeface="+mn-ea"/>
+                    <a:cs typeface="+mn-cs"/>
+                  </a:defRPr>
+                </a:lvl3pPr>
+                <a:lvl4pPr marL="1600200" indent="-228600" algn="l" defTabSz="914400" rtl="0" eaLnBrk="1" latinLnBrk="0" hangingPunct="1">
+                  <a:lnSpc>
+                    <a:spcPct val="90000"/>
+                  </a:lnSpc>
+                  <a:spcBef>
+                    <a:spcPts val="500"/>
+                  </a:spcBef>
+                  <a:buFont typeface="Arial" panose="020B0604020202020204" pitchFamily="34" charset="0"/>
+                  <a:buChar char="•"/>
+                  <a:defRPr sz="1800" kern="1200">
+                    <a:solidFill>
+                      <a:schemeClr val="tx1"/>
+                    </a:solidFill>
+                    <a:latin typeface="+mn-lt"/>
+                    <a:ea typeface="+mn-ea"/>
+                    <a:cs typeface="+mn-cs"/>
+                  </a:defRPr>
+                </a:lvl4pPr>
+                <a:lvl5pPr marL="2057400" indent="-228600" algn="l" defTabSz="914400" rtl="0" eaLnBrk="1" latinLnBrk="0" hangingPunct="1">
+                  <a:lnSpc>
+                    <a:spcPct val="90000"/>
+                  </a:lnSpc>
+                  <a:spcBef>
+                    <a:spcPts val="500"/>
+                  </a:spcBef>
+                  <a:buFont typeface="Arial" panose="020B0604020202020204" pitchFamily="34" charset="0"/>
+                  <a:buChar char="•"/>
+                  <a:defRPr sz="1800" kern="1200">
+                    <a:solidFill>
+                      <a:schemeClr val="tx1"/>
+                    </a:solidFill>
+                    <a:latin typeface="+mn-lt"/>
+                    <a:ea typeface="+mn-ea"/>
+                    <a:cs typeface="+mn-cs"/>
+                  </a:defRPr>
+                </a:lvl5pPr>
+                <a:lvl6pPr marL="2514600" indent="-228600" algn="l" defTabSz="914400" rtl="0" eaLnBrk="1" latinLnBrk="0" hangingPunct="1">
+                  <a:lnSpc>
+                    <a:spcPct val="90000"/>
+                  </a:lnSpc>
+                  <a:spcBef>
+                    <a:spcPts val="500"/>
+                  </a:spcBef>
+                  <a:buFont typeface="Arial" panose="020B0604020202020204" pitchFamily="34" charset="0"/>
+                  <a:buChar char="•"/>
+                  <a:defRPr sz="1800" kern="1200">
+                    <a:solidFill>
+                      <a:schemeClr val="tx1"/>
+                    </a:solidFill>
+                    <a:latin typeface="+mn-lt"/>
+                    <a:ea typeface="+mn-ea"/>
+                    <a:cs typeface="+mn-cs"/>
+                  </a:defRPr>
+                </a:lvl6pPr>
+                <a:lvl7pPr marL="2971800" indent="-228600" algn="l" defTabSz="914400" rtl="0" eaLnBrk="1" latinLnBrk="0" hangingPunct="1">
+                  <a:lnSpc>
+                    <a:spcPct val="90000"/>
+                  </a:lnSpc>
+                  <a:spcBef>
+                    <a:spcPts val="500"/>
+                  </a:spcBef>
+                  <a:buFont typeface="Arial" panose="020B0604020202020204" pitchFamily="34" charset="0"/>
+                  <a:buChar char="•"/>
+                  <a:defRPr sz="1800" kern="1200">
+                    <a:solidFill>
+                      <a:schemeClr val="tx1"/>
+                    </a:solidFill>
+                    <a:latin typeface="+mn-lt"/>
+                    <a:ea typeface="+mn-ea"/>
+                    <a:cs typeface="+mn-cs"/>
+                  </a:defRPr>
+                </a:lvl7pPr>
+                <a:lvl8pPr marL="3429000" indent="-228600" algn="l" defTabSz="914400" rtl="0" eaLnBrk="1" latinLnBrk="0" hangingPunct="1">
+                  <a:lnSpc>
+                    <a:spcPct val="90000"/>
+                  </a:lnSpc>
+                  <a:spcBef>
+                    <a:spcPts val="500"/>
+                  </a:spcBef>
+                  <a:buFont typeface="Arial" panose="020B0604020202020204" pitchFamily="34" charset="0"/>
+                  <a:buChar char="•"/>
+                  <a:defRPr sz="1800" kern="1200">
+                    <a:solidFill>
+                      <a:schemeClr val="tx1"/>
+                    </a:solidFill>
+                    <a:latin typeface="+mn-lt"/>
+                    <a:ea typeface="+mn-ea"/>
+                    <a:cs typeface="+mn-cs"/>
+                  </a:defRPr>
+                </a:lvl8pPr>
+                <a:lvl9pPr marL="3886200" indent="-228600" algn="l" defTabSz="914400" rtl="0" eaLnBrk="1" latinLnBrk="0" hangingPunct="1">
+                  <a:lnSpc>
+                    <a:spcPct val="90000"/>
+                  </a:lnSpc>
+                  <a:spcBef>
+                    <a:spcPts val="500"/>
+                  </a:spcBef>
+                  <a:buFont typeface="Arial" panose="020B0604020202020204" pitchFamily="34" charset="0"/>
+                  <a:buChar char="•"/>
+                  <a:defRPr sz="1800" kern="1200">
+                    <a:solidFill>
+                      <a:schemeClr val="tx1"/>
+                    </a:solidFill>
+                    <a:latin typeface="+mn-lt"/>
+                    <a:ea typeface="+mn-ea"/>
+                    <a:cs typeface="+mn-cs"/>
+                  </a:defRPr>
+                </a:lvl9pPr>
+              </a:lstStyle>
+              <a:p>
+                <a:pPr marL="0" indent="0">
+                  <a:buNone/>
+                </a:pPr>
+                <a:r>
+                  <a:rPr lang="en-GB" dirty="0"/>
+                  <a:t>		</a:t>
+                </a:r>
+                <a:r>
+                  <a:rPr lang="en-GB" dirty="0">
+                    <a:sym typeface="Wingdings" pitchFamily="2" charset="2"/>
+                  </a:rPr>
+                  <a:t> </a:t>
+                </a:r>
+                <a14:m>
+                  <m:oMath xmlns:m="http://schemas.openxmlformats.org/officeDocument/2006/math">
+                    <m:r>
+                      <a:rPr lang="en-GB" i="1" smtClean="0">
+                        <a:latin typeface="Cambria Math" panose="02040503050406030204" pitchFamily="18" charset="0"/>
+                        <a:ea typeface="Cambria Math" panose="02040503050406030204" pitchFamily="18" charset="0"/>
+                        <a:sym typeface="Wingdings" pitchFamily="2" charset="2"/>
+                      </a:rPr>
+                      <m:t>𝜂</m:t>
+                    </m:r>
+                    <m:d>
+                      <m:dPr>
+                        <m:ctrlPr>
+                          <a:rPr lang="nb-NO" b="0" i="1" smtClean="0">
+                            <a:latin typeface="Cambria Math" panose="02040503050406030204" pitchFamily="18" charset="0"/>
+                            <a:ea typeface="Cambria Math" panose="02040503050406030204" pitchFamily="18" charset="0"/>
+                            <a:sym typeface="Wingdings" pitchFamily="2" charset="2"/>
+                          </a:rPr>
+                        </m:ctrlPr>
+                      </m:dPr>
+                      <m:e>
+                        <m:r>
+                          <a:rPr lang="nb-NO" b="0" i="1" smtClean="0">
+                            <a:latin typeface="Cambria Math" panose="02040503050406030204" pitchFamily="18" charset="0"/>
+                            <a:ea typeface="Cambria Math" panose="02040503050406030204" pitchFamily="18" charset="0"/>
+                            <a:sym typeface="Wingdings" pitchFamily="2" charset="2"/>
+                          </a:rPr>
+                          <m:t>𝑡</m:t>
+                        </m:r>
+                      </m:e>
+                    </m:d>
+                  </m:oMath>
+                </a14:m>
+                <a:r>
+                  <a:rPr lang="en-GB" dirty="0"/>
+                  <a:t> derived from final energy demand vs useful energy 			demand and assumed to increase by 15% annually</a:t>
+                </a:r>
+              </a:p>
+            </p:txBody>
+          </p:sp>
+        </mc:Choice>
+        <mc:Fallback>
+          <p:sp>
+            <p:nvSpPr>
+              <p:cNvPr id="13" name="Content Placeholder 2">
+                <a:extLst>
+                  <a:ext uri="{FF2B5EF4-FFF2-40B4-BE49-F238E27FC236}">
+                    <a16:creationId xmlns:a16="http://schemas.microsoft.com/office/drawing/2014/main" id="{7B143C5A-6BC4-CA4B-8F65-9C6DEE604B52}"/>
+                  </a:ext>
+                </a:extLst>
+              </p:cNvPr>
+              <p:cNvSpPr txBox="1">
+                <a:spLocks noRot="1" noChangeAspect="1" noMove="1" noResize="1" noEditPoints="1" noAdjustHandles="1" noChangeArrowheads="1" noChangeShapeType="1" noTextEdit="1"/>
+              </p:cNvSpPr>
+              <p:nvPr/>
+            </p:nvSpPr>
+            <p:spPr>
+              <a:xfrm>
+                <a:off x="838200" y="4949190"/>
+                <a:ext cx="10515600" cy="1500505"/>
+              </a:xfrm>
+              <a:prstGeom prst="rect">
+                <a:avLst/>
+              </a:prstGeom>
+              <a:blipFill>
+                <a:blip r:embed="rId3"/>
+                <a:stretch>
+                  <a:fillRect t="-7563" r="-1568"/>
+                </a:stretch>
+              </a:blipFill>
+            </p:spPr>
+            <p:txBody>
+              <a:bodyPr/>
+              <a:lstStyle/>
+              <a:p>
+                <a:r>
+                  <a:rPr lang="en-GB">
+                    <a:noFill/>
+                  </a:rPr>
+                  <a:t> </a:t>
+                </a:r>
+              </a:p>
+            </p:txBody>
+          </p:sp>
+        </mc:Fallback>
+      </mc:AlternateContent>
+    </p:spTree>
+    <p:extLst>
+      <p:ext uri="{BB962C8B-B14F-4D97-AF65-F5344CB8AC3E}">
+        <p14:creationId xmlns:p14="http://schemas.microsoft.com/office/powerpoint/2010/main" val="1157045177"/>
+      </p:ext>
+    </p:extLst>
+  </p:cSld>
+  <p:clrMapOvr>
+    <a:masterClrMapping/>
+  </p:clrMapOvr>
+</p:sld>
+</file>
+
+<file path=ppt/slides/slide3.xml><?xml version="1.0" encoding="utf-8"?>
+<p:sld xmlns:a="http://schemas.openxmlformats.org/drawingml/2006/main" xmlns:r="http://schemas.openxmlformats.org/officeDocument/2006/relationships" xmlns:p="http://schemas.openxmlformats.org/presentationml/2006/main">
+  <p:cSld>
+    <p:spTree>
+      <p:nvGrpSpPr>
+        <p:cNvPr id="1" name=""/>
+        <p:cNvGrpSpPr/>
+        <p:nvPr/>
+      </p:nvGrpSpPr>
+      <p:grpSpPr>
+        <a:xfrm>
+          <a:off x="0" y="0"/>
+          <a:ext cx="0" cy="0"/>
+          <a:chOff x="0" y="0"/>
+          <a:chExt cx="0" cy="0"/>
+        </a:xfrm>
+      </p:grpSpPr>
+      <p:sp>
+        <p:nvSpPr>
           <p:cNvPr id="2" name="Title 1"/>
           <p:cNvSpPr>
             <a:spLocks noGrp="1"/>
@@ -3074,7 +5511,7 @@
         <p:spPr>
           <a:xfrm>
             <a:off x="838200" y="365125"/>
-            <a:ext cx="10802305" cy="6492875"/>
+            <a:ext cx="10798853" cy="6490800"/>
           </a:xfrm>
           <a:prstGeom prst="rect">
             <a:avLst/>
@@ -3085,6 +5522,110 @@
     <p:extLst>
       <p:ext uri="{BB962C8B-B14F-4D97-AF65-F5344CB8AC3E}">
         <p14:creationId xmlns:p14="http://schemas.microsoft.com/office/powerpoint/2010/main" val="523972765"/>
+      </p:ext>
+    </p:extLst>
+  </p:cSld>
+  <p:clrMapOvr>
+    <a:masterClrMapping/>
+  </p:clrMapOvr>
+</p:sld>
+</file>
+
+<file path=ppt/slides/slide4.xml><?xml version="1.0" encoding="utf-8"?>
+<p:sld xmlns:a="http://schemas.openxmlformats.org/drawingml/2006/main" xmlns:r="http://schemas.openxmlformats.org/officeDocument/2006/relationships" xmlns:p="http://schemas.openxmlformats.org/presentationml/2006/main">
+  <p:cSld>
+    <p:bg>
+      <p:bgPr>
+        <a:solidFill>
+          <a:schemeClr val="bg1"/>
+        </a:solidFill>
+        <a:effectLst/>
+      </p:bgPr>
+    </p:bg>
+    <p:spTree>
+      <p:nvGrpSpPr>
+        <p:cNvPr id="1" name=""/>
+        <p:cNvGrpSpPr/>
+        <p:nvPr/>
+      </p:nvGrpSpPr>
+      <p:grpSpPr>
+        <a:xfrm>
+          <a:off x="0" y="0"/>
+          <a:ext cx="0" cy="0"/>
+          <a:chOff x="0" y="0"/>
+          <a:chExt cx="0" cy="0"/>
+        </a:xfrm>
+      </p:grpSpPr>
+      <p:sp>
+        <p:nvSpPr>
+          <p:cNvPr id="2" name="Title 1">
+            <a:extLst>
+              <a:ext uri="{FF2B5EF4-FFF2-40B4-BE49-F238E27FC236}">
+                <a16:creationId xmlns:a16="http://schemas.microsoft.com/office/drawing/2014/main" id="{D3397AA6-CDB2-5045-9649-AA127C0557DA}"/>
+              </a:ext>
+            </a:extLst>
+          </p:cNvPr>
+          <p:cNvSpPr>
+            <a:spLocks noGrp="1"/>
+          </p:cNvSpPr>
+          <p:nvPr>
+            <p:ph type="title"/>
+          </p:nvPr>
+        </p:nvSpPr>
+        <p:spPr>
+          <a:xfrm>
+            <a:off x="838200" y="365125"/>
+            <a:ext cx="10515600" cy="1325563"/>
+          </a:xfrm>
+        </p:spPr>
+        <p:txBody>
+          <a:bodyPr>
+            <a:normAutofit/>
+          </a:bodyPr>
+          <a:lstStyle/>
+          <a:p>
+            <a:r>
+              <a:rPr lang="en-GB" sz="4400"/>
+              <a:t>RCP Scenarios within SSP5</a:t>
+            </a:r>
+          </a:p>
+        </p:txBody>
+      </p:sp>
+      <p:graphicFrame>
+        <p:nvGraphicFramePr>
+          <p:cNvPr id="24" name="Content Placeholder 20">
+            <a:extLst>
+              <a:ext uri="{FF2B5EF4-FFF2-40B4-BE49-F238E27FC236}">
+                <a16:creationId xmlns:a16="http://schemas.microsoft.com/office/drawing/2014/main" id="{382A9A00-1D74-9542-ABBB-4A54FFDE34B7}"/>
+              </a:ext>
+            </a:extLst>
+          </p:cNvPr>
+          <p:cNvGraphicFramePr>
+            <a:graphicFrameLocks noGrp="1"/>
+          </p:cNvGraphicFramePr>
+          <p:nvPr>
+            <p:ph idx="1"/>
+            <p:extLst>
+              <p:ext uri="{D42A27DB-BD31-4B8C-83A1-F6EECF244321}">
+                <p14:modId xmlns:p14="http://schemas.microsoft.com/office/powerpoint/2010/main" val="2064159403"/>
+              </p:ext>
+            </p:extLst>
+          </p:nvPr>
+        </p:nvGraphicFramePr>
+        <p:xfrm>
+          <a:off x="838200" y="1825625"/>
+          <a:ext cx="10515600" cy="4351338"/>
+        </p:xfrm>
+        <a:graphic>
+          <a:graphicData uri="http://schemas.openxmlformats.org/drawingml/2006/chart">
+            <c:chart xmlns:c="http://schemas.openxmlformats.org/drawingml/2006/chart" xmlns:r="http://schemas.openxmlformats.org/officeDocument/2006/relationships" r:id="rId2"/>
+          </a:graphicData>
+        </a:graphic>
+      </p:graphicFrame>
+    </p:spTree>
+    <p:extLst>
+      <p:ext uri="{BB962C8B-B14F-4D97-AF65-F5344CB8AC3E}">
+        <p14:creationId xmlns:p14="http://schemas.microsoft.com/office/powerpoint/2010/main" val="186779586"/>
       </p:ext>
     </p:extLst>
   </p:cSld>

</xml_diff>

<commit_message>
Added graphs and stuff
</commit_message>
<xml_diff>
--- a/Presentation_191025.pptx
+++ b/Presentation_191025.pptx
@@ -6,9 +6,12 @@
   </p:sldMasterIdLst>
   <p:sldIdLst>
     <p:sldId id="256" r:id="rId2"/>
-    <p:sldId id="259" r:id="rId3"/>
-    <p:sldId id="257" r:id="rId4"/>
-    <p:sldId id="258" r:id="rId5"/>
+    <p:sldId id="261" r:id="rId3"/>
+    <p:sldId id="259" r:id="rId4"/>
+    <p:sldId id="257" r:id="rId5"/>
+    <p:sldId id="258" r:id="rId6"/>
+    <p:sldId id="262" r:id="rId7"/>
+    <p:sldId id="260" r:id="rId8"/>
   </p:sldIdLst>
   <p:sldSz cx="12192000" cy="6858000"/>
   <p:notesSz cx="6858000" cy="9144000"/>
@@ -1025,7 +1028,1221 @@
 </c:chartSpace>
 </file>
 
+<file path=ppt/charts/chart2.xml><?xml version="1.0" encoding="utf-8"?>
+<c:chartSpace xmlns:c="http://schemas.openxmlformats.org/drawingml/2006/chart" xmlns:a="http://schemas.openxmlformats.org/drawingml/2006/main" xmlns:r="http://schemas.openxmlformats.org/officeDocument/2006/relationships" xmlns:c16r2="http://schemas.microsoft.com/office/drawing/2015/06/chart">
+  <c:date1904 val="0"/>
+  <c:lang val="en-GB"/>
+  <c:roundedCorners val="0"/>
+  <mc:AlternateContent xmlns:mc="http://schemas.openxmlformats.org/markup-compatibility/2006">
+    <mc:Choice xmlns:c14="http://schemas.microsoft.com/office/drawing/2007/8/2/chart" Requires="c14">
+      <c14:style val="102"/>
+    </mc:Choice>
+    <mc:Fallback>
+      <c:style val="2"/>
+    </mc:Fallback>
+  </mc:AlternateContent>
+  <c:chart>
+    <c:title>
+      <c:tx>
+        <c:rich>
+          <a:bodyPr rot="0" spcFirstLastPara="1" vertOverflow="ellipsis" vert="horz" wrap="square" anchor="ctr" anchorCtr="1"/>
+          <a:lstStyle/>
+          <a:p>
+            <a:pPr>
+              <a:defRPr sz="1400" b="0" i="0" u="none" strike="noStrike" kern="1200" spc="0" baseline="0">
+                <a:solidFill>
+                  <a:schemeClr val="tx1">
+                    <a:lumMod val="65000"/>
+                    <a:lumOff val="35000"/>
+                  </a:schemeClr>
+                </a:solidFill>
+                <a:latin typeface="+mn-lt"/>
+                <a:ea typeface="+mn-ea"/>
+                <a:cs typeface="+mn-cs"/>
+              </a:defRPr>
+            </a:pPr>
+            <a:r>
+              <a:rPr lang="en-GB" dirty="0"/>
+              <a:t>Trade [</a:t>
+            </a:r>
+            <a:r>
+              <a:rPr lang="en-GB" dirty="0" err="1"/>
+              <a:t>GWa</a:t>
+            </a:r>
+            <a:r>
+              <a:rPr lang="en-GB" dirty="0"/>
+              <a:t>]</a:t>
+            </a:r>
+          </a:p>
+        </c:rich>
+      </c:tx>
+      <c:overlay val="0"/>
+      <c:spPr>
+        <a:noFill/>
+        <a:ln>
+          <a:noFill/>
+        </a:ln>
+        <a:effectLst/>
+      </c:spPr>
+      <c:txPr>
+        <a:bodyPr rot="0" spcFirstLastPara="1" vertOverflow="ellipsis" vert="horz" wrap="square" anchor="ctr" anchorCtr="1"/>
+        <a:lstStyle/>
+        <a:p>
+          <a:pPr>
+            <a:defRPr sz="1400" b="0" i="0" u="none" strike="noStrike" kern="1200" spc="0" baseline="0">
+              <a:solidFill>
+                <a:schemeClr val="tx1">
+                  <a:lumMod val="65000"/>
+                  <a:lumOff val="35000"/>
+                </a:schemeClr>
+              </a:solidFill>
+              <a:latin typeface="+mn-lt"/>
+              <a:ea typeface="+mn-ea"/>
+              <a:cs typeface="+mn-cs"/>
+            </a:defRPr>
+          </a:pPr>
+          <a:endParaRPr lang="nb-NO"/>
+        </a:p>
+      </c:txPr>
+    </c:title>
+    <c:autoTitleDeleted val="0"/>
+    <c:plotArea>
+      <c:layout/>
+      <c:barChart>
+        <c:barDir val="col"/>
+        <c:grouping val="clustered"/>
+        <c:varyColors val="0"/>
+        <c:ser>
+          <c:idx val="0"/>
+          <c:order val="0"/>
+          <c:tx>
+            <c:strRef>
+              <c:f>'Import Export'!$A$3:$B$3</c:f>
+              <c:strCache>
+                <c:ptCount val="2"/>
+                <c:pt idx="0">
+                  <c:v>Imports</c:v>
+                </c:pt>
+                <c:pt idx="1">
+                  <c:v>GWa</c:v>
+                </c:pt>
+              </c:strCache>
+            </c:strRef>
+          </c:tx>
+          <c:spPr>
+            <a:solidFill>
+              <a:schemeClr val="accent1"/>
+            </a:solidFill>
+            <a:ln>
+              <a:noFill/>
+            </a:ln>
+            <a:effectLst/>
+          </c:spPr>
+          <c:invertIfNegative val="0"/>
+          <c:cat>
+            <c:multiLvlStrRef>
+              <c:f>'Import Export'!$C$1:$N$2</c:f>
+              <c:multiLvlStrCache>
+                <c:ptCount val="12"/>
+                <c:lvl>
+                  <c:pt idx="0">
+                    <c:v>2020</c:v>
+                  </c:pt>
+                  <c:pt idx="1">
+                    <c:v>2030</c:v>
+                  </c:pt>
+                  <c:pt idx="2">
+                    <c:v>2040</c:v>
+                  </c:pt>
+                  <c:pt idx="3">
+                    <c:v>2050</c:v>
+                  </c:pt>
+                  <c:pt idx="4">
+                    <c:v>2020</c:v>
+                  </c:pt>
+                  <c:pt idx="5">
+                    <c:v>2030</c:v>
+                  </c:pt>
+                  <c:pt idx="6">
+                    <c:v>2040</c:v>
+                  </c:pt>
+                  <c:pt idx="7">
+                    <c:v>2050</c:v>
+                  </c:pt>
+                  <c:pt idx="8">
+                    <c:v>2020</c:v>
+                  </c:pt>
+                  <c:pt idx="9">
+                    <c:v>2030</c:v>
+                  </c:pt>
+                  <c:pt idx="10">
+                    <c:v>2040</c:v>
+                  </c:pt>
+                  <c:pt idx="11">
+                    <c:v>2050</c:v>
+                  </c:pt>
+                </c:lvl>
+                <c:lvl>
+                  <c:pt idx="0">
+                    <c:v>Baseline</c:v>
+                  </c:pt>
+                  <c:pt idx="4">
+                    <c:v>RCP 1.9</c:v>
+                  </c:pt>
+                  <c:pt idx="8">
+                    <c:v>RCP 6.0</c:v>
+                  </c:pt>
+                </c:lvl>
+              </c:multiLvlStrCache>
+            </c:multiLvlStrRef>
+          </c:cat>
+          <c:val>
+            <c:numRef>
+              <c:f>'Import Export'!$C$3:$N$3</c:f>
+              <c:numCache>
+                <c:formatCode>General</c:formatCode>
+                <c:ptCount val="12"/>
+                <c:pt idx="0">
+                  <c:v>49.652545928955078</c:v>
+                </c:pt>
+                <c:pt idx="1">
+                  <c:v>47.253894805908203</c:v>
+                </c:pt>
+                <c:pt idx="2">
+                  <c:v>53.423957824707031</c:v>
+                </c:pt>
+                <c:pt idx="3">
+                  <c:v>59.234283447265618</c:v>
+                </c:pt>
+                <c:pt idx="4">
+                  <c:v>49.652545928955078</c:v>
+                </c:pt>
+                <c:pt idx="5">
+                  <c:v>45.902667999267578</c:v>
+                </c:pt>
+                <c:pt idx="6">
+                  <c:v>48.413551330566413</c:v>
+                </c:pt>
+                <c:pt idx="7">
+                  <c:v>49.411617279052727</c:v>
+                </c:pt>
+                <c:pt idx="8">
+                  <c:v>49.652545928955078</c:v>
+                </c:pt>
+                <c:pt idx="9">
+                  <c:v>45.902667999267578</c:v>
+                </c:pt>
+                <c:pt idx="10">
+                  <c:v>48.413551330566413</c:v>
+                </c:pt>
+                <c:pt idx="11">
+                  <c:v>49.411617279052727</c:v>
+                </c:pt>
+              </c:numCache>
+            </c:numRef>
+          </c:val>
+          <c:extLst>
+            <c:ext xmlns:c16="http://schemas.microsoft.com/office/drawing/2014/chart" uri="{C3380CC4-5D6E-409C-BE32-E72D297353CC}">
+              <c16:uniqueId val="{00000000-FF61-B648-BED9-03CC0DD7B433}"/>
+            </c:ext>
+          </c:extLst>
+        </c:ser>
+        <c:ser>
+          <c:idx val="1"/>
+          <c:order val="1"/>
+          <c:tx>
+            <c:strRef>
+              <c:f>'Import Export'!$A$4:$B$4</c:f>
+              <c:strCache>
+                <c:ptCount val="2"/>
+                <c:pt idx="0">
+                  <c:v>Exports</c:v>
+                </c:pt>
+                <c:pt idx="1">
+                  <c:v>GWa</c:v>
+                </c:pt>
+              </c:strCache>
+            </c:strRef>
+          </c:tx>
+          <c:spPr>
+            <a:solidFill>
+              <a:schemeClr val="accent2"/>
+            </a:solidFill>
+            <a:ln>
+              <a:noFill/>
+            </a:ln>
+            <a:effectLst/>
+          </c:spPr>
+          <c:invertIfNegative val="0"/>
+          <c:cat>
+            <c:multiLvlStrRef>
+              <c:f>'Import Export'!$C$1:$N$2</c:f>
+              <c:multiLvlStrCache>
+                <c:ptCount val="12"/>
+                <c:lvl>
+                  <c:pt idx="0">
+                    <c:v>2020</c:v>
+                  </c:pt>
+                  <c:pt idx="1">
+                    <c:v>2030</c:v>
+                  </c:pt>
+                  <c:pt idx="2">
+                    <c:v>2040</c:v>
+                  </c:pt>
+                  <c:pt idx="3">
+                    <c:v>2050</c:v>
+                  </c:pt>
+                  <c:pt idx="4">
+                    <c:v>2020</c:v>
+                  </c:pt>
+                  <c:pt idx="5">
+                    <c:v>2030</c:v>
+                  </c:pt>
+                  <c:pt idx="6">
+                    <c:v>2040</c:v>
+                  </c:pt>
+                  <c:pt idx="7">
+                    <c:v>2050</c:v>
+                  </c:pt>
+                  <c:pt idx="8">
+                    <c:v>2020</c:v>
+                  </c:pt>
+                  <c:pt idx="9">
+                    <c:v>2030</c:v>
+                  </c:pt>
+                  <c:pt idx="10">
+                    <c:v>2040</c:v>
+                  </c:pt>
+                  <c:pt idx="11">
+                    <c:v>2050</c:v>
+                  </c:pt>
+                </c:lvl>
+                <c:lvl>
+                  <c:pt idx="0">
+                    <c:v>Baseline</c:v>
+                  </c:pt>
+                  <c:pt idx="4">
+                    <c:v>RCP 1.9</c:v>
+                  </c:pt>
+                  <c:pt idx="8">
+                    <c:v>RCP 6.0</c:v>
+                  </c:pt>
+                </c:lvl>
+              </c:multiLvlStrCache>
+            </c:multiLvlStrRef>
+          </c:cat>
+          <c:val>
+            <c:numRef>
+              <c:f>'Import Export'!$C$4:$N$4</c:f>
+              <c:numCache>
+                <c:formatCode>General</c:formatCode>
+                <c:ptCount val="12"/>
+                <c:pt idx="0">
+                  <c:v>66.5994873046875</c:v>
+                </c:pt>
+                <c:pt idx="1">
+                  <c:v>52.925739288330078</c:v>
+                </c:pt>
+                <c:pt idx="2">
+                  <c:v>46.783237457275391</c:v>
+                </c:pt>
+                <c:pt idx="3">
+                  <c:v>44.160850524902337</c:v>
+                </c:pt>
+                <c:pt idx="4">
+                  <c:v>66.5994873046875</c:v>
+                </c:pt>
+                <c:pt idx="5">
+                  <c:v>52.925739288330078</c:v>
+                </c:pt>
+                <c:pt idx="6">
+                  <c:v>46.783237457275391</c:v>
+                </c:pt>
+                <c:pt idx="7">
+                  <c:v>44.160850524902337</c:v>
+                </c:pt>
+                <c:pt idx="8">
+                  <c:v>66.5994873046875</c:v>
+                </c:pt>
+                <c:pt idx="9">
+                  <c:v>52.925739288330078</c:v>
+                </c:pt>
+                <c:pt idx="10">
+                  <c:v>46.783237457275391</c:v>
+                </c:pt>
+                <c:pt idx="11">
+                  <c:v>44.160850524902337</c:v>
+                </c:pt>
+              </c:numCache>
+            </c:numRef>
+          </c:val>
+          <c:extLst>
+            <c:ext xmlns:c16="http://schemas.microsoft.com/office/drawing/2014/chart" uri="{C3380CC4-5D6E-409C-BE32-E72D297353CC}">
+              <c16:uniqueId val="{00000001-FF61-B648-BED9-03CC0DD7B433}"/>
+            </c:ext>
+          </c:extLst>
+        </c:ser>
+        <c:dLbls>
+          <c:showLegendKey val="0"/>
+          <c:showVal val="0"/>
+          <c:showCatName val="0"/>
+          <c:showSerName val="0"/>
+          <c:showPercent val="0"/>
+          <c:showBubbleSize val="0"/>
+        </c:dLbls>
+        <c:gapWidth val="219"/>
+        <c:overlap val="-27"/>
+        <c:axId val="664870447"/>
+        <c:axId val="665500159"/>
+      </c:barChart>
+      <c:catAx>
+        <c:axId val="664870447"/>
+        <c:scaling>
+          <c:orientation val="minMax"/>
+        </c:scaling>
+        <c:delete val="0"/>
+        <c:axPos val="b"/>
+        <c:numFmt formatCode="General" sourceLinked="1"/>
+        <c:majorTickMark val="none"/>
+        <c:minorTickMark val="none"/>
+        <c:tickLblPos val="nextTo"/>
+        <c:spPr>
+          <a:noFill/>
+          <a:ln w="9525" cap="flat" cmpd="sng" algn="ctr">
+            <a:solidFill>
+              <a:schemeClr val="tx1">
+                <a:lumMod val="15000"/>
+                <a:lumOff val="85000"/>
+              </a:schemeClr>
+            </a:solidFill>
+            <a:round/>
+          </a:ln>
+          <a:effectLst/>
+        </c:spPr>
+        <c:txPr>
+          <a:bodyPr rot="-60000000" spcFirstLastPara="1" vertOverflow="ellipsis" vert="horz" wrap="square" anchor="ctr" anchorCtr="1"/>
+          <a:lstStyle/>
+          <a:p>
+            <a:pPr>
+              <a:defRPr sz="900" b="0" i="0" u="none" strike="noStrike" kern="1200" baseline="0">
+                <a:solidFill>
+                  <a:schemeClr val="tx1">
+                    <a:lumMod val="65000"/>
+                    <a:lumOff val="35000"/>
+                  </a:schemeClr>
+                </a:solidFill>
+                <a:latin typeface="+mn-lt"/>
+                <a:ea typeface="+mn-ea"/>
+                <a:cs typeface="+mn-cs"/>
+              </a:defRPr>
+            </a:pPr>
+            <a:endParaRPr lang="nb-NO"/>
+          </a:p>
+        </c:txPr>
+        <c:crossAx val="665500159"/>
+        <c:crosses val="autoZero"/>
+        <c:auto val="1"/>
+        <c:lblAlgn val="ctr"/>
+        <c:lblOffset val="100"/>
+        <c:noMultiLvlLbl val="0"/>
+      </c:catAx>
+      <c:valAx>
+        <c:axId val="665500159"/>
+        <c:scaling>
+          <c:orientation val="minMax"/>
+        </c:scaling>
+        <c:delete val="0"/>
+        <c:axPos val="l"/>
+        <c:majorGridlines>
+          <c:spPr>
+            <a:ln w="9525" cap="flat" cmpd="sng" algn="ctr">
+              <a:solidFill>
+                <a:schemeClr val="tx1">
+                  <a:lumMod val="15000"/>
+                  <a:lumOff val="85000"/>
+                </a:schemeClr>
+              </a:solidFill>
+              <a:round/>
+            </a:ln>
+            <a:effectLst/>
+          </c:spPr>
+        </c:majorGridlines>
+        <c:numFmt formatCode="General" sourceLinked="1"/>
+        <c:majorTickMark val="none"/>
+        <c:minorTickMark val="none"/>
+        <c:tickLblPos val="nextTo"/>
+        <c:spPr>
+          <a:noFill/>
+          <a:ln>
+            <a:noFill/>
+          </a:ln>
+          <a:effectLst/>
+        </c:spPr>
+        <c:txPr>
+          <a:bodyPr rot="-60000000" spcFirstLastPara="1" vertOverflow="ellipsis" vert="horz" wrap="square" anchor="ctr" anchorCtr="1"/>
+          <a:lstStyle/>
+          <a:p>
+            <a:pPr>
+              <a:defRPr sz="900" b="0" i="0" u="none" strike="noStrike" kern="1200" baseline="0">
+                <a:solidFill>
+                  <a:schemeClr val="tx1">
+                    <a:lumMod val="65000"/>
+                    <a:lumOff val="35000"/>
+                  </a:schemeClr>
+                </a:solidFill>
+                <a:latin typeface="+mn-lt"/>
+                <a:ea typeface="+mn-ea"/>
+                <a:cs typeface="+mn-cs"/>
+              </a:defRPr>
+            </a:pPr>
+            <a:endParaRPr lang="nb-NO"/>
+          </a:p>
+        </c:txPr>
+        <c:crossAx val="664870447"/>
+        <c:crosses val="autoZero"/>
+        <c:crossBetween val="between"/>
+      </c:valAx>
+      <c:spPr>
+        <a:noFill/>
+        <a:ln>
+          <a:noFill/>
+        </a:ln>
+        <a:effectLst/>
+      </c:spPr>
+    </c:plotArea>
+    <c:legend>
+      <c:legendPos val="b"/>
+      <c:overlay val="0"/>
+      <c:spPr>
+        <a:noFill/>
+        <a:ln>
+          <a:noFill/>
+        </a:ln>
+        <a:effectLst/>
+      </c:spPr>
+      <c:txPr>
+        <a:bodyPr rot="0" spcFirstLastPara="1" vertOverflow="ellipsis" vert="horz" wrap="square" anchor="ctr" anchorCtr="1"/>
+        <a:lstStyle/>
+        <a:p>
+          <a:pPr>
+            <a:defRPr sz="900" b="0" i="0" u="none" strike="noStrike" kern="1200" baseline="0">
+              <a:solidFill>
+                <a:schemeClr val="tx1">
+                  <a:lumMod val="65000"/>
+                  <a:lumOff val="35000"/>
+                </a:schemeClr>
+              </a:solidFill>
+              <a:latin typeface="+mn-lt"/>
+              <a:ea typeface="+mn-ea"/>
+              <a:cs typeface="+mn-cs"/>
+            </a:defRPr>
+          </a:pPr>
+          <a:endParaRPr lang="nb-NO"/>
+        </a:p>
+      </c:txPr>
+    </c:legend>
+    <c:plotVisOnly val="1"/>
+    <c:dispBlanksAs val="gap"/>
+    <c:showDLblsOverMax val="0"/>
+  </c:chart>
+  <c:spPr>
+    <a:noFill/>
+    <a:ln>
+      <a:noFill/>
+    </a:ln>
+    <a:effectLst/>
+  </c:spPr>
+  <c:txPr>
+    <a:bodyPr/>
+    <a:lstStyle/>
+    <a:p>
+      <a:pPr>
+        <a:defRPr/>
+      </a:pPr>
+      <a:endParaRPr lang="nb-NO"/>
+    </a:p>
+  </c:txPr>
+  <c:externalData r:id="rId3">
+    <c:autoUpdate val="0"/>
+  </c:externalData>
+</c:chartSpace>
+</file>
+
+<file path=ppt/charts/chart3.xml><?xml version="1.0" encoding="utf-8"?>
+<c:chartSpace xmlns:c="http://schemas.openxmlformats.org/drawingml/2006/chart" xmlns:a="http://schemas.openxmlformats.org/drawingml/2006/main" xmlns:r="http://schemas.openxmlformats.org/officeDocument/2006/relationships" xmlns:c16r2="http://schemas.microsoft.com/office/drawing/2015/06/chart">
+  <c:date1904 val="0"/>
+  <c:lang val="en-GB"/>
+  <c:roundedCorners val="0"/>
+  <mc:AlternateContent xmlns:mc="http://schemas.openxmlformats.org/markup-compatibility/2006">
+    <mc:Choice xmlns:c14="http://schemas.microsoft.com/office/drawing/2007/8/2/chart" Requires="c14">
+      <c14:style val="102"/>
+    </mc:Choice>
+    <mc:Fallback>
+      <c:style val="2"/>
+    </mc:Fallback>
+  </mc:AlternateContent>
+  <c:chart>
+    <c:title>
+      <c:tx>
+        <c:rich>
+          <a:bodyPr rot="0" spcFirstLastPara="1" vertOverflow="ellipsis" vert="horz" wrap="square" anchor="ctr" anchorCtr="1"/>
+          <a:lstStyle/>
+          <a:p>
+            <a:pPr>
+              <a:defRPr sz="1400" b="0" i="0" u="none" strike="noStrike" kern="1200" spc="0" baseline="0">
+                <a:solidFill>
+                  <a:schemeClr val="tx1">
+                    <a:lumMod val="65000"/>
+                    <a:lumOff val="35000"/>
+                  </a:schemeClr>
+                </a:solidFill>
+                <a:latin typeface="+mn-lt"/>
+                <a:ea typeface="+mn-ea"/>
+                <a:cs typeface="+mn-cs"/>
+              </a:defRPr>
+            </a:pPr>
+            <a:r>
+              <a:rPr lang="en-GB"/>
+              <a:t>Emissions [MtCO2eq]</a:t>
+            </a:r>
+          </a:p>
+        </c:rich>
+      </c:tx>
+      <c:overlay val="0"/>
+      <c:spPr>
+        <a:noFill/>
+        <a:ln>
+          <a:noFill/>
+        </a:ln>
+        <a:effectLst/>
+      </c:spPr>
+      <c:txPr>
+        <a:bodyPr rot="0" spcFirstLastPara="1" vertOverflow="ellipsis" vert="horz" wrap="square" anchor="ctr" anchorCtr="1"/>
+        <a:lstStyle/>
+        <a:p>
+          <a:pPr>
+            <a:defRPr sz="1400" b="0" i="0" u="none" strike="noStrike" kern="1200" spc="0" baseline="0">
+              <a:solidFill>
+                <a:schemeClr val="tx1">
+                  <a:lumMod val="65000"/>
+                  <a:lumOff val="35000"/>
+                </a:schemeClr>
+              </a:solidFill>
+              <a:latin typeface="+mn-lt"/>
+              <a:ea typeface="+mn-ea"/>
+              <a:cs typeface="+mn-cs"/>
+            </a:defRPr>
+          </a:pPr>
+          <a:endParaRPr lang="nb-NO"/>
+        </a:p>
+      </c:txPr>
+    </c:title>
+    <c:autoTitleDeleted val="0"/>
+    <c:plotArea>
+      <c:layout/>
+      <c:barChart>
+        <c:barDir val="col"/>
+        <c:grouping val="clustered"/>
+        <c:varyColors val="0"/>
+        <c:ser>
+          <c:idx val="0"/>
+          <c:order val="0"/>
+          <c:tx>
+            <c:strRef>
+              <c:f>'CO2 emissions'!$A$2</c:f>
+              <c:strCache>
+                <c:ptCount val="1"/>
+                <c:pt idx="0">
+                  <c:v>2020</c:v>
+                </c:pt>
+              </c:strCache>
+            </c:strRef>
+          </c:tx>
+          <c:spPr>
+            <a:solidFill>
+              <a:schemeClr val="accent1"/>
+            </a:solidFill>
+            <a:ln>
+              <a:noFill/>
+            </a:ln>
+            <a:effectLst/>
+          </c:spPr>
+          <c:invertIfNegative val="0"/>
+          <c:cat>
+            <c:strRef>
+              <c:f>'CO2 emissions'!$B$1:$G$1</c:f>
+              <c:strCache>
+                <c:ptCount val="6"/>
+                <c:pt idx="0">
+                  <c:v>Baseline</c:v>
+                </c:pt>
+                <c:pt idx="1">
+                  <c:v>RCP 1.9</c:v>
+                </c:pt>
+                <c:pt idx="2">
+                  <c:v>RCP 2.6</c:v>
+                </c:pt>
+                <c:pt idx="3">
+                  <c:v>RCP 3.4</c:v>
+                </c:pt>
+                <c:pt idx="4">
+                  <c:v>RCP 4.5</c:v>
+                </c:pt>
+                <c:pt idx="5">
+                  <c:v>RCP 6.0</c:v>
+                </c:pt>
+              </c:strCache>
+            </c:strRef>
+          </c:cat>
+          <c:val>
+            <c:numRef>
+              <c:f>'CO2 emissions'!$B$2:$G$2</c:f>
+              <c:numCache>
+                <c:formatCode>General</c:formatCode>
+                <c:ptCount val="6"/>
+                <c:pt idx="0">
+                  <c:v>527.53094482421875</c:v>
+                </c:pt>
+                <c:pt idx="1">
+                  <c:v>527.53094482421875</c:v>
+                </c:pt>
+                <c:pt idx="2">
+                  <c:v>527.53094482421875</c:v>
+                </c:pt>
+                <c:pt idx="3">
+                  <c:v>527.53094482421875</c:v>
+                </c:pt>
+                <c:pt idx="4">
+                  <c:v>527.53094482421875</c:v>
+                </c:pt>
+                <c:pt idx="5">
+                  <c:v>527.53094482421875</c:v>
+                </c:pt>
+              </c:numCache>
+            </c:numRef>
+          </c:val>
+          <c:extLst>
+            <c:ext xmlns:c16="http://schemas.microsoft.com/office/drawing/2014/chart" uri="{C3380CC4-5D6E-409C-BE32-E72D297353CC}">
+              <c16:uniqueId val="{00000000-B9F7-C248-B5DE-E8A77660DCC5}"/>
+            </c:ext>
+          </c:extLst>
+        </c:ser>
+        <c:ser>
+          <c:idx val="1"/>
+          <c:order val="1"/>
+          <c:tx>
+            <c:strRef>
+              <c:f>'CO2 emissions'!$A$3</c:f>
+              <c:strCache>
+                <c:ptCount val="1"/>
+                <c:pt idx="0">
+                  <c:v>2030</c:v>
+                </c:pt>
+              </c:strCache>
+            </c:strRef>
+          </c:tx>
+          <c:spPr>
+            <a:solidFill>
+              <a:schemeClr val="accent2"/>
+            </a:solidFill>
+            <a:ln>
+              <a:noFill/>
+            </a:ln>
+            <a:effectLst/>
+          </c:spPr>
+          <c:invertIfNegative val="0"/>
+          <c:cat>
+            <c:strRef>
+              <c:f>'CO2 emissions'!$B$1:$G$1</c:f>
+              <c:strCache>
+                <c:ptCount val="6"/>
+                <c:pt idx="0">
+                  <c:v>Baseline</c:v>
+                </c:pt>
+                <c:pt idx="1">
+                  <c:v>RCP 1.9</c:v>
+                </c:pt>
+                <c:pt idx="2">
+                  <c:v>RCP 2.6</c:v>
+                </c:pt>
+                <c:pt idx="3">
+                  <c:v>RCP 3.4</c:v>
+                </c:pt>
+                <c:pt idx="4">
+                  <c:v>RCP 4.5</c:v>
+                </c:pt>
+                <c:pt idx="5">
+                  <c:v>RCP 6.0</c:v>
+                </c:pt>
+              </c:strCache>
+            </c:strRef>
+          </c:cat>
+          <c:val>
+            <c:numRef>
+              <c:f>'CO2 emissions'!$B$3:$G$3</c:f>
+              <c:numCache>
+                <c:formatCode>General</c:formatCode>
+                <c:ptCount val="6"/>
+                <c:pt idx="0">
+                  <c:v>683.823974609375</c:v>
+                </c:pt>
+                <c:pt idx="1">
+                  <c:v>664.48138427734375</c:v>
+                </c:pt>
+                <c:pt idx="2">
+                  <c:v>664.48138427734375</c:v>
+                </c:pt>
+                <c:pt idx="3">
+                  <c:v>664.48138427734375</c:v>
+                </c:pt>
+                <c:pt idx="4">
+                  <c:v>664.48138427734375</c:v>
+                </c:pt>
+                <c:pt idx="5">
+                  <c:v>664.48138427734375</c:v>
+                </c:pt>
+              </c:numCache>
+            </c:numRef>
+          </c:val>
+          <c:extLst>
+            <c:ext xmlns:c16="http://schemas.microsoft.com/office/drawing/2014/chart" uri="{C3380CC4-5D6E-409C-BE32-E72D297353CC}">
+              <c16:uniqueId val="{00000001-B9F7-C248-B5DE-E8A77660DCC5}"/>
+            </c:ext>
+          </c:extLst>
+        </c:ser>
+        <c:ser>
+          <c:idx val="2"/>
+          <c:order val="2"/>
+          <c:tx>
+            <c:strRef>
+              <c:f>'CO2 emissions'!$A$4</c:f>
+              <c:strCache>
+                <c:ptCount val="1"/>
+                <c:pt idx="0">
+                  <c:v>2040</c:v>
+                </c:pt>
+              </c:strCache>
+            </c:strRef>
+          </c:tx>
+          <c:spPr>
+            <a:solidFill>
+              <a:schemeClr val="accent3"/>
+            </a:solidFill>
+            <a:ln>
+              <a:noFill/>
+            </a:ln>
+            <a:effectLst/>
+          </c:spPr>
+          <c:invertIfNegative val="0"/>
+          <c:cat>
+            <c:strRef>
+              <c:f>'CO2 emissions'!$B$1:$G$1</c:f>
+              <c:strCache>
+                <c:ptCount val="6"/>
+                <c:pt idx="0">
+                  <c:v>Baseline</c:v>
+                </c:pt>
+                <c:pt idx="1">
+                  <c:v>RCP 1.9</c:v>
+                </c:pt>
+                <c:pt idx="2">
+                  <c:v>RCP 2.6</c:v>
+                </c:pt>
+                <c:pt idx="3">
+                  <c:v>RCP 3.4</c:v>
+                </c:pt>
+                <c:pt idx="4">
+                  <c:v>RCP 4.5</c:v>
+                </c:pt>
+                <c:pt idx="5">
+                  <c:v>RCP 6.0</c:v>
+                </c:pt>
+              </c:strCache>
+            </c:strRef>
+          </c:cat>
+          <c:val>
+            <c:numRef>
+              <c:f>'CO2 emissions'!$B$4:$G$4</c:f>
+              <c:numCache>
+                <c:formatCode>General</c:formatCode>
+                <c:ptCount val="6"/>
+                <c:pt idx="0">
+                  <c:v>817.57855224609375</c:v>
+                </c:pt>
+                <c:pt idx="1">
+                  <c:v>744.68243408203125</c:v>
+                </c:pt>
+                <c:pt idx="2">
+                  <c:v>744.68243408203125</c:v>
+                </c:pt>
+                <c:pt idx="3">
+                  <c:v>744.68243408203125</c:v>
+                </c:pt>
+                <c:pt idx="4">
+                  <c:v>744.68243408203125</c:v>
+                </c:pt>
+                <c:pt idx="5">
+                  <c:v>744.68243408203125</c:v>
+                </c:pt>
+              </c:numCache>
+            </c:numRef>
+          </c:val>
+          <c:extLst>
+            <c:ext xmlns:c16="http://schemas.microsoft.com/office/drawing/2014/chart" uri="{C3380CC4-5D6E-409C-BE32-E72D297353CC}">
+              <c16:uniqueId val="{00000002-B9F7-C248-B5DE-E8A77660DCC5}"/>
+            </c:ext>
+          </c:extLst>
+        </c:ser>
+        <c:ser>
+          <c:idx val="3"/>
+          <c:order val="3"/>
+          <c:tx>
+            <c:strRef>
+              <c:f>'CO2 emissions'!$A$5</c:f>
+              <c:strCache>
+                <c:ptCount val="1"/>
+                <c:pt idx="0">
+                  <c:v>2050</c:v>
+                </c:pt>
+              </c:strCache>
+            </c:strRef>
+          </c:tx>
+          <c:spPr>
+            <a:solidFill>
+              <a:schemeClr val="accent4"/>
+            </a:solidFill>
+            <a:ln>
+              <a:noFill/>
+            </a:ln>
+            <a:effectLst/>
+          </c:spPr>
+          <c:invertIfNegative val="0"/>
+          <c:cat>
+            <c:strRef>
+              <c:f>'CO2 emissions'!$B$1:$G$1</c:f>
+              <c:strCache>
+                <c:ptCount val="6"/>
+                <c:pt idx="0">
+                  <c:v>Baseline</c:v>
+                </c:pt>
+                <c:pt idx="1">
+                  <c:v>RCP 1.9</c:v>
+                </c:pt>
+                <c:pt idx="2">
+                  <c:v>RCP 2.6</c:v>
+                </c:pt>
+                <c:pt idx="3">
+                  <c:v>RCP 3.4</c:v>
+                </c:pt>
+                <c:pt idx="4">
+                  <c:v>RCP 4.5</c:v>
+                </c:pt>
+                <c:pt idx="5">
+                  <c:v>RCP 6.0</c:v>
+                </c:pt>
+              </c:strCache>
+            </c:strRef>
+          </c:cat>
+          <c:val>
+            <c:numRef>
+              <c:f>'CO2 emissions'!$B$5:$G$5</c:f>
+              <c:numCache>
+                <c:formatCode>General</c:formatCode>
+                <c:ptCount val="6"/>
+                <c:pt idx="0">
+                  <c:v>1004.80712890625</c:v>
+                </c:pt>
+                <c:pt idx="1">
+                  <c:v>872.3360595703125</c:v>
+                </c:pt>
+                <c:pt idx="2">
+                  <c:v>872.3360595703125</c:v>
+                </c:pt>
+                <c:pt idx="3">
+                  <c:v>872.3360595703125</c:v>
+                </c:pt>
+                <c:pt idx="4">
+                  <c:v>872.3360595703125</c:v>
+                </c:pt>
+                <c:pt idx="5">
+                  <c:v>872.3360595703125</c:v>
+                </c:pt>
+              </c:numCache>
+            </c:numRef>
+          </c:val>
+          <c:extLst>
+            <c:ext xmlns:c16="http://schemas.microsoft.com/office/drawing/2014/chart" uri="{C3380CC4-5D6E-409C-BE32-E72D297353CC}">
+              <c16:uniqueId val="{00000003-B9F7-C248-B5DE-E8A77660DCC5}"/>
+            </c:ext>
+          </c:extLst>
+        </c:ser>
+        <c:dLbls>
+          <c:showLegendKey val="0"/>
+          <c:showVal val="0"/>
+          <c:showCatName val="0"/>
+          <c:showSerName val="0"/>
+          <c:showPercent val="0"/>
+          <c:showBubbleSize val="0"/>
+        </c:dLbls>
+        <c:gapWidth val="219"/>
+        <c:overlap val="-27"/>
+        <c:axId val="665126799"/>
+        <c:axId val="665081599"/>
+      </c:barChart>
+      <c:catAx>
+        <c:axId val="665126799"/>
+        <c:scaling>
+          <c:orientation val="minMax"/>
+        </c:scaling>
+        <c:delete val="0"/>
+        <c:axPos val="b"/>
+        <c:numFmt formatCode="General" sourceLinked="1"/>
+        <c:majorTickMark val="none"/>
+        <c:minorTickMark val="none"/>
+        <c:tickLblPos val="nextTo"/>
+        <c:spPr>
+          <a:noFill/>
+          <a:ln w="9525" cap="flat" cmpd="sng" algn="ctr">
+            <a:solidFill>
+              <a:schemeClr val="tx1">
+                <a:lumMod val="15000"/>
+                <a:lumOff val="85000"/>
+              </a:schemeClr>
+            </a:solidFill>
+            <a:round/>
+          </a:ln>
+          <a:effectLst/>
+        </c:spPr>
+        <c:txPr>
+          <a:bodyPr rot="-60000000" spcFirstLastPara="1" vertOverflow="ellipsis" vert="horz" wrap="square" anchor="ctr" anchorCtr="1"/>
+          <a:lstStyle/>
+          <a:p>
+            <a:pPr>
+              <a:defRPr sz="900" b="0" i="0" u="none" strike="noStrike" kern="1200" baseline="0">
+                <a:solidFill>
+                  <a:schemeClr val="tx1">
+                    <a:lumMod val="65000"/>
+                    <a:lumOff val="35000"/>
+                  </a:schemeClr>
+                </a:solidFill>
+                <a:latin typeface="+mn-lt"/>
+                <a:ea typeface="+mn-ea"/>
+                <a:cs typeface="+mn-cs"/>
+              </a:defRPr>
+            </a:pPr>
+            <a:endParaRPr lang="nb-NO"/>
+          </a:p>
+        </c:txPr>
+        <c:crossAx val="665081599"/>
+        <c:crosses val="autoZero"/>
+        <c:auto val="1"/>
+        <c:lblAlgn val="ctr"/>
+        <c:lblOffset val="100"/>
+        <c:noMultiLvlLbl val="0"/>
+      </c:catAx>
+      <c:valAx>
+        <c:axId val="665081599"/>
+        <c:scaling>
+          <c:orientation val="minMax"/>
+        </c:scaling>
+        <c:delete val="0"/>
+        <c:axPos val="l"/>
+        <c:majorGridlines>
+          <c:spPr>
+            <a:ln w="9525" cap="flat" cmpd="sng" algn="ctr">
+              <a:solidFill>
+                <a:schemeClr val="tx1">
+                  <a:lumMod val="15000"/>
+                  <a:lumOff val="85000"/>
+                </a:schemeClr>
+              </a:solidFill>
+              <a:round/>
+            </a:ln>
+            <a:effectLst/>
+          </c:spPr>
+        </c:majorGridlines>
+        <c:numFmt formatCode="General" sourceLinked="1"/>
+        <c:majorTickMark val="none"/>
+        <c:minorTickMark val="none"/>
+        <c:tickLblPos val="nextTo"/>
+        <c:spPr>
+          <a:noFill/>
+          <a:ln>
+            <a:noFill/>
+          </a:ln>
+          <a:effectLst/>
+        </c:spPr>
+        <c:txPr>
+          <a:bodyPr rot="-60000000" spcFirstLastPara="1" vertOverflow="ellipsis" vert="horz" wrap="square" anchor="ctr" anchorCtr="1"/>
+          <a:lstStyle/>
+          <a:p>
+            <a:pPr>
+              <a:defRPr sz="900" b="0" i="0" u="none" strike="noStrike" kern="1200" baseline="0">
+                <a:solidFill>
+                  <a:schemeClr val="tx1">
+                    <a:lumMod val="65000"/>
+                    <a:lumOff val="35000"/>
+                  </a:schemeClr>
+                </a:solidFill>
+                <a:latin typeface="+mn-lt"/>
+                <a:ea typeface="+mn-ea"/>
+                <a:cs typeface="+mn-cs"/>
+              </a:defRPr>
+            </a:pPr>
+            <a:endParaRPr lang="nb-NO"/>
+          </a:p>
+        </c:txPr>
+        <c:crossAx val="665126799"/>
+        <c:crosses val="autoZero"/>
+        <c:crossBetween val="between"/>
+      </c:valAx>
+      <c:spPr>
+        <a:noFill/>
+        <a:ln>
+          <a:noFill/>
+        </a:ln>
+        <a:effectLst/>
+      </c:spPr>
+    </c:plotArea>
+    <c:legend>
+      <c:legendPos val="b"/>
+      <c:overlay val="0"/>
+      <c:spPr>
+        <a:noFill/>
+        <a:ln>
+          <a:noFill/>
+        </a:ln>
+        <a:effectLst/>
+      </c:spPr>
+      <c:txPr>
+        <a:bodyPr rot="0" spcFirstLastPara="1" vertOverflow="ellipsis" vert="horz" wrap="square" anchor="ctr" anchorCtr="1"/>
+        <a:lstStyle/>
+        <a:p>
+          <a:pPr>
+            <a:defRPr sz="900" b="0" i="0" u="none" strike="noStrike" kern="1200" baseline="0">
+              <a:solidFill>
+                <a:schemeClr val="tx1">
+                  <a:lumMod val="65000"/>
+                  <a:lumOff val="35000"/>
+                </a:schemeClr>
+              </a:solidFill>
+              <a:latin typeface="+mn-lt"/>
+              <a:ea typeface="+mn-ea"/>
+              <a:cs typeface="+mn-cs"/>
+            </a:defRPr>
+          </a:pPr>
+          <a:endParaRPr lang="nb-NO"/>
+        </a:p>
+      </c:txPr>
+    </c:legend>
+    <c:plotVisOnly val="1"/>
+    <c:dispBlanksAs val="gap"/>
+    <c:showDLblsOverMax val="0"/>
+  </c:chart>
+  <c:spPr>
+    <a:noFill/>
+    <a:ln>
+      <a:noFill/>
+    </a:ln>
+    <a:effectLst/>
+  </c:spPr>
+  <c:txPr>
+    <a:bodyPr/>
+    <a:lstStyle/>
+    <a:p>
+      <a:pPr>
+        <a:defRPr/>
+      </a:pPr>
+      <a:endParaRPr lang="nb-NO"/>
+    </a:p>
+  </c:txPr>
+  <c:externalData r:id="rId3">
+    <c:autoUpdate val="0"/>
+  </c:externalData>
+</c:chartSpace>
+</file>
+
 <file path=ppt/charts/colors1.xml><?xml version="1.0" encoding="utf-8"?>
+<cs:colorStyle xmlns:cs="http://schemas.microsoft.com/office/drawing/2012/chartStyle" xmlns:a="http://schemas.openxmlformats.org/drawingml/2006/main" meth="cycle" id="10">
+  <a:schemeClr val="accent1"/>
+  <a:schemeClr val="accent2"/>
+  <a:schemeClr val="accent3"/>
+  <a:schemeClr val="accent4"/>
+  <a:schemeClr val="accent5"/>
+  <a:schemeClr val="accent6"/>
+  <cs:variation/>
+  <cs:variation>
+    <a:lumMod val="60000"/>
+  </cs:variation>
+  <cs:variation>
+    <a:lumMod val="80000"/>
+    <a:lumOff val="20000"/>
+  </cs:variation>
+  <cs:variation>
+    <a:lumMod val="80000"/>
+  </cs:variation>
+  <cs:variation>
+    <a:lumMod val="60000"/>
+    <a:lumOff val="40000"/>
+  </cs:variation>
+  <cs:variation>
+    <a:lumMod val="50000"/>
+  </cs:variation>
+  <cs:variation>
+    <a:lumMod val="70000"/>
+    <a:lumOff val="30000"/>
+  </cs:variation>
+  <cs:variation>
+    <a:lumMod val="70000"/>
+  </cs:variation>
+  <cs:variation>
+    <a:lumMod val="50000"/>
+    <a:lumOff val="50000"/>
+  </cs:variation>
+</cs:colorStyle>
+</file>
+
+<file path=ppt/charts/colors2.xml><?xml version="1.0" encoding="utf-8"?>
+<cs:colorStyle xmlns:cs="http://schemas.microsoft.com/office/drawing/2012/chartStyle" xmlns:a="http://schemas.openxmlformats.org/drawingml/2006/main" meth="cycle" id="10">
+  <a:schemeClr val="accent1"/>
+  <a:schemeClr val="accent2"/>
+  <a:schemeClr val="accent3"/>
+  <a:schemeClr val="accent4"/>
+  <a:schemeClr val="accent5"/>
+  <a:schemeClr val="accent6"/>
+  <cs:variation/>
+  <cs:variation>
+    <a:lumMod val="60000"/>
+  </cs:variation>
+  <cs:variation>
+    <a:lumMod val="80000"/>
+    <a:lumOff val="20000"/>
+  </cs:variation>
+  <cs:variation>
+    <a:lumMod val="80000"/>
+  </cs:variation>
+  <cs:variation>
+    <a:lumMod val="60000"/>
+    <a:lumOff val="40000"/>
+  </cs:variation>
+  <cs:variation>
+    <a:lumMod val="50000"/>
+  </cs:variation>
+  <cs:variation>
+    <a:lumMod val="70000"/>
+    <a:lumOff val="30000"/>
+  </cs:variation>
+  <cs:variation>
+    <a:lumMod val="70000"/>
+  </cs:variation>
+  <cs:variation>
+    <a:lumMod val="50000"/>
+    <a:lumOff val="50000"/>
+  </cs:variation>
+</cs:colorStyle>
+</file>
+
+<file path=ppt/charts/colors3.xml><?xml version="1.0" encoding="utf-8"?>
 <cs:colorStyle xmlns:cs="http://schemas.microsoft.com/office/drawing/2012/chartStyle" xmlns:a="http://schemas.openxmlformats.org/drawingml/2006/main" meth="cycle" id="10">
   <a:schemeClr val="accent1"/>
   <a:schemeClr val="accent2"/>
@@ -1228,6 +2445,1012 @@
       <a:solidFill>
         <a:schemeClr val="phClr"/>
       </a:solidFill>
+      <a:ln w="9525">
+        <a:solidFill>
+          <a:schemeClr val="phClr"/>
+        </a:solidFill>
+      </a:ln>
+    </cs:spPr>
+  </cs:dataPointMarker>
+  <cs:dataPointMarkerLayout symbol="circle" size="5"/>
+  <cs:dataPointWireframe>
+    <cs:lnRef idx="0">
+      <cs:styleClr val="auto"/>
+    </cs:lnRef>
+    <cs:fillRef idx="1"/>
+    <cs:effectRef idx="0"/>
+    <cs:fontRef idx="minor">
+      <a:schemeClr val="tx1"/>
+    </cs:fontRef>
+    <cs:spPr>
+      <a:ln w="9525" cap="rnd">
+        <a:solidFill>
+          <a:schemeClr val="phClr"/>
+        </a:solidFill>
+        <a:round/>
+      </a:ln>
+    </cs:spPr>
+  </cs:dataPointWireframe>
+  <cs:dataTable>
+    <cs:lnRef idx="0"/>
+    <cs:fillRef idx="0"/>
+    <cs:effectRef idx="0"/>
+    <cs:fontRef idx="minor">
+      <a:schemeClr val="tx1">
+        <a:lumMod val="65000"/>
+        <a:lumOff val="35000"/>
+      </a:schemeClr>
+    </cs:fontRef>
+    <cs:spPr>
+      <a:noFill/>
+      <a:ln w="9525" cap="flat" cmpd="sng" algn="ctr">
+        <a:solidFill>
+          <a:schemeClr val="tx1">
+            <a:lumMod val="15000"/>
+            <a:lumOff val="85000"/>
+          </a:schemeClr>
+        </a:solidFill>
+        <a:round/>
+      </a:ln>
+    </cs:spPr>
+    <cs:defRPr sz="900" kern="1200"/>
+  </cs:dataTable>
+  <cs:downBar>
+    <cs:lnRef idx="0"/>
+    <cs:fillRef idx="0"/>
+    <cs:effectRef idx="0"/>
+    <cs:fontRef idx="minor">
+      <a:schemeClr val="dk1"/>
+    </cs:fontRef>
+    <cs:spPr>
+      <a:solidFill>
+        <a:schemeClr val="dk1">
+          <a:lumMod val="65000"/>
+          <a:lumOff val="35000"/>
+        </a:schemeClr>
+      </a:solidFill>
+      <a:ln w="9525">
+        <a:solidFill>
+          <a:schemeClr val="tx1">
+            <a:lumMod val="65000"/>
+            <a:lumOff val="35000"/>
+          </a:schemeClr>
+        </a:solidFill>
+      </a:ln>
+    </cs:spPr>
+  </cs:downBar>
+  <cs:dropLine>
+    <cs:lnRef idx="0"/>
+    <cs:fillRef idx="0"/>
+    <cs:effectRef idx="0"/>
+    <cs:fontRef idx="minor">
+      <a:schemeClr val="tx1"/>
+    </cs:fontRef>
+    <cs:spPr>
+      <a:ln w="9525" cap="flat" cmpd="sng" algn="ctr">
+        <a:solidFill>
+          <a:schemeClr val="tx1">
+            <a:lumMod val="35000"/>
+            <a:lumOff val="65000"/>
+          </a:schemeClr>
+        </a:solidFill>
+        <a:round/>
+      </a:ln>
+    </cs:spPr>
+  </cs:dropLine>
+  <cs:errorBar>
+    <cs:lnRef idx="0"/>
+    <cs:fillRef idx="0"/>
+    <cs:effectRef idx="0"/>
+    <cs:fontRef idx="minor">
+      <a:schemeClr val="tx1"/>
+    </cs:fontRef>
+    <cs:spPr>
+      <a:ln w="9525" cap="flat" cmpd="sng" algn="ctr">
+        <a:solidFill>
+          <a:schemeClr val="tx1">
+            <a:lumMod val="65000"/>
+            <a:lumOff val="35000"/>
+          </a:schemeClr>
+        </a:solidFill>
+        <a:round/>
+      </a:ln>
+    </cs:spPr>
+  </cs:errorBar>
+  <cs:floor>
+    <cs:lnRef idx="0"/>
+    <cs:fillRef idx="0"/>
+    <cs:effectRef idx="0"/>
+    <cs:fontRef idx="minor">
+      <a:schemeClr val="tx1"/>
+    </cs:fontRef>
+    <cs:spPr>
+      <a:noFill/>
+      <a:ln>
+        <a:noFill/>
+      </a:ln>
+    </cs:spPr>
+  </cs:floor>
+  <cs:gridlineMajor>
+    <cs:lnRef idx="0"/>
+    <cs:fillRef idx="0"/>
+    <cs:effectRef idx="0"/>
+    <cs:fontRef idx="minor">
+      <a:schemeClr val="tx1"/>
+    </cs:fontRef>
+    <cs:spPr>
+      <a:ln w="9525" cap="flat" cmpd="sng" algn="ctr">
+        <a:solidFill>
+          <a:schemeClr val="tx1">
+            <a:lumMod val="15000"/>
+            <a:lumOff val="85000"/>
+          </a:schemeClr>
+        </a:solidFill>
+        <a:round/>
+      </a:ln>
+    </cs:spPr>
+  </cs:gridlineMajor>
+  <cs:gridlineMinor>
+    <cs:lnRef idx="0"/>
+    <cs:fillRef idx="0"/>
+    <cs:effectRef idx="0"/>
+    <cs:fontRef idx="minor">
+      <a:schemeClr val="tx1"/>
+    </cs:fontRef>
+    <cs:spPr>
+      <a:ln w="9525" cap="flat" cmpd="sng" algn="ctr">
+        <a:solidFill>
+          <a:schemeClr val="tx1">
+            <a:lumMod val="5000"/>
+            <a:lumOff val="95000"/>
+          </a:schemeClr>
+        </a:solidFill>
+        <a:round/>
+      </a:ln>
+    </cs:spPr>
+  </cs:gridlineMinor>
+  <cs:hiLoLine>
+    <cs:lnRef idx="0"/>
+    <cs:fillRef idx="0"/>
+    <cs:effectRef idx="0"/>
+    <cs:fontRef idx="minor">
+      <a:schemeClr val="tx1"/>
+    </cs:fontRef>
+    <cs:spPr>
+      <a:ln w="9525" cap="flat" cmpd="sng" algn="ctr">
+        <a:solidFill>
+          <a:schemeClr val="tx1">
+            <a:lumMod val="75000"/>
+            <a:lumOff val="25000"/>
+          </a:schemeClr>
+        </a:solidFill>
+        <a:round/>
+      </a:ln>
+    </cs:spPr>
+  </cs:hiLoLine>
+  <cs:leaderLine>
+    <cs:lnRef idx="0"/>
+    <cs:fillRef idx="0"/>
+    <cs:effectRef idx="0"/>
+    <cs:fontRef idx="minor">
+      <a:schemeClr val="tx1"/>
+    </cs:fontRef>
+    <cs:spPr>
+      <a:ln w="9525" cap="flat" cmpd="sng" algn="ctr">
+        <a:solidFill>
+          <a:schemeClr val="tx1">
+            <a:lumMod val="35000"/>
+            <a:lumOff val="65000"/>
+          </a:schemeClr>
+        </a:solidFill>
+        <a:round/>
+      </a:ln>
+    </cs:spPr>
+  </cs:leaderLine>
+  <cs:legend>
+    <cs:lnRef idx="0"/>
+    <cs:fillRef idx="0"/>
+    <cs:effectRef idx="0"/>
+    <cs:fontRef idx="minor">
+      <a:schemeClr val="tx1">
+        <a:lumMod val="65000"/>
+        <a:lumOff val="35000"/>
+      </a:schemeClr>
+    </cs:fontRef>
+    <cs:defRPr sz="900" kern="1200"/>
+  </cs:legend>
+  <cs:plotArea mods="allowNoFillOverride allowNoLineOverride">
+    <cs:lnRef idx="0"/>
+    <cs:fillRef idx="0"/>
+    <cs:effectRef idx="0"/>
+    <cs:fontRef idx="minor">
+      <a:schemeClr val="tx1"/>
+    </cs:fontRef>
+  </cs:plotArea>
+  <cs:plotArea3D mods="allowNoFillOverride allowNoLineOverride">
+    <cs:lnRef idx="0"/>
+    <cs:fillRef idx="0"/>
+    <cs:effectRef idx="0"/>
+    <cs:fontRef idx="minor">
+      <a:schemeClr val="tx1"/>
+    </cs:fontRef>
+  </cs:plotArea3D>
+  <cs:seriesAxis>
+    <cs:lnRef idx="0"/>
+    <cs:fillRef idx="0"/>
+    <cs:effectRef idx="0"/>
+    <cs:fontRef idx="minor">
+      <a:schemeClr val="tx1">
+        <a:lumMod val="65000"/>
+        <a:lumOff val="35000"/>
+      </a:schemeClr>
+    </cs:fontRef>
+    <cs:defRPr sz="900" kern="1200"/>
+  </cs:seriesAxis>
+  <cs:seriesLine>
+    <cs:lnRef idx="0"/>
+    <cs:fillRef idx="0"/>
+    <cs:effectRef idx="0"/>
+    <cs:fontRef idx="minor">
+      <a:schemeClr val="tx1"/>
+    </cs:fontRef>
+    <cs:spPr>
+      <a:ln w="9525" cap="flat" cmpd="sng" algn="ctr">
+        <a:solidFill>
+          <a:schemeClr val="tx1">
+            <a:lumMod val="35000"/>
+            <a:lumOff val="65000"/>
+          </a:schemeClr>
+        </a:solidFill>
+        <a:round/>
+      </a:ln>
+    </cs:spPr>
+  </cs:seriesLine>
+  <cs:title>
+    <cs:lnRef idx="0"/>
+    <cs:fillRef idx="0"/>
+    <cs:effectRef idx="0"/>
+    <cs:fontRef idx="minor">
+      <a:schemeClr val="tx1">
+        <a:lumMod val="65000"/>
+        <a:lumOff val="35000"/>
+      </a:schemeClr>
+    </cs:fontRef>
+    <cs:defRPr sz="1400" b="0" kern="1200" spc="0" baseline="0"/>
+  </cs:title>
+  <cs:trendline>
+    <cs:lnRef idx="0">
+      <cs:styleClr val="auto"/>
+    </cs:lnRef>
+    <cs:fillRef idx="0"/>
+    <cs:effectRef idx="0"/>
+    <cs:fontRef idx="minor">
+      <a:schemeClr val="tx1"/>
+    </cs:fontRef>
+    <cs:spPr>
+      <a:ln w="19050" cap="rnd">
+        <a:solidFill>
+          <a:schemeClr val="phClr"/>
+        </a:solidFill>
+        <a:prstDash val="sysDot"/>
+      </a:ln>
+    </cs:spPr>
+  </cs:trendline>
+  <cs:trendlineLabel>
+    <cs:lnRef idx="0"/>
+    <cs:fillRef idx="0"/>
+    <cs:effectRef idx="0"/>
+    <cs:fontRef idx="minor">
+      <a:schemeClr val="tx1">
+        <a:lumMod val="65000"/>
+        <a:lumOff val="35000"/>
+      </a:schemeClr>
+    </cs:fontRef>
+    <cs:defRPr sz="900" kern="1200"/>
+  </cs:trendlineLabel>
+  <cs:upBar>
+    <cs:lnRef idx="0"/>
+    <cs:fillRef idx="0"/>
+    <cs:effectRef idx="0"/>
+    <cs:fontRef idx="minor">
+      <a:schemeClr val="dk1"/>
+    </cs:fontRef>
+    <cs:spPr>
+      <a:solidFill>
+        <a:schemeClr val="lt1"/>
+      </a:solidFill>
+      <a:ln w="9525">
+        <a:solidFill>
+          <a:schemeClr val="tx1">
+            <a:lumMod val="15000"/>
+            <a:lumOff val="85000"/>
+          </a:schemeClr>
+        </a:solidFill>
+      </a:ln>
+    </cs:spPr>
+  </cs:upBar>
+  <cs:valueAxis>
+    <cs:lnRef idx="0"/>
+    <cs:fillRef idx="0"/>
+    <cs:effectRef idx="0"/>
+    <cs:fontRef idx="minor">
+      <a:schemeClr val="tx1">
+        <a:lumMod val="65000"/>
+        <a:lumOff val="35000"/>
+      </a:schemeClr>
+    </cs:fontRef>
+    <cs:defRPr sz="900" kern="1200"/>
+  </cs:valueAxis>
+  <cs:wall>
+    <cs:lnRef idx="0"/>
+    <cs:fillRef idx="0"/>
+    <cs:effectRef idx="0"/>
+    <cs:fontRef idx="minor">
+      <a:schemeClr val="tx1"/>
+    </cs:fontRef>
+    <cs:spPr>
+      <a:noFill/>
+      <a:ln>
+        <a:noFill/>
+      </a:ln>
+    </cs:spPr>
+  </cs:wall>
+</cs:chartStyle>
+</file>
+
+<file path=ppt/charts/style2.xml><?xml version="1.0" encoding="utf-8"?>
+<cs:chartStyle xmlns:cs="http://schemas.microsoft.com/office/drawing/2012/chartStyle" xmlns:a="http://schemas.openxmlformats.org/drawingml/2006/main" id="201">
+  <cs:axisTitle>
+    <cs:lnRef idx="0"/>
+    <cs:fillRef idx="0"/>
+    <cs:effectRef idx="0"/>
+    <cs:fontRef idx="minor">
+      <a:schemeClr val="tx1">
+        <a:lumMod val="65000"/>
+        <a:lumOff val="35000"/>
+      </a:schemeClr>
+    </cs:fontRef>
+    <cs:defRPr sz="1000" kern="1200"/>
+  </cs:axisTitle>
+  <cs:categoryAxis>
+    <cs:lnRef idx="0"/>
+    <cs:fillRef idx="0"/>
+    <cs:effectRef idx="0"/>
+    <cs:fontRef idx="minor">
+      <a:schemeClr val="tx1">
+        <a:lumMod val="65000"/>
+        <a:lumOff val="35000"/>
+      </a:schemeClr>
+    </cs:fontRef>
+    <cs:spPr>
+      <a:ln w="9525" cap="flat" cmpd="sng" algn="ctr">
+        <a:solidFill>
+          <a:schemeClr val="tx1">
+            <a:lumMod val="15000"/>
+            <a:lumOff val="85000"/>
+          </a:schemeClr>
+        </a:solidFill>
+        <a:round/>
+      </a:ln>
+    </cs:spPr>
+    <cs:defRPr sz="900" kern="1200"/>
+  </cs:categoryAxis>
+  <cs:chartArea mods="allowNoFillOverride allowNoLineOverride">
+    <cs:lnRef idx="0"/>
+    <cs:fillRef idx="0"/>
+    <cs:effectRef idx="0"/>
+    <cs:fontRef idx="minor">
+      <a:schemeClr val="tx1"/>
+    </cs:fontRef>
+    <cs:spPr>
+      <a:solidFill>
+        <a:schemeClr val="bg1"/>
+      </a:solidFill>
+      <a:ln w="9525" cap="flat" cmpd="sng" algn="ctr">
+        <a:solidFill>
+          <a:schemeClr val="tx1">
+            <a:lumMod val="15000"/>
+            <a:lumOff val="85000"/>
+          </a:schemeClr>
+        </a:solidFill>
+        <a:round/>
+      </a:ln>
+    </cs:spPr>
+    <cs:defRPr sz="1000" kern="1200"/>
+  </cs:chartArea>
+  <cs:dataLabel>
+    <cs:lnRef idx="0"/>
+    <cs:fillRef idx="0"/>
+    <cs:effectRef idx="0"/>
+    <cs:fontRef idx="minor">
+      <a:schemeClr val="tx1">
+        <a:lumMod val="75000"/>
+        <a:lumOff val="25000"/>
+      </a:schemeClr>
+    </cs:fontRef>
+    <cs:defRPr sz="900" kern="1200"/>
+  </cs:dataLabel>
+  <cs:dataLabelCallout>
+    <cs:lnRef idx="0"/>
+    <cs:fillRef idx="0"/>
+    <cs:effectRef idx="0"/>
+    <cs:fontRef idx="minor">
+      <a:schemeClr val="dk1">
+        <a:lumMod val="65000"/>
+        <a:lumOff val="35000"/>
+      </a:schemeClr>
+    </cs:fontRef>
+    <cs:spPr>
+      <a:solidFill>
+        <a:schemeClr val="lt1"/>
+      </a:solidFill>
+      <a:ln>
+        <a:solidFill>
+          <a:schemeClr val="dk1">
+            <a:lumMod val="25000"/>
+            <a:lumOff val="75000"/>
+          </a:schemeClr>
+        </a:solidFill>
+      </a:ln>
+    </cs:spPr>
+    <cs:defRPr sz="900" kern="1200"/>
+    <cs:bodyPr rot="0" spcFirstLastPara="1" vertOverflow="clip" horzOverflow="clip" vert="horz" wrap="square" lIns="36576" tIns="18288" rIns="36576" bIns="18288" anchor="ctr" anchorCtr="1">
+      <a:spAutoFit/>
+    </cs:bodyPr>
+  </cs:dataLabelCallout>
+  <cs:dataPoint>
+    <cs:lnRef idx="0"/>
+    <cs:fillRef idx="1">
+      <cs:styleClr val="auto"/>
+    </cs:fillRef>
+    <cs:effectRef idx="0"/>
+    <cs:fontRef idx="minor">
+      <a:schemeClr val="tx1"/>
+    </cs:fontRef>
+  </cs:dataPoint>
+  <cs:dataPoint3D>
+    <cs:lnRef idx="0"/>
+    <cs:fillRef idx="1">
+      <cs:styleClr val="auto"/>
+    </cs:fillRef>
+    <cs:effectRef idx="0"/>
+    <cs:fontRef idx="minor">
+      <a:schemeClr val="tx1"/>
+    </cs:fontRef>
+  </cs:dataPoint3D>
+  <cs:dataPointLine>
+    <cs:lnRef idx="0">
+      <cs:styleClr val="auto"/>
+    </cs:lnRef>
+    <cs:fillRef idx="1"/>
+    <cs:effectRef idx="0"/>
+    <cs:fontRef idx="minor">
+      <a:schemeClr val="tx1"/>
+    </cs:fontRef>
+    <cs:spPr>
+      <a:ln w="28575" cap="rnd">
+        <a:solidFill>
+          <a:schemeClr val="phClr"/>
+        </a:solidFill>
+        <a:round/>
+      </a:ln>
+    </cs:spPr>
+  </cs:dataPointLine>
+  <cs:dataPointMarker>
+    <cs:lnRef idx="0">
+      <cs:styleClr val="auto"/>
+    </cs:lnRef>
+    <cs:fillRef idx="1">
+      <cs:styleClr val="auto"/>
+    </cs:fillRef>
+    <cs:effectRef idx="0"/>
+    <cs:fontRef idx="minor">
+      <a:schemeClr val="tx1"/>
+    </cs:fontRef>
+    <cs:spPr>
+      <a:ln w="9525">
+        <a:solidFill>
+          <a:schemeClr val="phClr"/>
+        </a:solidFill>
+      </a:ln>
+    </cs:spPr>
+  </cs:dataPointMarker>
+  <cs:dataPointMarkerLayout symbol="circle" size="5"/>
+  <cs:dataPointWireframe>
+    <cs:lnRef idx="0">
+      <cs:styleClr val="auto"/>
+    </cs:lnRef>
+    <cs:fillRef idx="1"/>
+    <cs:effectRef idx="0"/>
+    <cs:fontRef idx="minor">
+      <a:schemeClr val="tx1"/>
+    </cs:fontRef>
+    <cs:spPr>
+      <a:ln w="9525" cap="rnd">
+        <a:solidFill>
+          <a:schemeClr val="phClr"/>
+        </a:solidFill>
+        <a:round/>
+      </a:ln>
+    </cs:spPr>
+  </cs:dataPointWireframe>
+  <cs:dataTable>
+    <cs:lnRef idx="0"/>
+    <cs:fillRef idx="0"/>
+    <cs:effectRef idx="0"/>
+    <cs:fontRef idx="minor">
+      <a:schemeClr val="tx1">
+        <a:lumMod val="65000"/>
+        <a:lumOff val="35000"/>
+      </a:schemeClr>
+    </cs:fontRef>
+    <cs:spPr>
+      <a:noFill/>
+      <a:ln w="9525" cap="flat" cmpd="sng" algn="ctr">
+        <a:solidFill>
+          <a:schemeClr val="tx1">
+            <a:lumMod val="15000"/>
+            <a:lumOff val="85000"/>
+          </a:schemeClr>
+        </a:solidFill>
+        <a:round/>
+      </a:ln>
+    </cs:spPr>
+    <cs:defRPr sz="900" kern="1200"/>
+  </cs:dataTable>
+  <cs:downBar>
+    <cs:lnRef idx="0"/>
+    <cs:fillRef idx="0"/>
+    <cs:effectRef idx="0"/>
+    <cs:fontRef idx="minor">
+      <a:schemeClr val="dk1"/>
+    </cs:fontRef>
+    <cs:spPr>
+      <a:solidFill>
+        <a:schemeClr val="dk1">
+          <a:lumMod val="65000"/>
+          <a:lumOff val="35000"/>
+        </a:schemeClr>
+      </a:solidFill>
+      <a:ln w="9525">
+        <a:solidFill>
+          <a:schemeClr val="tx1">
+            <a:lumMod val="65000"/>
+            <a:lumOff val="35000"/>
+          </a:schemeClr>
+        </a:solidFill>
+      </a:ln>
+    </cs:spPr>
+  </cs:downBar>
+  <cs:dropLine>
+    <cs:lnRef idx="0"/>
+    <cs:fillRef idx="0"/>
+    <cs:effectRef idx="0"/>
+    <cs:fontRef idx="minor">
+      <a:schemeClr val="tx1"/>
+    </cs:fontRef>
+    <cs:spPr>
+      <a:ln w="9525" cap="flat" cmpd="sng" algn="ctr">
+        <a:solidFill>
+          <a:schemeClr val="tx1">
+            <a:lumMod val="35000"/>
+            <a:lumOff val="65000"/>
+          </a:schemeClr>
+        </a:solidFill>
+        <a:round/>
+      </a:ln>
+    </cs:spPr>
+  </cs:dropLine>
+  <cs:errorBar>
+    <cs:lnRef idx="0"/>
+    <cs:fillRef idx="0"/>
+    <cs:effectRef idx="0"/>
+    <cs:fontRef idx="minor">
+      <a:schemeClr val="tx1"/>
+    </cs:fontRef>
+    <cs:spPr>
+      <a:ln w="9525" cap="flat" cmpd="sng" algn="ctr">
+        <a:solidFill>
+          <a:schemeClr val="tx1">
+            <a:lumMod val="65000"/>
+            <a:lumOff val="35000"/>
+          </a:schemeClr>
+        </a:solidFill>
+        <a:round/>
+      </a:ln>
+    </cs:spPr>
+  </cs:errorBar>
+  <cs:floor>
+    <cs:lnRef idx="0"/>
+    <cs:fillRef idx="0"/>
+    <cs:effectRef idx="0"/>
+    <cs:fontRef idx="minor">
+      <a:schemeClr val="tx1"/>
+    </cs:fontRef>
+    <cs:spPr>
+      <a:noFill/>
+      <a:ln>
+        <a:noFill/>
+      </a:ln>
+    </cs:spPr>
+  </cs:floor>
+  <cs:gridlineMajor>
+    <cs:lnRef idx="0"/>
+    <cs:fillRef idx="0"/>
+    <cs:effectRef idx="0"/>
+    <cs:fontRef idx="minor">
+      <a:schemeClr val="tx1"/>
+    </cs:fontRef>
+    <cs:spPr>
+      <a:ln w="9525" cap="flat" cmpd="sng" algn="ctr">
+        <a:solidFill>
+          <a:schemeClr val="tx1">
+            <a:lumMod val="15000"/>
+            <a:lumOff val="85000"/>
+          </a:schemeClr>
+        </a:solidFill>
+        <a:round/>
+      </a:ln>
+    </cs:spPr>
+  </cs:gridlineMajor>
+  <cs:gridlineMinor>
+    <cs:lnRef idx="0"/>
+    <cs:fillRef idx="0"/>
+    <cs:effectRef idx="0"/>
+    <cs:fontRef idx="minor">
+      <a:schemeClr val="tx1"/>
+    </cs:fontRef>
+    <cs:spPr>
+      <a:ln w="9525" cap="flat" cmpd="sng" algn="ctr">
+        <a:solidFill>
+          <a:schemeClr val="tx1">
+            <a:lumMod val="5000"/>
+            <a:lumOff val="95000"/>
+          </a:schemeClr>
+        </a:solidFill>
+        <a:round/>
+      </a:ln>
+    </cs:spPr>
+  </cs:gridlineMinor>
+  <cs:hiLoLine>
+    <cs:lnRef idx="0"/>
+    <cs:fillRef idx="0"/>
+    <cs:effectRef idx="0"/>
+    <cs:fontRef idx="minor">
+      <a:schemeClr val="tx1"/>
+    </cs:fontRef>
+    <cs:spPr>
+      <a:ln w="9525" cap="flat" cmpd="sng" algn="ctr">
+        <a:solidFill>
+          <a:schemeClr val="tx1">
+            <a:lumMod val="75000"/>
+            <a:lumOff val="25000"/>
+          </a:schemeClr>
+        </a:solidFill>
+        <a:round/>
+      </a:ln>
+    </cs:spPr>
+  </cs:hiLoLine>
+  <cs:leaderLine>
+    <cs:lnRef idx="0"/>
+    <cs:fillRef idx="0"/>
+    <cs:effectRef idx="0"/>
+    <cs:fontRef idx="minor">
+      <a:schemeClr val="tx1"/>
+    </cs:fontRef>
+    <cs:spPr>
+      <a:ln w="9525" cap="flat" cmpd="sng" algn="ctr">
+        <a:solidFill>
+          <a:schemeClr val="tx1">
+            <a:lumMod val="35000"/>
+            <a:lumOff val="65000"/>
+          </a:schemeClr>
+        </a:solidFill>
+        <a:round/>
+      </a:ln>
+    </cs:spPr>
+  </cs:leaderLine>
+  <cs:legend>
+    <cs:lnRef idx="0"/>
+    <cs:fillRef idx="0"/>
+    <cs:effectRef idx="0"/>
+    <cs:fontRef idx="minor">
+      <a:schemeClr val="tx1">
+        <a:lumMod val="65000"/>
+        <a:lumOff val="35000"/>
+      </a:schemeClr>
+    </cs:fontRef>
+    <cs:defRPr sz="900" kern="1200"/>
+  </cs:legend>
+  <cs:plotArea mods="allowNoFillOverride allowNoLineOverride">
+    <cs:lnRef idx="0"/>
+    <cs:fillRef idx="0"/>
+    <cs:effectRef idx="0"/>
+    <cs:fontRef idx="minor">
+      <a:schemeClr val="tx1"/>
+    </cs:fontRef>
+  </cs:plotArea>
+  <cs:plotArea3D mods="allowNoFillOverride allowNoLineOverride">
+    <cs:lnRef idx="0"/>
+    <cs:fillRef idx="0"/>
+    <cs:effectRef idx="0"/>
+    <cs:fontRef idx="minor">
+      <a:schemeClr val="tx1"/>
+    </cs:fontRef>
+  </cs:plotArea3D>
+  <cs:seriesAxis>
+    <cs:lnRef idx="0"/>
+    <cs:fillRef idx="0"/>
+    <cs:effectRef idx="0"/>
+    <cs:fontRef idx="minor">
+      <a:schemeClr val="tx1">
+        <a:lumMod val="65000"/>
+        <a:lumOff val="35000"/>
+      </a:schemeClr>
+    </cs:fontRef>
+    <cs:defRPr sz="900" kern="1200"/>
+  </cs:seriesAxis>
+  <cs:seriesLine>
+    <cs:lnRef idx="0"/>
+    <cs:fillRef idx="0"/>
+    <cs:effectRef idx="0"/>
+    <cs:fontRef idx="minor">
+      <a:schemeClr val="tx1"/>
+    </cs:fontRef>
+    <cs:spPr>
+      <a:ln w="9525" cap="flat" cmpd="sng" algn="ctr">
+        <a:solidFill>
+          <a:schemeClr val="tx1">
+            <a:lumMod val="35000"/>
+            <a:lumOff val="65000"/>
+          </a:schemeClr>
+        </a:solidFill>
+        <a:round/>
+      </a:ln>
+    </cs:spPr>
+  </cs:seriesLine>
+  <cs:title>
+    <cs:lnRef idx="0"/>
+    <cs:fillRef idx="0"/>
+    <cs:effectRef idx="0"/>
+    <cs:fontRef idx="minor">
+      <a:schemeClr val="tx1">
+        <a:lumMod val="65000"/>
+        <a:lumOff val="35000"/>
+      </a:schemeClr>
+    </cs:fontRef>
+    <cs:defRPr sz="1400" b="0" kern="1200" spc="0" baseline="0"/>
+  </cs:title>
+  <cs:trendline>
+    <cs:lnRef idx="0">
+      <cs:styleClr val="auto"/>
+    </cs:lnRef>
+    <cs:fillRef idx="0"/>
+    <cs:effectRef idx="0"/>
+    <cs:fontRef idx="minor">
+      <a:schemeClr val="tx1"/>
+    </cs:fontRef>
+    <cs:spPr>
+      <a:ln w="19050" cap="rnd">
+        <a:solidFill>
+          <a:schemeClr val="phClr"/>
+        </a:solidFill>
+        <a:prstDash val="sysDot"/>
+      </a:ln>
+    </cs:spPr>
+  </cs:trendline>
+  <cs:trendlineLabel>
+    <cs:lnRef idx="0"/>
+    <cs:fillRef idx="0"/>
+    <cs:effectRef idx="0"/>
+    <cs:fontRef idx="minor">
+      <a:schemeClr val="tx1">
+        <a:lumMod val="65000"/>
+        <a:lumOff val="35000"/>
+      </a:schemeClr>
+    </cs:fontRef>
+    <cs:defRPr sz="900" kern="1200"/>
+  </cs:trendlineLabel>
+  <cs:upBar>
+    <cs:lnRef idx="0"/>
+    <cs:fillRef idx="0"/>
+    <cs:effectRef idx="0"/>
+    <cs:fontRef idx="minor">
+      <a:schemeClr val="dk1"/>
+    </cs:fontRef>
+    <cs:spPr>
+      <a:solidFill>
+        <a:schemeClr val="lt1"/>
+      </a:solidFill>
+      <a:ln w="9525">
+        <a:solidFill>
+          <a:schemeClr val="tx1">
+            <a:lumMod val="15000"/>
+            <a:lumOff val="85000"/>
+          </a:schemeClr>
+        </a:solidFill>
+      </a:ln>
+    </cs:spPr>
+  </cs:upBar>
+  <cs:valueAxis>
+    <cs:lnRef idx="0"/>
+    <cs:fillRef idx="0"/>
+    <cs:effectRef idx="0"/>
+    <cs:fontRef idx="minor">
+      <a:schemeClr val="tx1">
+        <a:lumMod val="65000"/>
+        <a:lumOff val="35000"/>
+      </a:schemeClr>
+    </cs:fontRef>
+    <cs:defRPr sz="900" kern="1200"/>
+  </cs:valueAxis>
+  <cs:wall>
+    <cs:lnRef idx="0"/>
+    <cs:fillRef idx="0"/>
+    <cs:effectRef idx="0"/>
+    <cs:fontRef idx="minor">
+      <a:schemeClr val="tx1"/>
+    </cs:fontRef>
+    <cs:spPr>
+      <a:noFill/>
+      <a:ln>
+        <a:noFill/>
+      </a:ln>
+    </cs:spPr>
+  </cs:wall>
+</cs:chartStyle>
+</file>
+
+<file path=ppt/charts/style3.xml><?xml version="1.0" encoding="utf-8"?>
+<cs:chartStyle xmlns:cs="http://schemas.microsoft.com/office/drawing/2012/chartStyle" xmlns:a="http://schemas.openxmlformats.org/drawingml/2006/main" id="201">
+  <cs:axisTitle>
+    <cs:lnRef idx="0"/>
+    <cs:fillRef idx="0"/>
+    <cs:effectRef idx="0"/>
+    <cs:fontRef idx="minor">
+      <a:schemeClr val="tx1">
+        <a:lumMod val="65000"/>
+        <a:lumOff val="35000"/>
+      </a:schemeClr>
+    </cs:fontRef>
+    <cs:defRPr sz="1000" kern="1200"/>
+  </cs:axisTitle>
+  <cs:categoryAxis>
+    <cs:lnRef idx="0"/>
+    <cs:fillRef idx="0"/>
+    <cs:effectRef idx="0"/>
+    <cs:fontRef idx="minor">
+      <a:schemeClr val="tx1">
+        <a:lumMod val="65000"/>
+        <a:lumOff val="35000"/>
+      </a:schemeClr>
+    </cs:fontRef>
+    <cs:spPr>
+      <a:ln w="9525" cap="flat" cmpd="sng" algn="ctr">
+        <a:solidFill>
+          <a:schemeClr val="tx1">
+            <a:lumMod val="15000"/>
+            <a:lumOff val="85000"/>
+          </a:schemeClr>
+        </a:solidFill>
+        <a:round/>
+      </a:ln>
+    </cs:spPr>
+    <cs:defRPr sz="900" kern="1200"/>
+  </cs:categoryAxis>
+  <cs:chartArea mods="allowNoFillOverride allowNoLineOverride">
+    <cs:lnRef idx="0"/>
+    <cs:fillRef idx="0"/>
+    <cs:effectRef idx="0"/>
+    <cs:fontRef idx="minor">
+      <a:schemeClr val="tx1"/>
+    </cs:fontRef>
+    <cs:spPr>
+      <a:solidFill>
+        <a:schemeClr val="bg1"/>
+      </a:solidFill>
+      <a:ln w="9525" cap="flat" cmpd="sng" algn="ctr">
+        <a:solidFill>
+          <a:schemeClr val="tx1">
+            <a:lumMod val="15000"/>
+            <a:lumOff val="85000"/>
+          </a:schemeClr>
+        </a:solidFill>
+        <a:round/>
+      </a:ln>
+    </cs:spPr>
+    <cs:defRPr sz="1000" kern="1200"/>
+  </cs:chartArea>
+  <cs:dataLabel>
+    <cs:lnRef idx="0"/>
+    <cs:fillRef idx="0"/>
+    <cs:effectRef idx="0"/>
+    <cs:fontRef idx="minor">
+      <a:schemeClr val="tx1">
+        <a:lumMod val="75000"/>
+        <a:lumOff val="25000"/>
+      </a:schemeClr>
+    </cs:fontRef>
+    <cs:defRPr sz="900" kern="1200"/>
+  </cs:dataLabel>
+  <cs:dataLabelCallout>
+    <cs:lnRef idx="0"/>
+    <cs:fillRef idx="0"/>
+    <cs:effectRef idx="0"/>
+    <cs:fontRef idx="minor">
+      <a:schemeClr val="dk1">
+        <a:lumMod val="65000"/>
+        <a:lumOff val="35000"/>
+      </a:schemeClr>
+    </cs:fontRef>
+    <cs:spPr>
+      <a:solidFill>
+        <a:schemeClr val="lt1"/>
+      </a:solidFill>
+      <a:ln>
+        <a:solidFill>
+          <a:schemeClr val="dk1">
+            <a:lumMod val="25000"/>
+            <a:lumOff val="75000"/>
+          </a:schemeClr>
+        </a:solidFill>
+      </a:ln>
+    </cs:spPr>
+    <cs:defRPr sz="900" kern="1200"/>
+    <cs:bodyPr rot="0" spcFirstLastPara="1" vertOverflow="clip" horzOverflow="clip" vert="horz" wrap="square" lIns="36576" tIns="18288" rIns="36576" bIns="18288" anchor="ctr" anchorCtr="1">
+      <a:spAutoFit/>
+    </cs:bodyPr>
+  </cs:dataLabelCallout>
+  <cs:dataPoint>
+    <cs:lnRef idx="0"/>
+    <cs:fillRef idx="1">
+      <cs:styleClr val="auto"/>
+    </cs:fillRef>
+    <cs:effectRef idx="0"/>
+    <cs:fontRef idx="minor">
+      <a:schemeClr val="tx1"/>
+    </cs:fontRef>
+  </cs:dataPoint>
+  <cs:dataPoint3D>
+    <cs:lnRef idx="0"/>
+    <cs:fillRef idx="1">
+      <cs:styleClr val="auto"/>
+    </cs:fillRef>
+    <cs:effectRef idx="0"/>
+    <cs:fontRef idx="minor">
+      <a:schemeClr val="tx1"/>
+    </cs:fontRef>
+  </cs:dataPoint3D>
+  <cs:dataPointLine>
+    <cs:lnRef idx="0">
+      <cs:styleClr val="auto"/>
+    </cs:lnRef>
+    <cs:fillRef idx="1"/>
+    <cs:effectRef idx="0"/>
+    <cs:fontRef idx="minor">
+      <a:schemeClr val="tx1"/>
+    </cs:fontRef>
+    <cs:spPr>
+      <a:ln w="28575" cap="rnd">
+        <a:solidFill>
+          <a:schemeClr val="phClr"/>
+        </a:solidFill>
+        <a:round/>
+      </a:ln>
+    </cs:spPr>
+  </cs:dataPointLine>
+  <cs:dataPointMarker>
+    <cs:lnRef idx="0">
+      <cs:styleClr val="auto"/>
+    </cs:lnRef>
+    <cs:fillRef idx="1">
+      <cs:styleClr val="auto"/>
+    </cs:fillRef>
+    <cs:effectRef idx="0"/>
+    <cs:fontRef idx="minor">
+      <a:schemeClr val="tx1"/>
+    </cs:fontRef>
+    <cs:spPr>
       <a:ln w="9525">
         <a:solidFill>
           <a:schemeClr val="phClr"/>
@@ -4453,7 +6676,23 @@
           <a:bodyPr/>
           <a:lstStyle/>
           <a:p>
-            <a:endParaRPr lang="nb-NO"/>
+            <a:r>
+              <a:rPr lang="nb-NO" dirty="0"/>
+              <a:t>EP8900 – Integrated </a:t>
+            </a:r>
+            <a:r>
+              <a:rPr lang="nb-NO" dirty="0" err="1"/>
+              <a:t>Assessment</a:t>
+            </a:r>
+            <a:r>
+              <a:rPr lang="nb-NO" dirty="0"/>
+              <a:t> </a:t>
+            </a:r>
+            <a:r>
+              <a:rPr lang="nb-NO" dirty="0" err="1"/>
+              <a:t>Modelling</a:t>
+            </a:r>
+            <a:endParaRPr lang="nb-NO" dirty="0"/>
           </a:p>
         </p:txBody>
       </p:sp>
@@ -4472,7 +6711,10 @@
           <a:bodyPr/>
           <a:lstStyle/>
           <a:p>
-            <a:endParaRPr lang="nb-NO"/>
+            <a:r>
+              <a:rPr lang="nb-NO" dirty="0"/>
+              <a:t>SSP5 </a:t>
+            </a:r>
           </a:p>
         </p:txBody>
       </p:sp>
@@ -4511,6 +6753,128 @@
           <p:cNvPr id="2" name="Title 1">
             <a:extLst>
               <a:ext uri="{FF2B5EF4-FFF2-40B4-BE49-F238E27FC236}">
+                <a16:creationId xmlns:a16="http://schemas.microsoft.com/office/drawing/2014/main" id="{D66D13F5-2018-F640-B473-D321C8EBF137}"/>
+              </a:ext>
+            </a:extLst>
+          </p:cNvPr>
+          <p:cNvSpPr>
+            <a:spLocks noGrp="1"/>
+          </p:cNvSpPr>
+          <p:nvPr>
+            <p:ph type="title"/>
+          </p:nvPr>
+        </p:nvSpPr>
+        <p:spPr/>
+        <p:txBody>
+          <a:bodyPr/>
+          <a:lstStyle/>
+          <a:p>
+            <a:r>
+              <a:rPr lang="en-GB" dirty="0"/>
+              <a:t>Background of SSP5</a:t>
+            </a:r>
+          </a:p>
+        </p:txBody>
+      </p:sp>
+      <p:sp>
+        <p:nvSpPr>
+          <p:cNvPr id="3" name="Content Placeholder 2">
+            <a:extLst>
+              <a:ext uri="{FF2B5EF4-FFF2-40B4-BE49-F238E27FC236}">
+                <a16:creationId xmlns:a16="http://schemas.microsoft.com/office/drawing/2014/main" id="{8B7E0DC2-E958-9949-9131-9B302C3487DA}"/>
+              </a:ext>
+            </a:extLst>
+          </p:cNvPr>
+          <p:cNvSpPr>
+            <a:spLocks noGrp="1"/>
+          </p:cNvSpPr>
+          <p:nvPr>
+            <p:ph idx="1"/>
+          </p:nvPr>
+        </p:nvSpPr>
+        <p:spPr/>
+        <p:txBody>
+          <a:bodyPr/>
+          <a:lstStyle/>
+          <a:p>
+            <a:r>
+              <a:rPr lang="en-GB" dirty="0"/>
+              <a:t>Low population growth</a:t>
+            </a:r>
+          </a:p>
+          <a:p>
+            <a:r>
+              <a:rPr lang="en-GB" dirty="0"/>
+              <a:t>High GDP growth</a:t>
+            </a:r>
+          </a:p>
+          <a:p>
+            <a:r>
+              <a:rPr lang="en-GB" dirty="0"/>
+              <a:t>High level of trade</a:t>
+            </a:r>
+          </a:p>
+          <a:p>
+            <a:r>
+              <a:rPr lang="en-GB" dirty="0"/>
+              <a:t>High energy consumption</a:t>
+            </a:r>
+          </a:p>
+          <a:p>
+            <a:r>
+              <a:rPr lang="en-GB" dirty="0"/>
+              <a:t>Rapid technology development</a:t>
+            </a:r>
+          </a:p>
+          <a:p>
+            <a:r>
+              <a:rPr lang="en-GB" dirty="0"/>
+              <a:t>Low environmental focus</a:t>
+            </a:r>
+          </a:p>
+          <a:p>
+            <a:r>
+              <a:rPr lang="en-GB" dirty="0"/>
+              <a:t>Policies are development oriented</a:t>
+            </a:r>
+          </a:p>
+        </p:txBody>
+      </p:sp>
+    </p:spTree>
+    <p:extLst>
+      <p:ext uri="{BB962C8B-B14F-4D97-AF65-F5344CB8AC3E}">
+        <p14:creationId xmlns:p14="http://schemas.microsoft.com/office/powerpoint/2010/main" val="234051224"/>
+      </p:ext>
+    </p:extLst>
+  </p:cSld>
+  <p:clrMapOvr>
+    <a:masterClrMapping/>
+  </p:clrMapOvr>
+</p:sld>
+</file>
+
+<file path=ppt/slides/slide3.xml><?xml version="1.0" encoding="utf-8"?>
+<p:sld xmlns:a="http://schemas.openxmlformats.org/drawingml/2006/main" xmlns:r="http://schemas.openxmlformats.org/officeDocument/2006/relationships" xmlns:p="http://schemas.openxmlformats.org/presentationml/2006/main">
+  <p:cSld>
+    <p:spTree>
+      <p:nvGrpSpPr>
+        <p:cNvPr id="1" name=""/>
+        <p:cNvGrpSpPr/>
+        <p:nvPr/>
+      </p:nvGrpSpPr>
+      <p:grpSpPr>
+        <a:xfrm>
+          <a:off x="0" y="0"/>
+          <a:ext cx="0" cy="0"/>
+          <a:chOff x="0" y="0"/>
+          <a:chExt cx="0" cy="0"/>
+        </a:xfrm>
+      </p:grpSpPr>
+      <p:sp>
+        <p:nvSpPr>
+          <p:cNvPr id="2" name="Title 1">
+            <a:extLst>
+              <a:ext uri="{FF2B5EF4-FFF2-40B4-BE49-F238E27FC236}">
                 <a16:creationId xmlns:a16="http://schemas.microsoft.com/office/drawing/2014/main" id="{94FE2181-0FF0-FF4D-B38E-8925E20015BC}"/>
               </a:ext>
             </a:extLst>
@@ -4534,8 +6898,8 @@
           </a:p>
         </p:txBody>
       </p:sp>
-      <mc:AlternateContent xmlns:mc="http://schemas.openxmlformats.org/markup-compatibility/2006">
-        <mc:Choice xmlns:a14="http://schemas.microsoft.com/office/drawing/2010/main" Requires="a14">
+      <mc:AlternateContent xmlns:mc="http://schemas.openxmlformats.org/markup-compatibility/2006" xmlns:a14="http://schemas.microsoft.com/office/drawing/2010/main">
+        <mc:Choice Requires="a14">
           <p:sp>
             <p:nvSpPr>
               <p:cNvPr id="3" name="Content Placeholder 2">
@@ -4882,7 +7246,7 @@
             </p:txBody>
           </p:sp>
         </mc:Choice>
-        <mc:Fallback>
+        <mc:Fallback xmlns="">
           <p:sp>
             <p:nvSpPr>
               <p:cNvPr id="3" name="Content Placeholder 2">
@@ -5170,8 +7534,8 @@
             </p:nvSpPr>
             <p:spPr>
               <a:xfrm>
-                <a:off x="838200" y="4949190"/>
-                <a:ext cx="10515600" cy="1500505"/>
+                <a:off x="2734626" y="4860925"/>
+                <a:ext cx="7044690" cy="1500505"/>
               </a:xfrm>
               <a:prstGeom prst="rect">
                 <a:avLst/>
@@ -5350,10 +7714,6 @@
                   <a:buNone/>
                 </a:pPr>
                 <a:r>
-                  <a:rPr lang="en-GB" dirty="0"/>
-                  <a:t>		</a:t>
-                </a:r>
-                <a:r>
                   <a:rPr lang="en-GB" dirty="0">
                     <a:sym typeface="Wingdings" pitchFamily="2" charset="2"/>
                   </a:rPr>
@@ -5394,8 +7754,13 @@
                 </a14:m>
                 <a:r>
                   <a:rPr lang="en-GB" dirty="0"/>
-                  <a:t> derived from final energy demand vs useful energy 			demand and assumed to increase by 15% annually</a:t>
+                  <a:t> derived from present final energy demand vs useful energy demand and assumed to increase by 15% </a:t>
                 </a:r>
+                <a:r>
+                  <a:rPr lang="en-GB" dirty="0" err="1"/>
+                  <a:t>decadally</a:t>
+                </a:r>
+                <a:endParaRPr lang="en-GB" dirty="0"/>
               </a:p>
             </p:txBody>
           </p:sp>
@@ -5417,8 +7782,8 @@
             </p:nvSpPr>
             <p:spPr>
               <a:xfrm>
-                <a:off x="838200" y="4949190"/>
-                <a:ext cx="10515600" cy="1500505"/>
+                <a:off x="2734626" y="4860925"/>
+                <a:ext cx="7044690" cy="1500505"/>
               </a:xfrm>
               <a:prstGeom prst="rect">
                 <a:avLst/>
@@ -5426,7 +7791,7 @@
               <a:blipFill>
                 <a:blip r:embed="rId3"/>
                 <a:stretch>
-                  <a:fillRect t="-7563" r="-1568"/>
+                  <a:fillRect l="-1619" t="-7563" r="-2878"/>
                 </a:stretch>
               </a:blipFill>
             </p:spPr>
@@ -5458,7 +7823,7 @@
 </p:sld>
 </file>
 
-<file path=ppt/slides/slide3.xml><?xml version="1.0" encoding="utf-8"?>
+<file path=ppt/slides/slide4.xml><?xml version="1.0" encoding="utf-8"?>
 <p:sld xmlns:a="http://schemas.openxmlformats.org/drawingml/2006/main" xmlns:r="http://schemas.openxmlformats.org/officeDocument/2006/relationships" xmlns:p="http://schemas.openxmlformats.org/presentationml/2006/main">
   <p:cSld>
     <p:spTree>
@@ -5531,7 +7896,7 @@
 </p:sld>
 </file>
 
-<file path=ppt/slides/slide4.xml><?xml version="1.0" encoding="utf-8"?>
+<file path=ppt/slides/slide5.xml><?xml version="1.0" encoding="utf-8"?>
 <p:sld xmlns:a="http://schemas.openxmlformats.org/drawingml/2006/main" xmlns:r="http://schemas.openxmlformats.org/officeDocument/2006/relationships" xmlns:p="http://schemas.openxmlformats.org/presentationml/2006/main">
   <p:cSld>
     <p:bg>
@@ -5626,6 +7991,214 @@
     <p:extLst>
       <p:ext uri="{BB962C8B-B14F-4D97-AF65-F5344CB8AC3E}">
         <p14:creationId xmlns:p14="http://schemas.microsoft.com/office/powerpoint/2010/main" val="186779586"/>
+      </p:ext>
+    </p:extLst>
+  </p:cSld>
+  <p:clrMapOvr>
+    <a:masterClrMapping/>
+  </p:clrMapOvr>
+</p:sld>
+</file>
+
+<file path=ppt/slides/slide6.xml><?xml version="1.0" encoding="utf-8"?>
+<p:sld xmlns:a="http://schemas.openxmlformats.org/drawingml/2006/main" xmlns:r="http://schemas.openxmlformats.org/officeDocument/2006/relationships" xmlns:p="http://schemas.openxmlformats.org/presentationml/2006/main">
+  <p:cSld>
+    <p:bg>
+      <p:bgPr>
+        <a:solidFill>
+          <a:schemeClr val="bg1"/>
+        </a:solidFill>
+        <a:effectLst/>
+      </p:bgPr>
+    </p:bg>
+    <p:spTree>
+      <p:nvGrpSpPr>
+        <p:cNvPr id="1" name=""/>
+        <p:cNvGrpSpPr/>
+        <p:nvPr/>
+      </p:nvGrpSpPr>
+      <p:grpSpPr>
+        <a:xfrm>
+          <a:off x="0" y="0"/>
+          <a:ext cx="0" cy="0"/>
+          <a:chOff x="0" y="0"/>
+          <a:chExt cx="0" cy="0"/>
+        </a:xfrm>
+      </p:grpSpPr>
+      <p:sp>
+        <p:nvSpPr>
+          <p:cNvPr id="2" name="Title 1">
+            <a:extLst>
+              <a:ext uri="{FF2B5EF4-FFF2-40B4-BE49-F238E27FC236}">
+                <a16:creationId xmlns:a16="http://schemas.microsoft.com/office/drawing/2014/main" id="{80622AB2-06B2-6B43-B131-C42284EA7DCB}"/>
+              </a:ext>
+            </a:extLst>
+          </p:cNvPr>
+          <p:cNvSpPr>
+            <a:spLocks noGrp="1"/>
+          </p:cNvSpPr>
+          <p:nvPr>
+            <p:ph type="title"/>
+          </p:nvPr>
+        </p:nvSpPr>
+        <p:spPr>
+          <a:xfrm>
+            <a:off x="838200" y="365125"/>
+            <a:ext cx="10515600" cy="1325563"/>
+          </a:xfrm>
+        </p:spPr>
+        <p:txBody>
+          <a:bodyPr>
+            <a:normAutofit/>
+          </a:bodyPr>
+          <a:lstStyle/>
+          <a:p>
+            <a:r>
+              <a:rPr lang="en-GB" dirty="0"/>
+              <a:t>Trade</a:t>
+            </a:r>
+          </a:p>
+        </p:txBody>
+      </p:sp>
+      <p:graphicFrame>
+        <p:nvGraphicFramePr>
+          <p:cNvPr id="7" name="Content Placeholder 3">
+            <a:extLst>
+              <a:ext uri="{FF2B5EF4-FFF2-40B4-BE49-F238E27FC236}">
+                <a16:creationId xmlns:a16="http://schemas.microsoft.com/office/drawing/2014/main" id="{AF869289-E83F-E24E-8552-3B3AE0EA17CE}"/>
+              </a:ext>
+            </a:extLst>
+          </p:cNvPr>
+          <p:cNvGraphicFramePr>
+            <a:graphicFrameLocks noGrp="1"/>
+          </p:cNvGraphicFramePr>
+          <p:nvPr>
+            <p:ph idx="1"/>
+            <p:extLst>
+              <p:ext uri="{D42A27DB-BD31-4B8C-83A1-F6EECF244321}">
+                <p14:modId xmlns:p14="http://schemas.microsoft.com/office/powerpoint/2010/main" val="2968810005"/>
+              </p:ext>
+            </p:extLst>
+          </p:nvPr>
+        </p:nvGraphicFramePr>
+        <p:xfrm>
+          <a:off x="838200" y="1825625"/>
+          <a:ext cx="10515600" cy="4351338"/>
+        </p:xfrm>
+        <a:graphic>
+          <a:graphicData uri="http://schemas.openxmlformats.org/drawingml/2006/chart">
+            <c:chart xmlns:c="http://schemas.openxmlformats.org/drawingml/2006/chart" xmlns:r="http://schemas.openxmlformats.org/officeDocument/2006/relationships" r:id="rId2"/>
+          </a:graphicData>
+        </a:graphic>
+      </p:graphicFrame>
+    </p:spTree>
+    <p:extLst>
+      <p:ext uri="{BB962C8B-B14F-4D97-AF65-F5344CB8AC3E}">
+        <p14:creationId xmlns:p14="http://schemas.microsoft.com/office/powerpoint/2010/main" val="3368274305"/>
+      </p:ext>
+    </p:extLst>
+  </p:cSld>
+  <p:clrMapOvr>
+    <a:masterClrMapping/>
+  </p:clrMapOvr>
+</p:sld>
+</file>
+
+<file path=ppt/slides/slide7.xml><?xml version="1.0" encoding="utf-8"?>
+<p:sld xmlns:a="http://schemas.openxmlformats.org/drawingml/2006/main" xmlns:r="http://schemas.openxmlformats.org/officeDocument/2006/relationships" xmlns:p="http://schemas.openxmlformats.org/presentationml/2006/main">
+  <p:cSld>
+    <p:bg>
+      <p:bgPr>
+        <a:solidFill>
+          <a:schemeClr val="bg1"/>
+        </a:solidFill>
+        <a:effectLst/>
+      </p:bgPr>
+    </p:bg>
+    <p:spTree>
+      <p:nvGrpSpPr>
+        <p:cNvPr id="1" name=""/>
+        <p:cNvGrpSpPr/>
+        <p:nvPr/>
+      </p:nvGrpSpPr>
+      <p:grpSpPr>
+        <a:xfrm>
+          <a:off x="0" y="0"/>
+          <a:ext cx="0" cy="0"/>
+          <a:chOff x="0" y="0"/>
+          <a:chExt cx="0" cy="0"/>
+        </a:xfrm>
+      </p:grpSpPr>
+      <p:sp>
+        <p:nvSpPr>
+          <p:cNvPr id="2" name="Title 1">
+            <a:extLst>
+              <a:ext uri="{FF2B5EF4-FFF2-40B4-BE49-F238E27FC236}">
+                <a16:creationId xmlns:a16="http://schemas.microsoft.com/office/drawing/2014/main" id="{0B47953A-3391-434D-B44D-128DFBCE486C}"/>
+              </a:ext>
+            </a:extLst>
+          </p:cNvPr>
+          <p:cNvSpPr>
+            <a:spLocks noGrp="1"/>
+          </p:cNvSpPr>
+          <p:nvPr>
+            <p:ph type="title"/>
+          </p:nvPr>
+        </p:nvSpPr>
+        <p:spPr>
+          <a:xfrm>
+            <a:off x="838200" y="365125"/>
+            <a:ext cx="10515600" cy="1325563"/>
+          </a:xfrm>
+        </p:spPr>
+        <p:txBody>
+          <a:bodyPr>
+            <a:normAutofit/>
+          </a:bodyPr>
+          <a:lstStyle/>
+          <a:p>
+            <a:r>
+              <a:rPr lang="en-GB" dirty="0"/>
+              <a:t>CO2eq Emissions</a:t>
+            </a:r>
+          </a:p>
+        </p:txBody>
+      </p:sp>
+      <p:graphicFrame>
+        <p:nvGraphicFramePr>
+          <p:cNvPr id="7" name="Content Placeholder 3">
+            <a:extLst>
+              <a:ext uri="{FF2B5EF4-FFF2-40B4-BE49-F238E27FC236}">
+                <a16:creationId xmlns:a16="http://schemas.microsoft.com/office/drawing/2014/main" id="{6F115C6C-1DC9-1847-80CB-7C5C839E4025}"/>
+              </a:ext>
+            </a:extLst>
+          </p:cNvPr>
+          <p:cNvGraphicFramePr>
+            <a:graphicFrameLocks noGrp="1"/>
+          </p:cNvGraphicFramePr>
+          <p:nvPr>
+            <p:ph idx="1"/>
+            <p:extLst>
+              <p:ext uri="{D42A27DB-BD31-4B8C-83A1-F6EECF244321}">
+                <p14:modId xmlns:p14="http://schemas.microsoft.com/office/powerpoint/2010/main" val="1839460022"/>
+              </p:ext>
+            </p:extLst>
+          </p:nvPr>
+        </p:nvGraphicFramePr>
+        <p:xfrm>
+          <a:off x="838200" y="1825625"/>
+          <a:ext cx="10515600" cy="4351338"/>
+        </p:xfrm>
+        <a:graphic>
+          <a:graphicData uri="http://schemas.openxmlformats.org/drawingml/2006/chart">
+            <c:chart xmlns:c="http://schemas.openxmlformats.org/drawingml/2006/chart" xmlns:r="http://schemas.openxmlformats.org/officeDocument/2006/relationships" r:id="rId2"/>
+          </a:graphicData>
+        </a:graphic>
+      </p:graphicFrame>
+    </p:spTree>
+    <p:extLst>
+      <p:ext uri="{BB962C8B-B14F-4D97-AF65-F5344CB8AC3E}">
+        <p14:creationId xmlns:p14="http://schemas.microsoft.com/office/powerpoint/2010/main" val="203435758"/>
       </p:ext>
     </p:extLst>
   </p:cSld>

</xml_diff>